<commit_message>
Edited tables and text in slides
</commit_message>
<xml_diff>
--- a/LectureSlides/01_PreceptionForScientificVisualization.pptx
+++ b/LectureSlides/01_PreceptionForScientificVisualization.pptx
@@ -3901,21 +3901,15 @@
             <a:pPr lvl="1"/>
             <a:r>
               <a:rPr dirty="0"/>
-              <a:t>More </a:t>
-            </a:r>
-            <a:r>
-              <a:t>than </a:t>
-            </a:r>
-            <a:r>
-              <a:rPr lang="en-US"/>
+              <a:t>More than </a:t>
+            </a:r>
+            <a:r>
+              <a:rPr lang="en-US" dirty="0"/>
               <a:t>5</a:t>
             </a:r>
             <a:r>
-              <a:t> </a:t>
-            </a:r>
-            <a:r>
-              <a:rPr dirty="0"/>
-              <a:t>days late - no credit</a:t>
+              <a:rPr dirty="0"/>
+              <a:t> days late - no credit</a:t>
             </a:r>
           </a:p>
           <a:p>
@@ -9683,7 +9677,12 @@
             <p:ph idx="1"/>
           </p:nvPr>
         </p:nvSpPr>
-        <p:spPr/>
+        <p:spPr>
+          <a:xfrm>
+            <a:off x="457200" y="1094820"/>
+            <a:ext cx="8229600" cy="3661700"/>
+          </a:xfrm>
+        </p:spPr>
         <p:txBody>
           <a:bodyPr>
             <a:normAutofit fontScale="85000" lnSpcReduction="20000"/>
@@ -9822,7 +9821,12 @@
             <p:ph idx="1"/>
           </p:nvPr>
         </p:nvSpPr>
-        <p:spPr/>
+        <p:spPr>
+          <a:xfrm>
+            <a:off x="457200" y="1200151"/>
+            <a:ext cx="8229600" cy="3433356"/>
+          </a:xfrm>
+        </p:spPr>
         <p:txBody>
           <a:bodyPr>
             <a:normAutofit fontScale="85000" lnSpcReduction="10000"/>
@@ -9831,48 +9835,64 @@
           <a:p>
             <a:pPr lvl="0"/>
             <a:r>
+              <a:rPr dirty="0"/>
               <a:t>Data science consultant with several decades of experience</a:t>
             </a:r>
           </a:p>
           <a:p>
             <a:pPr lvl="0"/>
             <a:r>
+              <a:rPr dirty="0"/>
               <a:t>Instructor for Harvard since 2016</a:t>
             </a:r>
           </a:p>
           <a:p>
             <a:pPr lvl="0"/>
             <a:r>
+              <a:rPr dirty="0"/>
               <a:t>Lead team that commercialized Bell Labs S, now open source R</a:t>
             </a:r>
           </a:p>
           <a:p>
             <a:pPr lvl="0"/>
             <a:r>
+              <a:rPr dirty="0"/>
               <a:t>Company co-founder and held executive positions in several industries</a:t>
             </a:r>
           </a:p>
           <a:p>
             <a:pPr lvl="0"/>
             <a:r>
-              <a:t>Creator of multiple edX courses, author of O’Reily books and articles</a:t>
+              <a:rPr dirty="0"/>
+              <a:t>Creator of multiple edX courses, author of </a:t>
+            </a:r>
+            <a:r>
+              <a:rPr dirty="0" err="1"/>
+              <a:t>O’Reily</a:t>
+            </a:r>
+            <a:r>
+              <a:rPr dirty="0"/>
+              <a:t> books and articles</a:t>
             </a:r>
           </a:p>
           <a:p>
             <a:pPr lvl="0"/>
             <a:r>
+              <a:rPr dirty="0"/>
               <a:t>Holder of 5 issued patents</a:t>
             </a:r>
           </a:p>
           <a:p>
             <a:pPr lvl="0"/>
             <a:r>
+              <a:rPr dirty="0"/>
               <a:t>BS, physics and math (minor), University of New Mexico</a:t>
             </a:r>
           </a:p>
           <a:p>
             <a:pPr lvl="0"/>
             <a:r>
+              <a:rPr dirty="0"/>
               <a:t>MS and PhD, geophysics, Princeton University – NSF, John von Neuman Supercomputing Fellow</a:t>
             </a:r>
           </a:p>

</xml_diff>

<commit_message>
Updates and edits to slides
</commit_message>
<xml_diff>
--- a/LectureSlides/01_PreceptionForScientificVisualization.pptx
+++ b/LectureSlides/01_PreceptionForScientificVisualization.pptx
@@ -348,7 +348,7 @@
           <a:p>
             <a:fld id="{241EB5C9-1307-BA42-ABA2-0BC069CD8E7F}" type="datetimeFigureOut">
               <a:rPr lang="en-US" smtClean="0"/>
-              <a:t>8/3/2024</a:t>
+              <a:t>8/15/2024</a:t>
             </a:fld>
             <a:endParaRPr lang="en-US"/>
           </a:p>
@@ -516,7 +516,7 @@
           <a:p>
             <a:fld id="{241EB5C9-1307-BA42-ABA2-0BC069CD8E7F}" type="datetimeFigureOut">
               <a:rPr lang="en-US" smtClean="0"/>
-              <a:t>8/3/2024</a:t>
+              <a:t>8/15/2024</a:t>
             </a:fld>
             <a:endParaRPr lang="en-US"/>
           </a:p>
@@ -694,7 +694,7 @@
           <a:p>
             <a:fld id="{241EB5C9-1307-BA42-ABA2-0BC069CD8E7F}" type="datetimeFigureOut">
               <a:rPr lang="en-US" smtClean="0"/>
-              <a:t>8/3/2024</a:t>
+              <a:t>8/15/2024</a:t>
             </a:fld>
             <a:endParaRPr lang="en-US"/>
           </a:p>
@@ -862,7 +862,7 @@
           <a:p>
             <a:fld id="{241EB5C9-1307-BA42-ABA2-0BC069CD8E7F}" type="datetimeFigureOut">
               <a:rPr lang="en-US" smtClean="0"/>
-              <a:t>8/3/2024</a:t>
+              <a:t>8/15/2024</a:t>
             </a:fld>
             <a:endParaRPr lang="en-US"/>
           </a:p>
@@ -1107,7 +1107,7 @@
           <a:p>
             <a:fld id="{241EB5C9-1307-BA42-ABA2-0BC069CD8E7F}" type="datetimeFigureOut">
               <a:rPr lang="en-US" smtClean="0"/>
-              <a:t>8/3/2024</a:t>
+              <a:t>8/15/2024</a:t>
             </a:fld>
             <a:endParaRPr lang="en-US"/>
           </a:p>
@@ -1392,7 +1392,7 @@
           <a:p>
             <a:fld id="{241EB5C9-1307-BA42-ABA2-0BC069CD8E7F}" type="datetimeFigureOut">
               <a:rPr lang="en-US" smtClean="0"/>
-              <a:t>8/3/2024</a:t>
+              <a:t>8/15/2024</a:t>
             </a:fld>
             <a:endParaRPr lang="en-US"/>
           </a:p>
@@ -1811,7 +1811,7 @@
           <a:p>
             <a:fld id="{241EB5C9-1307-BA42-ABA2-0BC069CD8E7F}" type="datetimeFigureOut">
               <a:rPr lang="en-US" smtClean="0"/>
-              <a:t>8/3/2024</a:t>
+              <a:t>8/15/2024</a:t>
             </a:fld>
             <a:endParaRPr lang="en-US"/>
           </a:p>
@@ -1928,7 +1928,7 @@
           <a:p>
             <a:fld id="{241EB5C9-1307-BA42-ABA2-0BC069CD8E7F}" type="datetimeFigureOut">
               <a:rPr lang="en-US" smtClean="0"/>
-              <a:t>8/3/2024</a:t>
+              <a:t>8/15/2024</a:t>
             </a:fld>
             <a:endParaRPr lang="en-US"/>
           </a:p>
@@ -2023,7 +2023,7 @@
           <a:p>
             <a:fld id="{241EB5C9-1307-BA42-ABA2-0BC069CD8E7F}" type="datetimeFigureOut">
               <a:rPr lang="en-US" smtClean="0"/>
-              <a:t>8/3/2024</a:t>
+              <a:t>8/15/2024</a:t>
             </a:fld>
             <a:endParaRPr lang="en-US"/>
           </a:p>
@@ -2298,7 +2298,7 @@
           <a:p>
             <a:fld id="{241EB5C9-1307-BA42-ABA2-0BC069CD8E7F}" type="datetimeFigureOut">
               <a:rPr lang="en-US" smtClean="0"/>
-              <a:t>8/3/2024</a:t>
+              <a:t>8/15/2024</a:t>
             </a:fld>
             <a:endParaRPr lang="en-US"/>
           </a:p>
@@ -2550,7 +2550,7 @@
           <a:p>
             <a:fld id="{241EB5C9-1307-BA42-ABA2-0BC069CD8E7F}" type="datetimeFigureOut">
               <a:rPr lang="en-US" smtClean="0"/>
-              <a:t>8/3/2024</a:t>
+              <a:t>8/15/2024</a:t>
             </a:fld>
             <a:endParaRPr lang="en-US"/>
           </a:p>
@@ -2761,7 +2761,7 @@
           <a:p>
             <a:fld id="{241EB5C9-1307-BA42-ABA2-0BC069CD8E7F}" type="datetimeFigureOut">
               <a:rPr lang="en-US" smtClean="0"/>
-              <a:t>8/3/2024</a:t>
+              <a:t>8/15/2024</a:t>
             </a:fld>
             <a:endParaRPr lang="en-US"/>
           </a:p>

</xml_diff>

<commit_message>
Updated figures in slides with correction titles
</commit_message>
<xml_diff>
--- a/LectureSlides/01_PreceptionForScientificVisualization.pptx
+++ b/LectureSlides/01_PreceptionForScientificVisualization.pptx
@@ -54,6 +54,7 @@
     <p:sldId id="304" r:id="rId48"/>
     <p:sldId id="305" r:id="rId49"/>
     <p:sldId id="307" r:id="rId50"/>
+    <p:sldId id="314" r:id="rId51"/>
   </p:sldIdLst>
   <p:sldSz cx="9144000" cy="5143500" type="screen16x9"/>
   <p:notesSz cx="6858000" cy="9144000"/>
@@ -350,7 +351,7 @@
           <a:p>
             <a:fld id="{241EB5C9-1307-BA42-ABA2-0BC069CD8E7F}" type="datetimeFigureOut">
               <a:rPr lang="en-US" smtClean="0"/>
-              <a:t>8/26/2024</a:t>
+              <a:t>8/30/2024</a:t>
             </a:fld>
             <a:endParaRPr lang="en-US"/>
           </a:p>
@@ -518,7 +519,7 @@
           <a:p>
             <a:fld id="{241EB5C9-1307-BA42-ABA2-0BC069CD8E7F}" type="datetimeFigureOut">
               <a:rPr lang="en-US" smtClean="0"/>
-              <a:t>8/26/2024</a:t>
+              <a:t>8/30/2024</a:t>
             </a:fld>
             <a:endParaRPr lang="en-US"/>
           </a:p>
@@ -696,7 +697,7 @@
           <a:p>
             <a:fld id="{241EB5C9-1307-BA42-ABA2-0BC069CD8E7F}" type="datetimeFigureOut">
               <a:rPr lang="en-US" smtClean="0"/>
-              <a:t>8/26/2024</a:t>
+              <a:t>8/30/2024</a:t>
             </a:fld>
             <a:endParaRPr lang="en-US"/>
           </a:p>
@@ -864,7 +865,7 @@
           <a:p>
             <a:fld id="{241EB5C9-1307-BA42-ABA2-0BC069CD8E7F}" type="datetimeFigureOut">
               <a:rPr lang="en-US" smtClean="0"/>
-              <a:t>8/26/2024</a:t>
+              <a:t>8/30/2024</a:t>
             </a:fld>
             <a:endParaRPr lang="en-US"/>
           </a:p>
@@ -1109,7 +1110,7 @@
           <a:p>
             <a:fld id="{241EB5C9-1307-BA42-ABA2-0BC069CD8E7F}" type="datetimeFigureOut">
               <a:rPr lang="en-US" smtClean="0"/>
-              <a:t>8/26/2024</a:t>
+              <a:t>8/30/2024</a:t>
             </a:fld>
             <a:endParaRPr lang="en-US"/>
           </a:p>
@@ -1394,7 +1395,7 @@
           <a:p>
             <a:fld id="{241EB5C9-1307-BA42-ABA2-0BC069CD8E7F}" type="datetimeFigureOut">
               <a:rPr lang="en-US" smtClean="0"/>
-              <a:t>8/26/2024</a:t>
+              <a:t>8/30/2024</a:t>
             </a:fld>
             <a:endParaRPr lang="en-US"/>
           </a:p>
@@ -1813,7 +1814,7 @@
           <a:p>
             <a:fld id="{241EB5C9-1307-BA42-ABA2-0BC069CD8E7F}" type="datetimeFigureOut">
               <a:rPr lang="en-US" smtClean="0"/>
-              <a:t>8/26/2024</a:t>
+              <a:t>8/30/2024</a:t>
             </a:fld>
             <a:endParaRPr lang="en-US"/>
           </a:p>
@@ -1930,7 +1931,7 @@
           <a:p>
             <a:fld id="{241EB5C9-1307-BA42-ABA2-0BC069CD8E7F}" type="datetimeFigureOut">
               <a:rPr lang="en-US" smtClean="0"/>
-              <a:t>8/26/2024</a:t>
+              <a:t>8/30/2024</a:t>
             </a:fld>
             <a:endParaRPr lang="en-US"/>
           </a:p>
@@ -2025,7 +2026,7 @@
           <a:p>
             <a:fld id="{241EB5C9-1307-BA42-ABA2-0BC069CD8E7F}" type="datetimeFigureOut">
               <a:rPr lang="en-US" smtClean="0"/>
-              <a:t>8/26/2024</a:t>
+              <a:t>8/30/2024</a:t>
             </a:fld>
             <a:endParaRPr lang="en-US"/>
           </a:p>
@@ -2300,7 +2301,7 @@
           <a:p>
             <a:fld id="{241EB5C9-1307-BA42-ABA2-0BC069CD8E7F}" type="datetimeFigureOut">
               <a:rPr lang="en-US" smtClean="0"/>
-              <a:t>8/26/2024</a:t>
+              <a:t>8/30/2024</a:t>
             </a:fld>
             <a:endParaRPr lang="en-US"/>
           </a:p>
@@ -2552,7 +2553,7 @@
           <a:p>
             <a:fld id="{241EB5C9-1307-BA42-ABA2-0BC069CD8E7F}" type="datetimeFigureOut">
               <a:rPr lang="en-US" smtClean="0"/>
-              <a:t>8/26/2024</a:t>
+              <a:t>8/30/2024</a:t>
             </a:fld>
             <a:endParaRPr lang="en-US"/>
           </a:p>
@@ -2763,7 +2764,7 @@
           <a:p>
             <a:fld id="{241EB5C9-1307-BA42-ABA2-0BC069CD8E7F}" type="datetimeFigureOut">
               <a:rPr lang="en-US" smtClean="0"/>
-              <a:t>8/26/2024</a:t>
+              <a:t>8/30/2024</a:t>
             </a:fld>
             <a:endParaRPr lang="en-US"/>
           </a:p>
@@ -3308,7 +3309,7 @@
             <a:pPr algn="ctr"/>
             <a:r>
               <a:rPr lang="en-US" sz="1100" dirty="0"/>
-              <a:t>Copyright 2020, 2021, 2022, 2023 2024, Stephen F Elston. All rights reserved</a:t>
+              <a:t>Copyright 2018, 2019, 2020, 2021, 2022, 2023 2024, Stephen F Elston. All rights reserved</a:t>
             </a:r>
             <a:r>
               <a:rPr lang="en-US" dirty="0"/>
@@ -5275,18 +5276,18 @@
             <a:endParaRPr lang="en-US" dirty="0"/>
           </a:p>
           <a:p>
-            <a:pPr marL="0" lvl="0" indent="0">
+            <a:pPr marL="0" lvl="0" indent="0" algn="ctr">
               <a:buNone/>
             </a:pPr>
             <a:r>
-              <a:rPr lang="en-US" b="1" dirty="0">
+              <a:rPr lang="en-US" sz="2800" b="1" dirty="0">
                 <a:solidFill>
                   <a:srgbClr val="C00000"/>
                 </a:solidFill>
               </a:rPr>
-              <a:t>I expect you to use perceptually useful plotting methods for your project!!</a:t>
-            </a:r>
-            <a:endParaRPr b="1" dirty="0">
+              <a:t>I expect you to use good perceptual methodology for creating plots for your project!!</a:t>
+            </a:r>
+            <a:endParaRPr sz="2800" b="1" dirty="0">
               <a:solidFill>
                 <a:srgbClr val="C00000"/>
               </a:solidFill>
@@ -6226,8 +6227,8 @@
           </a:p>
         </p:txBody>
       </p:sp>
-      <mc:AlternateContent xmlns:mc="http://schemas.openxmlformats.org/markup-compatibility/2006">
-        <mc:Choice xmlns:a14="http://schemas.microsoft.com/office/drawing/2010/main" Requires="a14">
+      <mc:AlternateContent xmlns:mc="http://schemas.openxmlformats.org/markup-compatibility/2006" xmlns:a14="http://schemas.microsoft.com/office/drawing/2010/main">
+        <mc:Choice Requires="a14">
           <p:sp>
             <p:nvSpPr>
               <p:cNvPr id="3" name="Content Placeholder 2"/>
@@ -6356,7 +6357,7 @@
             </p:txBody>
           </p:sp>
         </mc:Choice>
-        <mc:Fallback>
+        <mc:Fallback xmlns="">
           <p:sp>
             <p:nvSpPr>
               <p:cNvPr id="3" name="Content Placeholder 2"/>
@@ -7370,15 +7371,7 @@
             </a:pPr>
             <a:r>
               <a:rPr lang="en-US" dirty="0"/>
-              <a:t>Can you see the pattern that </a:t>
-            </a:r>
-            <a:r>
-              <a:rPr lang="en-US" dirty="0" err="1"/>
-              <a:t>emmerges</a:t>
-            </a:r>
-            <a:r>
-              <a:rPr lang="en-US" dirty="0"/>
-              <a:t>? </a:t>
+              <a:t>Can you see the pattern that emerges? </a:t>
             </a:r>
           </a:p>
         </p:txBody>
@@ -7590,6 +7583,1134 @@
           <a:xfrm>
             <a:off x="457202" y="1358096"/>
             <a:ext cx="3663385" cy="3236527"/>
+          </a:xfrm>
+          <a:prstGeom prst="rect">
+            <a:avLst/>
+          </a:prstGeom>
+        </p:spPr>
+        <p:txBody>
+          <a:bodyPr>
+            <a:normAutofit fontScale="92500" lnSpcReduction="10000"/>
+          </a:bodyPr>
+          <a:lstStyle>
+            <a:lvl1pPr marL="342900" indent="-342900" algn="l" defTabSz="342900" rtl="0" eaLnBrk="1" latinLnBrk="0" hangingPunct="1">
+              <a:spcBef>
+                <a:spcPct val="20000"/>
+              </a:spcBef>
+              <a:buFont typeface="Arial"/>
+              <a:buChar char="•"/>
+              <a:defRPr sz="2400" kern="1200">
+                <a:solidFill>
+                  <a:schemeClr val="tx1"/>
+                </a:solidFill>
+                <a:latin typeface="+mn-lt"/>
+                <a:ea typeface="+mn-ea"/>
+                <a:cs typeface="+mn-cs"/>
+              </a:defRPr>
+            </a:lvl1pPr>
+            <a:lvl2pPr marL="685800" indent="-342900" algn="l" defTabSz="342900" rtl="0" eaLnBrk="1" latinLnBrk="0" hangingPunct="1">
+              <a:spcBef>
+                <a:spcPct val="20000"/>
+              </a:spcBef>
+              <a:buFont typeface="Arial"/>
+              <a:buChar char="–"/>
+              <a:defRPr sz="2100" kern="1200">
+                <a:solidFill>
+                  <a:schemeClr val="tx1"/>
+                </a:solidFill>
+                <a:latin typeface="+mn-lt"/>
+                <a:ea typeface="+mn-ea"/>
+                <a:cs typeface="+mn-cs"/>
+              </a:defRPr>
+            </a:lvl2pPr>
+            <a:lvl3pPr marL="1028700" indent="-342900" algn="l" defTabSz="342900" rtl="0" eaLnBrk="1" latinLnBrk="0" hangingPunct="1">
+              <a:spcBef>
+                <a:spcPct val="20000"/>
+              </a:spcBef>
+              <a:buFont typeface="Arial"/>
+              <a:buChar char="•"/>
+              <a:defRPr sz="1800" kern="1200">
+                <a:solidFill>
+                  <a:schemeClr val="tx1"/>
+                </a:solidFill>
+                <a:latin typeface="+mn-lt"/>
+                <a:ea typeface="+mn-ea"/>
+                <a:cs typeface="+mn-cs"/>
+              </a:defRPr>
+            </a:lvl3pPr>
+            <a:lvl4pPr marL="1371600" indent="-342900" algn="l" defTabSz="342900" rtl="0" eaLnBrk="1" latinLnBrk="0" hangingPunct="1">
+              <a:spcBef>
+                <a:spcPct val="20000"/>
+              </a:spcBef>
+              <a:buFont typeface="Arial"/>
+              <a:buChar char="–"/>
+              <a:defRPr sz="1500" kern="1200">
+                <a:solidFill>
+                  <a:schemeClr val="tx1"/>
+                </a:solidFill>
+                <a:latin typeface="+mn-lt"/>
+                <a:ea typeface="+mn-ea"/>
+                <a:cs typeface="+mn-cs"/>
+              </a:defRPr>
+            </a:lvl4pPr>
+            <a:lvl5pPr marL="1714500" indent="-342900" algn="l" defTabSz="342900" rtl="0" eaLnBrk="1" latinLnBrk="0" hangingPunct="1">
+              <a:spcBef>
+                <a:spcPct val="20000"/>
+              </a:spcBef>
+              <a:buFont typeface="Arial"/>
+              <a:buChar char="»"/>
+              <a:defRPr sz="1500" kern="1200">
+                <a:solidFill>
+                  <a:schemeClr val="tx1"/>
+                </a:solidFill>
+                <a:latin typeface="+mn-lt"/>
+                <a:ea typeface="+mn-ea"/>
+                <a:cs typeface="+mn-cs"/>
+              </a:defRPr>
+            </a:lvl5pPr>
+            <a:lvl6pPr marL="2057400" indent="-342900" algn="l" defTabSz="342900" rtl="0" eaLnBrk="1" latinLnBrk="0" hangingPunct="1">
+              <a:spcBef>
+                <a:spcPct val="20000"/>
+              </a:spcBef>
+              <a:buFont typeface="Arial"/>
+              <a:buChar char="•"/>
+              <a:defRPr sz="1500" kern="1200">
+                <a:solidFill>
+                  <a:schemeClr val="tx1"/>
+                </a:solidFill>
+                <a:latin typeface="+mn-lt"/>
+                <a:ea typeface="+mn-ea"/>
+                <a:cs typeface="+mn-cs"/>
+              </a:defRPr>
+            </a:lvl6pPr>
+            <a:lvl7pPr marL="2400300" indent="-342900" algn="l" defTabSz="342900" rtl="0" eaLnBrk="1" latinLnBrk="0" hangingPunct="1">
+              <a:spcBef>
+                <a:spcPct val="20000"/>
+              </a:spcBef>
+              <a:buFont typeface="Arial"/>
+              <a:buChar char="•"/>
+              <a:defRPr sz="1500" kern="1200">
+                <a:solidFill>
+                  <a:schemeClr val="tx1"/>
+                </a:solidFill>
+                <a:latin typeface="+mn-lt"/>
+                <a:ea typeface="+mn-ea"/>
+                <a:cs typeface="+mn-cs"/>
+              </a:defRPr>
+            </a:lvl7pPr>
+            <a:lvl8pPr marL="2743200" indent="-342900" algn="l" defTabSz="342900" rtl="0" eaLnBrk="1" latinLnBrk="0" hangingPunct="1">
+              <a:spcBef>
+                <a:spcPct val="20000"/>
+              </a:spcBef>
+              <a:buFont typeface="Arial"/>
+              <a:buChar char="•"/>
+              <a:defRPr sz="1500" kern="1200">
+                <a:solidFill>
+                  <a:schemeClr val="tx1"/>
+                </a:solidFill>
+                <a:latin typeface="+mn-lt"/>
+                <a:ea typeface="+mn-ea"/>
+                <a:cs typeface="+mn-cs"/>
+              </a:defRPr>
+            </a:lvl8pPr>
+            <a:lvl9pPr marL="3086100" indent="-342900" algn="l" defTabSz="342900" rtl="0" eaLnBrk="1" latinLnBrk="0" hangingPunct="1">
+              <a:spcBef>
+                <a:spcPct val="20000"/>
+              </a:spcBef>
+              <a:buFont typeface="Arial"/>
+              <a:buChar char="•"/>
+              <a:defRPr sz="1500" kern="1200">
+                <a:solidFill>
+                  <a:schemeClr val="tx1"/>
+                </a:solidFill>
+                <a:latin typeface="+mn-lt"/>
+                <a:ea typeface="+mn-ea"/>
+                <a:cs typeface="+mn-cs"/>
+              </a:defRPr>
+            </a:lvl9pPr>
+          </a:lstStyle>
+          <a:p>
+            <a:pPr marL="0" indent="0">
+              <a:buNone/>
+            </a:pPr>
+            <a:r>
+              <a:rPr lang="en-US" dirty="0"/>
+              <a:t>Large color pallet reduces perception</a:t>
+            </a:r>
+          </a:p>
+          <a:p>
+            <a:pPr>
+              <a:buFont typeface="Arial" panose="020B0604020202020204" pitchFamily="34" charset="0"/>
+              <a:buChar char="•"/>
+            </a:pPr>
+            <a:r>
+              <a:rPr lang="en-US" dirty="0"/>
+              <a:t>This plot includes too many similar colors for large number of categories</a:t>
+            </a:r>
+          </a:p>
+          <a:p>
+            <a:pPr>
+              <a:buFont typeface="Arial" panose="020B0604020202020204" pitchFamily="34" charset="0"/>
+              <a:buChar char="•"/>
+            </a:pPr>
+            <a:r>
+              <a:rPr lang="en-US" dirty="0"/>
+              <a:t>Virtually impossible to determine where autos from each make fall on the plot </a:t>
+            </a:r>
+          </a:p>
+        </p:txBody>
+      </p:sp>
+      <p:pic>
+        <p:nvPicPr>
+          <p:cNvPr id="6" name="Picture 5">
+            <a:extLst>
+              <a:ext uri="{FF2B5EF4-FFF2-40B4-BE49-F238E27FC236}">
+                <a16:creationId xmlns:a16="http://schemas.microsoft.com/office/drawing/2014/main" id="{06B7D722-712E-6BDF-09E4-1BA64EF0454B}"/>
+              </a:ext>
+            </a:extLst>
+          </p:cNvPr>
+          <p:cNvPicPr>
+            <a:picLocks noChangeAspect="1"/>
+          </p:cNvPicPr>
+          <p:nvPr/>
+        </p:nvPicPr>
+        <p:blipFill>
+          <a:blip r:embed="rId2"/>
+          <a:stretch>
+            <a:fillRect/>
+          </a:stretch>
+        </p:blipFill>
+        <p:spPr>
+          <a:xfrm>
+            <a:off x="4265108" y="860385"/>
+            <a:ext cx="4878892" cy="4109012"/>
+          </a:xfrm>
+          <a:prstGeom prst="rect">
+            <a:avLst/>
+          </a:prstGeom>
+        </p:spPr>
+      </p:pic>
+    </p:spTree>
+    <p:extLst>
+      <p:ext uri="{BB962C8B-B14F-4D97-AF65-F5344CB8AC3E}">
+        <p14:creationId xmlns:p14="http://schemas.microsoft.com/office/powerpoint/2010/main" val="929278502"/>
+      </p:ext>
+    </p:extLst>
+  </p:cSld>
+  <p:clrMapOvr>
+    <a:masterClrMapping/>
+  </p:clrMapOvr>
+</p:sld>
+</file>
+
+<file path=ppt/slides/slide33.xml><?xml version="1.0" encoding="utf-8"?>
+<p:sld xmlns:a="http://schemas.openxmlformats.org/drawingml/2006/main" xmlns:r="http://schemas.openxmlformats.org/officeDocument/2006/relationships" xmlns:p="http://schemas.openxmlformats.org/presentationml/2006/main">
+  <p:cSld>
+    <p:spTree>
+      <p:nvGrpSpPr>
+        <p:cNvPr id="1" name=""/>
+        <p:cNvGrpSpPr/>
+        <p:nvPr/>
+      </p:nvGrpSpPr>
+      <p:grpSpPr>
+        <a:xfrm>
+          <a:off x="0" y="0"/>
+          <a:ext cx="0" cy="0"/>
+          <a:chOff x="0" y="0"/>
+          <a:chExt cx="0" cy="0"/>
+        </a:xfrm>
+      </p:grpSpPr>
+      <p:sp>
+        <p:nvSpPr>
+          <p:cNvPr id="2" name="Title 1"/>
+          <p:cNvSpPr>
+            <a:spLocks noGrp="1"/>
+          </p:cNvSpPr>
+          <p:nvPr>
+            <p:ph type="title"/>
+          </p:nvPr>
+        </p:nvSpPr>
+        <p:spPr/>
+        <p:txBody>
+          <a:bodyPr/>
+          <a:lstStyle/>
+          <a:p>
+            <a:pPr marL="0" lvl="0" indent="0">
+              <a:buNone/>
+            </a:pPr>
+            <a:r>
+              <a:rPr lang="en-US" dirty="0"/>
+              <a:t>Limits of Color</a:t>
+            </a:r>
+            <a:endParaRPr dirty="0"/>
+          </a:p>
+        </p:txBody>
+      </p:sp>
+      <p:sp>
+        <p:nvSpPr>
+          <p:cNvPr id="3" name="Text Placeholder 3">
+            <a:extLst>
+              <a:ext uri="{FF2B5EF4-FFF2-40B4-BE49-F238E27FC236}">
+                <a16:creationId xmlns:a16="http://schemas.microsoft.com/office/drawing/2014/main" id="{BBC4F043-E962-4014-CE75-99D8E08E0C5B}"/>
+              </a:ext>
+            </a:extLst>
+          </p:cNvPr>
+          <p:cNvSpPr txBox="1">
+            <a:spLocks/>
+          </p:cNvSpPr>
+          <p:nvPr/>
+        </p:nvSpPr>
+        <p:spPr>
+          <a:xfrm>
+            <a:off x="387754" y="910542"/>
+            <a:ext cx="8513178" cy="1207625"/>
+          </a:xfrm>
+          <a:prstGeom prst="rect">
+            <a:avLst/>
+          </a:prstGeom>
+        </p:spPr>
+        <p:txBody>
+          <a:bodyPr>
+            <a:normAutofit lnSpcReduction="10000"/>
+          </a:bodyPr>
+          <a:lstStyle>
+            <a:lvl1pPr marL="342900" indent="-342900" algn="l" defTabSz="342900" rtl="0" eaLnBrk="1" latinLnBrk="0" hangingPunct="1">
+              <a:spcBef>
+                <a:spcPct val="20000"/>
+              </a:spcBef>
+              <a:buFont typeface="Arial"/>
+              <a:buChar char="•"/>
+              <a:defRPr sz="2400" kern="1200">
+                <a:solidFill>
+                  <a:schemeClr val="tx1"/>
+                </a:solidFill>
+                <a:latin typeface="+mn-lt"/>
+                <a:ea typeface="+mn-ea"/>
+                <a:cs typeface="+mn-cs"/>
+              </a:defRPr>
+            </a:lvl1pPr>
+            <a:lvl2pPr marL="685800" indent="-342900" algn="l" defTabSz="342900" rtl="0" eaLnBrk="1" latinLnBrk="0" hangingPunct="1">
+              <a:spcBef>
+                <a:spcPct val="20000"/>
+              </a:spcBef>
+              <a:buFont typeface="Arial"/>
+              <a:buChar char="–"/>
+              <a:defRPr sz="2100" kern="1200">
+                <a:solidFill>
+                  <a:schemeClr val="tx1"/>
+                </a:solidFill>
+                <a:latin typeface="+mn-lt"/>
+                <a:ea typeface="+mn-ea"/>
+                <a:cs typeface="+mn-cs"/>
+              </a:defRPr>
+            </a:lvl2pPr>
+            <a:lvl3pPr marL="1028700" indent="-342900" algn="l" defTabSz="342900" rtl="0" eaLnBrk="1" latinLnBrk="0" hangingPunct="1">
+              <a:spcBef>
+                <a:spcPct val="20000"/>
+              </a:spcBef>
+              <a:buFont typeface="Arial"/>
+              <a:buChar char="•"/>
+              <a:defRPr sz="1800" kern="1200">
+                <a:solidFill>
+                  <a:schemeClr val="tx1"/>
+                </a:solidFill>
+                <a:latin typeface="+mn-lt"/>
+                <a:ea typeface="+mn-ea"/>
+                <a:cs typeface="+mn-cs"/>
+              </a:defRPr>
+            </a:lvl3pPr>
+            <a:lvl4pPr marL="1371600" indent="-342900" algn="l" defTabSz="342900" rtl="0" eaLnBrk="1" latinLnBrk="0" hangingPunct="1">
+              <a:spcBef>
+                <a:spcPct val="20000"/>
+              </a:spcBef>
+              <a:buFont typeface="Arial"/>
+              <a:buChar char="–"/>
+              <a:defRPr sz="1500" kern="1200">
+                <a:solidFill>
+                  <a:schemeClr val="tx1"/>
+                </a:solidFill>
+                <a:latin typeface="+mn-lt"/>
+                <a:ea typeface="+mn-ea"/>
+                <a:cs typeface="+mn-cs"/>
+              </a:defRPr>
+            </a:lvl4pPr>
+            <a:lvl5pPr marL="1714500" indent="-342900" algn="l" defTabSz="342900" rtl="0" eaLnBrk="1" latinLnBrk="0" hangingPunct="1">
+              <a:spcBef>
+                <a:spcPct val="20000"/>
+              </a:spcBef>
+              <a:buFont typeface="Arial"/>
+              <a:buChar char="»"/>
+              <a:defRPr sz="1500" kern="1200">
+                <a:solidFill>
+                  <a:schemeClr val="tx1"/>
+                </a:solidFill>
+                <a:latin typeface="+mn-lt"/>
+                <a:ea typeface="+mn-ea"/>
+                <a:cs typeface="+mn-cs"/>
+              </a:defRPr>
+            </a:lvl5pPr>
+            <a:lvl6pPr marL="2057400" indent="-342900" algn="l" defTabSz="342900" rtl="0" eaLnBrk="1" latinLnBrk="0" hangingPunct="1">
+              <a:spcBef>
+                <a:spcPct val="20000"/>
+              </a:spcBef>
+              <a:buFont typeface="Arial"/>
+              <a:buChar char="•"/>
+              <a:defRPr sz="1500" kern="1200">
+                <a:solidFill>
+                  <a:schemeClr val="tx1"/>
+                </a:solidFill>
+                <a:latin typeface="+mn-lt"/>
+                <a:ea typeface="+mn-ea"/>
+                <a:cs typeface="+mn-cs"/>
+              </a:defRPr>
+            </a:lvl6pPr>
+            <a:lvl7pPr marL="2400300" indent="-342900" algn="l" defTabSz="342900" rtl="0" eaLnBrk="1" latinLnBrk="0" hangingPunct="1">
+              <a:spcBef>
+                <a:spcPct val="20000"/>
+              </a:spcBef>
+              <a:buFont typeface="Arial"/>
+              <a:buChar char="•"/>
+              <a:defRPr sz="1500" kern="1200">
+                <a:solidFill>
+                  <a:schemeClr val="tx1"/>
+                </a:solidFill>
+                <a:latin typeface="+mn-lt"/>
+                <a:ea typeface="+mn-ea"/>
+                <a:cs typeface="+mn-cs"/>
+              </a:defRPr>
+            </a:lvl7pPr>
+            <a:lvl8pPr marL="2743200" indent="-342900" algn="l" defTabSz="342900" rtl="0" eaLnBrk="1" latinLnBrk="0" hangingPunct="1">
+              <a:spcBef>
+                <a:spcPct val="20000"/>
+              </a:spcBef>
+              <a:buFont typeface="Arial"/>
+              <a:buChar char="•"/>
+              <a:defRPr sz="1500" kern="1200">
+                <a:solidFill>
+                  <a:schemeClr val="tx1"/>
+                </a:solidFill>
+                <a:latin typeface="+mn-lt"/>
+                <a:ea typeface="+mn-ea"/>
+                <a:cs typeface="+mn-cs"/>
+              </a:defRPr>
+            </a:lvl8pPr>
+            <a:lvl9pPr marL="3086100" indent="-342900" algn="l" defTabSz="342900" rtl="0" eaLnBrk="1" latinLnBrk="0" hangingPunct="1">
+              <a:spcBef>
+                <a:spcPct val="20000"/>
+              </a:spcBef>
+              <a:buFont typeface="Arial"/>
+              <a:buChar char="•"/>
+              <a:defRPr sz="1500" kern="1200">
+                <a:solidFill>
+                  <a:schemeClr val="tx1"/>
+                </a:solidFill>
+                <a:latin typeface="+mn-lt"/>
+                <a:ea typeface="+mn-ea"/>
+                <a:cs typeface="+mn-cs"/>
+              </a:defRPr>
+            </a:lvl9pPr>
+          </a:lstStyle>
+          <a:p>
+            <a:pPr marL="0" indent="0">
+              <a:buNone/>
+            </a:pPr>
+            <a:r>
+              <a:rPr lang="en-US" dirty="0"/>
+              <a:t>Ordered box plot is an alternative to color and shape for variables with too many categories   </a:t>
+            </a:r>
+          </a:p>
+          <a:p>
+            <a:r>
+              <a:rPr lang="en-US" dirty="0"/>
+              <a:t>Ordering improves perception, i.e. like ordered bar chart</a:t>
+            </a:r>
+          </a:p>
+        </p:txBody>
+      </p:sp>
+      <p:pic>
+        <p:nvPicPr>
+          <p:cNvPr id="5" name="Picture 4">
+            <a:extLst>
+              <a:ext uri="{FF2B5EF4-FFF2-40B4-BE49-F238E27FC236}">
+                <a16:creationId xmlns:a16="http://schemas.microsoft.com/office/drawing/2014/main" id="{470F5102-101E-3820-1B91-98B8A85B96F4}"/>
+              </a:ext>
+            </a:extLst>
+          </p:cNvPr>
+          <p:cNvPicPr>
+            <a:picLocks noChangeAspect="1"/>
+          </p:cNvPicPr>
+          <p:nvPr/>
+        </p:nvPicPr>
+        <p:blipFill>
+          <a:blip r:embed="rId2"/>
+          <a:stretch>
+            <a:fillRect/>
+          </a:stretch>
+        </p:blipFill>
+        <p:spPr>
+          <a:xfrm>
+            <a:off x="4409954" y="1964889"/>
+            <a:ext cx="4109655" cy="3142486"/>
+          </a:xfrm>
+          <a:prstGeom prst="rect">
+            <a:avLst/>
+          </a:prstGeom>
+        </p:spPr>
+      </p:pic>
+      <p:pic>
+        <p:nvPicPr>
+          <p:cNvPr id="8" name="Picture 7">
+            <a:extLst>
+              <a:ext uri="{FF2B5EF4-FFF2-40B4-BE49-F238E27FC236}">
+                <a16:creationId xmlns:a16="http://schemas.microsoft.com/office/drawing/2014/main" id="{493BB364-7770-0D6E-2F56-3A68DD328653}"/>
+              </a:ext>
+            </a:extLst>
+          </p:cNvPr>
+          <p:cNvPicPr>
+            <a:picLocks noChangeAspect="1"/>
+          </p:cNvPicPr>
+          <p:nvPr/>
+        </p:nvPicPr>
+        <p:blipFill>
+          <a:blip r:embed="rId3"/>
+          <a:stretch>
+            <a:fillRect/>
+          </a:stretch>
+        </p:blipFill>
+        <p:spPr>
+          <a:xfrm>
+            <a:off x="310589" y="2000389"/>
+            <a:ext cx="4049208" cy="3079319"/>
+          </a:xfrm>
+          <a:prstGeom prst="rect">
+            <a:avLst/>
+          </a:prstGeom>
+        </p:spPr>
+      </p:pic>
+    </p:spTree>
+    <p:extLst>
+      <p:ext uri="{BB962C8B-B14F-4D97-AF65-F5344CB8AC3E}">
+        <p14:creationId xmlns:p14="http://schemas.microsoft.com/office/powerpoint/2010/main" val="3274263035"/>
+      </p:ext>
+    </p:extLst>
+  </p:cSld>
+  <p:clrMapOvr>
+    <a:masterClrMapping/>
+  </p:clrMapOvr>
+</p:sld>
+</file>
+
+<file path=ppt/slides/slide34.xml><?xml version="1.0" encoding="utf-8"?>
+<p:sld xmlns:a="http://schemas.openxmlformats.org/drawingml/2006/main" xmlns:r="http://schemas.openxmlformats.org/officeDocument/2006/relationships" xmlns:p="http://schemas.openxmlformats.org/presentationml/2006/main">
+  <p:cSld>
+    <p:spTree>
+      <p:nvGrpSpPr>
+        <p:cNvPr id="1" name=""/>
+        <p:cNvGrpSpPr/>
+        <p:nvPr/>
+      </p:nvGrpSpPr>
+      <p:grpSpPr>
+        <a:xfrm>
+          <a:off x="0" y="0"/>
+          <a:ext cx="0" cy="0"/>
+          <a:chOff x="0" y="0"/>
+          <a:chExt cx="0" cy="0"/>
+        </a:xfrm>
+      </p:grpSpPr>
+      <p:sp>
+        <p:nvSpPr>
+          <p:cNvPr id="2" name="Title 1"/>
+          <p:cNvSpPr>
+            <a:spLocks noGrp="1"/>
+          </p:cNvSpPr>
+          <p:nvPr>
+            <p:ph type="title"/>
+          </p:nvPr>
+        </p:nvSpPr>
+        <p:spPr/>
+        <p:txBody>
+          <a:bodyPr/>
+          <a:lstStyle/>
+          <a:p>
+            <a:pPr marL="0" lvl="0" indent="0">
+              <a:buNone/>
+            </a:pPr>
+            <a:r>
+              <a:t>Marker Size</a:t>
+            </a:r>
+          </a:p>
+        </p:txBody>
+      </p:sp>
+      <p:sp>
+        <p:nvSpPr>
+          <p:cNvPr id="3" name="Content Placeholder 2"/>
+          <p:cNvSpPr>
+            <a:spLocks noGrp="1"/>
+          </p:cNvSpPr>
+          <p:nvPr>
+            <p:ph idx="1"/>
+          </p:nvPr>
+        </p:nvSpPr>
+        <p:spPr/>
+        <p:txBody>
+          <a:bodyPr>
+            <a:normAutofit fontScale="92500" lnSpcReduction="10000"/>
+          </a:bodyPr>
+          <a:lstStyle/>
+          <a:p>
+            <a:pPr marL="0" lvl="0" indent="0">
+              <a:buNone/>
+            </a:pPr>
+            <a:r>
+              <a:rPr b="1" dirty="0"/>
+              <a:t>Marker size</a:t>
+            </a:r>
+            <a:r>
+              <a:rPr dirty="0"/>
+              <a:t> is moderately effective aesthetic</a:t>
+            </a:r>
+          </a:p>
+          <a:p>
+            <a:pPr lvl="0"/>
+            <a:r>
+              <a:rPr dirty="0"/>
+              <a:t>Used properly, marker size can highlight important relationships in complex data sets</a:t>
+            </a:r>
+          </a:p>
+          <a:p>
+            <a:pPr lvl="1"/>
+            <a:r>
+              <a:rPr dirty="0"/>
+              <a:t>Numeric values</a:t>
+            </a:r>
+          </a:p>
+          <a:p>
+            <a:pPr lvl="1"/>
+            <a:r>
+              <a:rPr dirty="0"/>
+              <a:t>Ordinal variables</a:t>
+            </a:r>
+          </a:p>
+          <a:p>
+            <a:pPr lvl="0"/>
+            <a:r>
+              <a:rPr dirty="0"/>
+              <a:t>Viewers can generally perceive relative differences, but not actual values</a:t>
+            </a:r>
+          </a:p>
+          <a:p>
+            <a:pPr lvl="0"/>
+            <a:r>
+              <a:rPr dirty="0"/>
+              <a:t>Small size differences are not perceptible</a:t>
+            </a:r>
+          </a:p>
+          <a:p>
+            <a:pPr lvl="1"/>
+            <a:r>
+              <a:rPr dirty="0"/>
+              <a:t>Only relative relationship in numeric variables</a:t>
+            </a:r>
+          </a:p>
+          <a:p>
+            <a:pPr lvl="1"/>
+            <a:r>
+              <a:rPr dirty="0"/>
+              <a:t>Limited steps of </a:t>
+            </a:r>
+            <a:r>
+              <a:rPr lang="en-US" dirty="0" err="1"/>
+              <a:t>ordianal</a:t>
+            </a:r>
+            <a:r>
+              <a:rPr dirty="0"/>
+              <a:t> variables</a:t>
+            </a:r>
+          </a:p>
+        </p:txBody>
+      </p:sp>
+    </p:spTree>
+  </p:cSld>
+  <p:clrMapOvr>
+    <a:masterClrMapping/>
+  </p:clrMapOvr>
+</p:sld>
+</file>
+
+<file path=ppt/slides/slide35.xml><?xml version="1.0" encoding="utf-8"?>
+<p:sld xmlns:a="http://schemas.openxmlformats.org/drawingml/2006/main" xmlns:r="http://schemas.openxmlformats.org/officeDocument/2006/relationships" xmlns:p="http://schemas.openxmlformats.org/presentationml/2006/main">
+  <p:cSld>
+    <p:spTree>
+      <p:nvGrpSpPr>
+        <p:cNvPr id="1" name=""/>
+        <p:cNvGrpSpPr/>
+        <p:nvPr/>
+      </p:nvGrpSpPr>
+      <p:grpSpPr>
+        <a:xfrm>
+          <a:off x="0" y="0"/>
+          <a:ext cx="0" cy="0"/>
+          <a:chOff x="0" y="0"/>
+          <a:chExt cx="0" cy="0"/>
+        </a:xfrm>
+      </p:grpSpPr>
+      <p:sp>
+        <p:nvSpPr>
+          <p:cNvPr id="2" name="Title 1"/>
+          <p:cNvSpPr>
+            <a:spLocks noGrp="1"/>
+          </p:cNvSpPr>
+          <p:nvPr>
+            <p:ph type="title"/>
+          </p:nvPr>
+        </p:nvSpPr>
+        <p:spPr/>
+        <p:txBody>
+          <a:bodyPr>
+            <a:normAutofit fontScale="90000"/>
+          </a:bodyPr>
+          <a:lstStyle/>
+          <a:p>
+            <a:pPr marL="0" lvl="0" indent="0">
+              <a:buNone/>
+            </a:pPr>
+            <a:r>
+              <a:t>Engine Size by Marker Size and Price by Sequential Color Palette</a:t>
+            </a:r>
+          </a:p>
+        </p:txBody>
+      </p:sp>
+      <p:pic>
+        <p:nvPicPr>
+          <p:cNvPr id="5" name="Picture 4">
+            <a:extLst>
+              <a:ext uri="{FF2B5EF4-FFF2-40B4-BE49-F238E27FC236}">
+                <a16:creationId xmlns:a16="http://schemas.microsoft.com/office/drawing/2014/main" id="{1B234609-BBC2-A19D-880C-BADCFEAC28D2}"/>
+              </a:ext>
+            </a:extLst>
+          </p:cNvPr>
+          <p:cNvPicPr>
+            <a:picLocks noChangeAspect="1"/>
+          </p:cNvPicPr>
+          <p:nvPr/>
+        </p:nvPicPr>
+        <p:blipFill>
+          <a:blip r:embed="rId2"/>
+          <a:stretch>
+            <a:fillRect/>
+          </a:stretch>
+        </p:blipFill>
+        <p:spPr>
+          <a:xfrm>
+            <a:off x="4915643" y="1108848"/>
+            <a:ext cx="3933785" cy="4034652"/>
+          </a:xfrm>
+          <a:prstGeom prst="rect">
+            <a:avLst/>
+          </a:prstGeom>
+        </p:spPr>
+      </p:pic>
+      <p:sp>
+        <p:nvSpPr>
+          <p:cNvPr id="3" name="Text Placeholder 3">
+            <a:extLst>
+              <a:ext uri="{FF2B5EF4-FFF2-40B4-BE49-F238E27FC236}">
+                <a16:creationId xmlns:a16="http://schemas.microsoft.com/office/drawing/2014/main" id="{97E3AB7E-43EF-6732-9DAC-40E0B6B49A48}"/>
+              </a:ext>
+            </a:extLst>
+          </p:cNvPr>
+          <p:cNvSpPr txBox="1">
+            <a:spLocks/>
+          </p:cNvSpPr>
+          <p:nvPr/>
+        </p:nvSpPr>
+        <p:spPr>
+          <a:xfrm>
+            <a:off x="457202" y="1358096"/>
+            <a:ext cx="4357866" cy="3236527"/>
+          </a:xfrm>
+          <a:prstGeom prst="rect">
+            <a:avLst/>
+          </a:prstGeom>
+        </p:spPr>
+        <p:txBody>
+          <a:bodyPr>
+            <a:normAutofit lnSpcReduction="10000"/>
+          </a:bodyPr>
+          <a:lstStyle>
+            <a:lvl1pPr marL="342900" indent="-342900" algn="l" defTabSz="342900" rtl="0" eaLnBrk="1" latinLnBrk="0" hangingPunct="1">
+              <a:spcBef>
+                <a:spcPct val="20000"/>
+              </a:spcBef>
+              <a:buFont typeface="Arial"/>
+              <a:buChar char="•"/>
+              <a:defRPr sz="2400" kern="1200">
+                <a:solidFill>
+                  <a:schemeClr val="tx1"/>
+                </a:solidFill>
+                <a:latin typeface="+mn-lt"/>
+                <a:ea typeface="+mn-ea"/>
+                <a:cs typeface="+mn-cs"/>
+              </a:defRPr>
+            </a:lvl1pPr>
+            <a:lvl2pPr marL="685800" indent="-342900" algn="l" defTabSz="342900" rtl="0" eaLnBrk="1" latinLnBrk="0" hangingPunct="1">
+              <a:spcBef>
+                <a:spcPct val="20000"/>
+              </a:spcBef>
+              <a:buFont typeface="Arial"/>
+              <a:buChar char="–"/>
+              <a:defRPr sz="2100" kern="1200">
+                <a:solidFill>
+                  <a:schemeClr val="tx1"/>
+                </a:solidFill>
+                <a:latin typeface="+mn-lt"/>
+                <a:ea typeface="+mn-ea"/>
+                <a:cs typeface="+mn-cs"/>
+              </a:defRPr>
+            </a:lvl2pPr>
+            <a:lvl3pPr marL="1028700" indent="-342900" algn="l" defTabSz="342900" rtl="0" eaLnBrk="1" latinLnBrk="0" hangingPunct="1">
+              <a:spcBef>
+                <a:spcPct val="20000"/>
+              </a:spcBef>
+              <a:buFont typeface="Arial"/>
+              <a:buChar char="•"/>
+              <a:defRPr sz="1800" kern="1200">
+                <a:solidFill>
+                  <a:schemeClr val="tx1"/>
+                </a:solidFill>
+                <a:latin typeface="+mn-lt"/>
+                <a:ea typeface="+mn-ea"/>
+                <a:cs typeface="+mn-cs"/>
+              </a:defRPr>
+            </a:lvl3pPr>
+            <a:lvl4pPr marL="1371600" indent="-342900" algn="l" defTabSz="342900" rtl="0" eaLnBrk="1" latinLnBrk="0" hangingPunct="1">
+              <a:spcBef>
+                <a:spcPct val="20000"/>
+              </a:spcBef>
+              <a:buFont typeface="Arial"/>
+              <a:buChar char="–"/>
+              <a:defRPr sz="1500" kern="1200">
+                <a:solidFill>
+                  <a:schemeClr val="tx1"/>
+                </a:solidFill>
+                <a:latin typeface="+mn-lt"/>
+                <a:ea typeface="+mn-ea"/>
+                <a:cs typeface="+mn-cs"/>
+              </a:defRPr>
+            </a:lvl4pPr>
+            <a:lvl5pPr marL="1714500" indent="-342900" algn="l" defTabSz="342900" rtl="0" eaLnBrk="1" latinLnBrk="0" hangingPunct="1">
+              <a:spcBef>
+                <a:spcPct val="20000"/>
+              </a:spcBef>
+              <a:buFont typeface="Arial"/>
+              <a:buChar char="»"/>
+              <a:defRPr sz="1500" kern="1200">
+                <a:solidFill>
+                  <a:schemeClr val="tx1"/>
+                </a:solidFill>
+                <a:latin typeface="+mn-lt"/>
+                <a:ea typeface="+mn-ea"/>
+                <a:cs typeface="+mn-cs"/>
+              </a:defRPr>
+            </a:lvl5pPr>
+            <a:lvl6pPr marL="2057400" indent="-342900" algn="l" defTabSz="342900" rtl="0" eaLnBrk="1" latinLnBrk="0" hangingPunct="1">
+              <a:spcBef>
+                <a:spcPct val="20000"/>
+              </a:spcBef>
+              <a:buFont typeface="Arial"/>
+              <a:buChar char="•"/>
+              <a:defRPr sz="1500" kern="1200">
+                <a:solidFill>
+                  <a:schemeClr val="tx1"/>
+                </a:solidFill>
+                <a:latin typeface="+mn-lt"/>
+                <a:ea typeface="+mn-ea"/>
+                <a:cs typeface="+mn-cs"/>
+              </a:defRPr>
+            </a:lvl6pPr>
+            <a:lvl7pPr marL="2400300" indent="-342900" algn="l" defTabSz="342900" rtl="0" eaLnBrk="1" latinLnBrk="0" hangingPunct="1">
+              <a:spcBef>
+                <a:spcPct val="20000"/>
+              </a:spcBef>
+              <a:buFont typeface="Arial"/>
+              <a:buChar char="•"/>
+              <a:defRPr sz="1500" kern="1200">
+                <a:solidFill>
+                  <a:schemeClr val="tx1"/>
+                </a:solidFill>
+                <a:latin typeface="+mn-lt"/>
+                <a:ea typeface="+mn-ea"/>
+                <a:cs typeface="+mn-cs"/>
+              </a:defRPr>
+            </a:lvl7pPr>
+            <a:lvl8pPr marL="2743200" indent="-342900" algn="l" defTabSz="342900" rtl="0" eaLnBrk="1" latinLnBrk="0" hangingPunct="1">
+              <a:spcBef>
+                <a:spcPct val="20000"/>
+              </a:spcBef>
+              <a:buFont typeface="Arial"/>
+              <a:buChar char="•"/>
+              <a:defRPr sz="1500" kern="1200">
+                <a:solidFill>
+                  <a:schemeClr val="tx1"/>
+                </a:solidFill>
+                <a:latin typeface="+mn-lt"/>
+                <a:ea typeface="+mn-ea"/>
+                <a:cs typeface="+mn-cs"/>
+              </a:defRPr>
+            </a:lvl8pPr>
+            <a:lvl9pPr marL="3086100" indent="-342900" algn="l" defTabSz="342900" rtl="0" eaLnBrk="1" latinLnBrk="0" hangingPunct="1">
+              <a:spcBef>
+                <a:spcPct val="20000"/>
+              </a:spcBef>
+              <a:buFont typeface="Arial"/>
+              <a:buChar char="•"/>
+              <a:defRPr sz="1500" kern="1200">
+                <a:solidFill>
+                  <a:schemeClr val="tx1"/>
+                </a:solidFill>
+                <a:latin typeface="+mn-lt"/>
+                <a:ea typeface="+mn-ea"/>
+                <a:cs typeface="+mn-cs"/>
+              </a:defRPr>
+            </a:lvl9pPr>
+          </a:lstStyle>
+          <a:p>
+            <a:pPr marL="0" indent="0">
+              <a:buNone/>
+            </a:pPr>
+            <a:r>
+              <a:rPr lang="en-US" dirty="0"/>
+              <a:t>Sequential color pallet for price, marker size for engine size</a:t>
+            </a:r>
+          </a:p>
+          <a:p>
+            <a:pPr>
+              <a:buFont typeface="Arial" panose="020B0604020202020204" pitchFamily="34" charset="0"/>
+              <a:buChar char="•"/>
+            </a:pPr>
+            <a:r>
+              <a:rPr lang="en-US" dirty="0"/>
+              <a:t>Color pallet same as previous example</a:t>
+            </a:r>
+          </a:p>
+          <a:p>
+            <a:pPr>
+              <a:buFont typeface="Arial" panose="020B0604020202020204" pitchFamily="34" charset="0"/>
+              <a:buChar char="•"/>
+            </a:pPr>
+            <a:r>
+              <a:rPr lang="en-US" dirty="0"/>
+              <a:t>Engine size by relative marker size  </a:t>
+            </a:r>
+          </a:p>
+          <a:p>
+            <a:pPr>
+              <a:buFont typeface="Arial" panose="020B0604020202020204" pitchFamily="34" charset="0"/>
+              <a:buChar char="•"/>
+            </a:pPr>
+            <a:r>
+              <a:rPr lang="en-US" dirty="0"/>
+              <a:t>Can you see the patterns in this 4-dimensional projection?  </a:t>
+            </a:r>
+          </a:p>
+        </p:txBody>
+      </p:sp>
+    </p:spTree>
+  </p:cSld>
+  <p:clrMapOvr>
+    <a:masterClrMapping/>
+  </p:clrMapOvr>
+</p:sld>
+</file>
+
+<file path=ppt/slides/slide36.xml><?xml version="1.0" encoding="utf-8"?>
+<p:sld xmlns:a="http://schemas.openxmlformats.org/drawingml/2006/main" xmlns:r="http://schemas.openxmlformats.org/officeDocument/2006/relationships" xmlns:p="http://schemas.openxmlformats.org/presentationml/2006/main">
+  <p:cSld>
+    <p:spTree>
+      <p:nvGrpSpPr>
+        <p:cNvPr id="1" name=""/>
+        <p:cNvGrpSpPr/>
+        <p:nvPr/>
+      </p:nvGrpSpPr>
+      <p:grpSpPr>
+        <a:xfrm>
+          <a:off x="0" y="0"/>
+          <a:ext cx="0" cy="0"/>
+          <a:chOff x="0" y="0"/>
+          <a:chExt cx="0" cy="0"/>
+        </a:xfrm>
+      </p:grpSpPr>
+      <p:sp>
+        <p:nvSpPr>
+          <p:cNvPr id="2" name="Title 1"/>
+          <p:cNvSpPr>
+            <a:spLocks noGrp="1"/>
+          </p:cNvSpPr>
+          <p:nvPr>
+            <p:ph type="title"/>
+          </p:nvPr>
+        </p:nvSpPr>
+        <p:spPr/>
+        <p:txBody>
+          <a:bodyPr/>
+          <a:lstStyle/>
+          <a:p>
+            <a:pPr marL="0" lvl="0" indent="0">
+              <a:buNone/>
+            </a:pPr>
+            <a:r>
+              <a:t>Line Plots and Line Type</a:t>
+            </a:r>
+          </a:p>
+        </p:txBody>
+      </p:sp>
+      <p:sp>
+        <p:nvSpPr>
+          <p:cNvPr id="3" name="Content Placeholder 2"/>
+          <p:cNvSpPr>
+            <a:spLocks noGrp="1"/>
+          </p:cNvSpPr>
+          <p:nvPr>
+            <p:ph idx="1"/>
+          </p:nvPr>
+        </p:nvSpPr>
+        <p:spPr/>
+        <p:txBody>
+          <a:bodyPr/>
+          <a:lstStyle/>
+          <a:p>
+            <a:pPr marL="0" lvl="0" indent="0">
+              <a:buNone/>
+            </a:pPr>
+            <a:r>
+              <a:rPr b="1" dirty="0"/>
+              <a:t>Line plots</a:t>
+            </a:r>
+            <a:r>
+              <a:rPr dirty="0"/>
+              <a:t> connect discrete, ordered, data points by a line</a:t>
+            </a:r>
+          </a:p>
+          <a:p>
+            <a:pPr lvl="0"/>
+            <a:r>
+              <a:rPr dirty="0"/>
+              <a:t>Can use different colors and line pattern types to differentiate categories</a:t>
+            </a:r>
+          </a:p>
+          <a:p>
+            <a:pPr lvl="0"/>
+            <a:r>
+              <a:rPr dirty="0"/>
+              <a:t>Only useful for a limited number of lines on one graph</a:t>
+            </a:r>
+          </a:p>
+          <a:p>
+            <a:pPr lvl="0"/>
+            <a:r>
+              <a:rPr dirty="0"/>
+              <a:t>Too many similar colors and line patterns on one plot leads to viewer confusion and poor perception</a:t>
+            </a:r>
+          </a:p>
+        </p:txBody>
+      </p:sp>
+    </p:spTree>
+  </p:cSld>
+  <p:clrMapOvr>
+    <a:masterClrMapping/>
+  </p:clrMapOvr>
+</p:sld>
+</file>
+
+<file path=ppt/slides/slide37.xml><?xml version="1.0" encoding="utf-8"?>
+<p:sld xmlns:a="http://schemas.openxmlformats.org/drawingml/2006/main" xmlns:r="http://schemas.openxmlformats.org/officeDocument/2006/relationships" xmlns:p="http://schemas.openxmlformats.org/presentationml/2006/main">
+  <p:cSld>
+    <p:spTree>
+      <p:nvGrpSpPr>
+        <p:cNvPr id="1" name=""/>
+        <p:cNvGrpSpPr/>
+        <p:nvPr/>
+      </p:nvGrpSpPr>
+      <p:grpSpPr>
+        <a:xfrm>
+          <a:off x="0" y="0"/>
+          <a:ext cx="0" cy="0"/>
+          <a:chOff x="0" y="0"/>
+          <a:chExt cx="0" cy="0"/>
+        </a:xfrm>
+      </p:grpSpPr>
+      <p:sp>
+        <p:nvSpPr>
+          <p:cNvPr id="2" name="Title 1"/>
+          <p:cNvSpPr>
+            <a:spLocks noGrp="1"/>
+          </p:cNvSpPr>
+          <p:nvPr>
+            <p:ph type="title"/>
+          </p:nvPr>
+        </p:nvSpPr>
+        <p:spPr/>
+        <p:txBody>
+          <a:bodyPr/>
+          <a:lstStyle/>
+          <a:p>
+            <a:pPr marL="0" lvl="0" indent="0">
+              <a:buNone/>
+            </a:pPr>
+            <a:r>
+              <a:t>Limits of Line Type</a:t>
+            </a:r>
+          </a:p>
+        </p:txBody>
+      </p:sp>
+      <p:pic>
+        <p:nvPicPr>
+          <p:cNvPr id="5" name="Picture 4">
+            <a:extLst>
+              <a:ext uri="{FF2B5EF4-FFF2-40B4-BE49-F238E27FC236}">
+                <a16:creationId xmlns:a16="http://schemas.microsoft.com/office/drawing/2014/main" id="{6CA63A8C-76CE-07D1-C49D-F35A34FB73B8}"/>
+              </a:ext>
+            </a:extLst>
+          </p:cNvPr>
+          <p:cNvPicPr>
+            <a:picLocks noChangeAspect="1"/>
+          </p:cNvPicPr>
+          <p:nvPr/>
+        </p:nvPicPr>
+        <p:blipFill>
+          <a:blip r:embed="rId2"/>
+          <a:stretch>
+            <a:fillRect/>
+          </a:stretch>
+        </p:blipFill>
+        <p:spPr>
+          <a:xfrm>
+            <a:off x="3535277" y="1266181"/>
+            <a:ext cx="5608723" cy="3240230"/>
+          </a:xfrm>
+          <a:prstGeom prst="rect">
+            <a:avLst/>
+          </a:prstGeom>
+        </p:spPr>
+      </p:pic>
+      <p:sp>
+        <p:nvSpPr>
+          <p:cNvPr id="6" name="Text Placeholder 3">
+            <a:extLst>
+              <a:ext uri="{FF2B5EF4-FFF2-40B4-BE49-F238E27FC236}">
+                <a16:creationId xmlns:a16="http://schemas.microsoft.com/office/drawing/2014/main" id="{F92608D8-9052-3429-1009-E119939D1062}"/>
+              </a:ext>
+            </a:extLst>
+          </p:cNvPr>
+          <p:cNvSpPr txBox="1">
+            <a:spLocks/>
+          </p:cNvSpPr>
+          <p:nvPr/>
+        </p:nvSpPr>
+        <p:spPr>
+          <a:xfrm>
+            <a:off x="457202" y="1415970"/>
+            <a:ext cx="3078075" cy="3521550"/>
           </a:xfrm>
           <a:prstGeom prst="rect">
             <a:avLst/>
@@ -7742,7 +8863,7 @@
             </a:pPr>
             <a:r>
               <a:rPr lang="en-US" dirty="0"/>
-              <a:t>Large color pallet reduces perception</a:t>
+              <a:t>Line type indicates type of transformation </a:t>
             </a:r>
           </a:p>
           <a:p>
@@ -7752,7 +8873,7 @@
             </a:pPr>
             <a:r>
               <a:rPr lang="en-US" dirty="0"/>
-              <a:t>This plot includes too many similar colors</a:t>
+              <a:t>It is easy to perceive the 4 line types</a:t>
             </a:r>
           </a:p>
           <a:p>
@@ -7762,47 +8883,16 @@
             </a:pPr>
             <a:r>
               <a:rPr lang="en-US" dirty="0"/>
-              <a:t>Virtually impossible to determine where autos from each make fall on the plot </a:t>
-            </a:r>
-          </a:p>
-        </p:txBody>
-      </p:sp>
-      <p:pic>
-        <p:nvPicPr>
-          <p:cNvPr id="6" name="Picture 5">
-            <a:extLst>
-              <a:ext uri="{FF2B5EF4-FFF2-40B4-BE49-F238E27FC236}">
-                <a16:creationId xmlns:a16="http://schemas.microsoft.com/office/drawing/2014/main" id="{06B7D722-712E-6BDF-09E4-1BA64EF0454B}"/>
-              </a:ext>
-            </a:extLst>
-          </p:cNvPr>
-          <p:cNvPicPr>
-            <a:picLocks noChangeAspect="1"/>
-          </p:cNvPicPr>
-          <p:nvPr/>
-        </p:nvPicPr>
-        <p:blipFill>
-          <a:blip r:embed="rId2"/>
-          <a:stretch>
-            <a:fillRect/>
-          </a:stretch>
-        </p:blipFill>
-        <p:spPr>
-          <a:xfrm>
-            <a:off x="4265108" y="860385"/>
-            <a:ext cx="4878892" cy="4109012"/>
-          </a:xfrm>
-          <a:prstGeom prst="rect">
-            <a:avLst/>
-          </a:prstGeom>
-        </p:spPr>
-      </p:pic>
+              <a:t>Only a </a:t>
+            </a:r>
+            <a:r>
+              <a:rPr lang="en-US" b="1" dirty="0"/>
+              <a:t>limited number of line types can be perceived!</a:t>
+            </a:r>
+          </a:p>
+        </p:txBody>
+      </p:sp>
     </p:spTree>
-    <p:extLst>
-      <p:ext uri="{BB962C8B-B14F-4D97-AF65-F5344CB8AC3E}">
-        <p14:creationId xmlns:p14="http://schemas.microsoft.com/office/powerpoint/2010/main" val="929278502"/>
-      </p:ext>
-    </p:extLst>
   </p:cSld>
   <p:clrMapOvr>
     <a:masterClrMapping/>
@@ -7810,7 +8900,7 @@
 </p:sld>
 </file>
 
-<file path=ppt/slides/slide33.xml><?xml version="1.0" encoding="utf-8"?>
+<file path=ppt/slides/slide38.xml><?xml version="1.0" encoding="utf-8"?>
 <p:sld xmlns:a="http://schemas.openxmlformats.org/drawingml/2006/main" xmlns:r="http://schemas.openxmlformats.org/officeDocument/2006/relationships" xmlns:p="http://schemas.openxmlformats.org/presentationml/2006/main">
   <p:cSld>
     <p:spTree>
@@ -7846,10 +8936,118 @@
               <a:buNone/>
             </a:pPr>
             <a:r>
-              <a:rPr lang="en-US" dirty="0"/>
-              <a:t>Limits of Color</a:t>
-            </a:r>
-            <a:endParaRPr dirty="0"/>
+              <a:t>Marker Shape</a:t>
+            </a:r>
+          </a:p>
+        </p:txBody>
+      </p:sp>
+      <p:sp>
+        <p:nvSpPr>
+          <p:cNvPr id="3" name="Content Placeholder 2"/>
+          <p:cNvSpPr>
+            <a:spLocks noGrp="1"/>
+          </p:cNvSpPr>
+          <p:nvPr>
+            <p:ph idx="1"/>
+          </p:nvPr>
+        </p:nvSpPr>
+        <p:spPr/>
+        <p:txBody>
+          <a:bodyPr/>
+          <a:lstStyle/>
+          <a:p>
+            <a:pPr marL="0" lvl="0" indent="0">
+              <a:buNone/>
+            </a:pPr>
+            <a:r>
+              <a:rPr b="1" dirty="0"/>
+              <a:t>Marker shape</a:t>
+            </a:r>
+            <a:r>
+              <a:rPr dirty="0"/>
+              <a:t> is useful for displaying categorical relationships</a:t>
+            </a:r>
+          </a:p>
+          <a:p>
+            <a:pPr lvl="0"/>
+            <a:r>
+              <a:rPr dirty="0"/>
+              <a:t>This aesthetic is only useful when two conditions are met:</a:t>
+            </a:r>
+          </a:p>
+          <a:p>
+            <a:pPr lvl="1">
+              <a:buAutoNum type="arabicPeriod"/>
+            </a:pPr>
+            <a:r>
+              <a:rPr dirty="0"/>
+              <a:t>The number of categories is small</a:t>
+            </a:r>
+          </a:p>
+          <a:p>
+            <a:pPr lvl="1">
+              <a:buAutoNum type="arabicPeriod"/>
+            </a:pPr>
+            <a:r>
+              <a:rPr dirty="0"/>
+              <a:t>Distinctive shape are chosen for the markers</a:t>
+            </a:r>
+          </a:p>
+          <a:p>
+            <a:pPr lvl="0"/>
+            <a:r>
+              <a:rPr dirty="0"/>
+              <a:t>Human perception limits the number of shapes humans can perceive well</a:t>
+            </a:r>
+          </a:p>
+        </p:txBody>
+      </p:sp>
+    </p:spTree>
+  </p:cSld>
+  <p:clrMapOvr>
+    <a:masterClrMapping/>
+  </p:clrMapOvr>
+</p:sld>
+</file>
+
+<file path=ppt/slides/slide39.xml><?xml version="1.0" encoding="utf-8"?>
+<p:sld xmlns:a="http://schemas.openxmlformats.org/drawingml/2006/main" xmlns:r="http://schemas.openxmlformats.org/officeDocument/2006/relationships" xmlns:p="http://schemas.openxmlformats.org/presentationml/2006/main">
+  <p:cSld>
+    <p:spTree>
+      <p:nvGrpSpPr>
+        <p:cNvPr id="1" name=""/>
+        <p:cNvGrpSpPr/>
+        <p:nvPr/>
+      </p:nvGrpSpPr>
+      <p:grpSpPr>
+        <a:xfrm>
+          <a:off x="0" y="0"/>
+          <a:ext cx="0" cy="0"/>
+          <a:chOff x="0" y="0"/>
+          <a:chExt cx="0" cy="0"/>
+        </a:xfrm>
+      </p:grpSpPr>
+      <p:sp>
+        <p:nvSpPr>
+          <p:cNvPr id="2" name="Title 1"/>
+          <p:cNvSpPr>
+            <a:spLocks noGrp="1"/>
+          </p:cNvSpPr>
+          <p:nvPr>
+            <p:ph type="title"/>
+          </p:nvPr>
+        </p:nvSpPr>
+        <p:spPr/>
+        <p:txBody>
+          <a:bodyPr/>
+          <a:lstStyle/>
+          <a:p>
+            <a:pPr marL="0" lvl="0" indent="0">
+              <a:buNone/>
+            </a:pPr>
+            <a:r>
+              <a:t>Aspiration by Marker Shape</a:t>
+            </a:r>
           </a:p>
         </p:txBody>
       </p:sp>
@@ -7858,7 +9056,7 @@
           <p:cNvPr id="3" name="Text Placeholder 3">
             <a:extLst>
               <a:ext uri="{FF2B5EF4-FFF2-40B4-BE49-F238E27FC236}">
-                <a16:creationId xmlns:a16="http://schemas.microsoft.com/office/drawing/2014/main" id="{BBC4F043-E962-4014-CE75-99D8E08E0C5B}"/>
+                <a16:creationId xmlns:a16="http://schemas.microsoft.com/office/drawing/2014/main" id="{0F154E65-A52E-2F68-7EBF-15BA314E33B6}"/>
               </a:ext>
             </a:extLst>
           </p:cNvPr>
@@ -7869,8 +9067,8 @@
         </p:nvSpPr>
         <p:spPr>
           <a:xfrm>
-            <a:off x="387754" y="910542"/>
-            <a:ext cx="8513178" cy="1207625"/>
+            <a:off x="457202" y="1358096"/>
+            <a:ext cx="4462039" cy="3236527"/>
           </a:xfrm>
           <a:prstGeom prst="rect">
             <a:avLst/>
@@ -8023,1211 +9221,6 @@
             </a:pPr>
             <a:r>
               <a:rPr lang="en-US" dirty="0"/>
-              <a:t>Ordered box plot is an alternative to color and shape for variables with too many categories   </a:t>
-            </a:r>
-          </a:p>
-          <a:p>
-            <a:r>
-              <a:rPr lang="en-US" dirty="0"/>
-              <a:t>Ordering improves perception, similar to ordered bar chart</a:t>
-            </a:r>
-          </a:p>
-        </p:txBody>
-      </p:sp>
-      <p:pic>
-        <p:nvPicPr>
-          <p:cNvPr id="5" name="Picture 4">
-            <a:extLst>
-              <a:ext uri="{FF2B5EF4-FFF2-40B4-BE49-F238E27FC236}">
-                <a16:creationId xmlns:a16="http://schemas.microsoft.com/office/drawing/2014/main" id="{470F5102-101E-3820-1B91-98B8A85B96F4}"/>
-              </a:ext>
-            </a:extLst>
-          </p:cNvPr>
-          <p:cNvPicPr>
-            <a:picLocks noChangeAspect="1"/>
-          </p:cNvPicPr>
-          <p:nvPr/>
-        </p:nvPicPr>
-        <p:blipFill>
-          <a:blip r:embed="rId2"/>
-          <a:stretch>
-            <a:fillRect/>
-          </a:stretch>
-        </p:blipFill>
-        <p:spPr>
-          <a:xfrm>
-            <a:off x="4409954" y="1964889"/>
-            <a:ext cx="4109655" cy="3142486"/>
-          </a:xfrm>
-          <a:prstGeom prst="rect">
-            <a:avLst/>
-          </a:prstGeom>
-        </p:spPr>
-      </p:pic>
-      <p:pic>
-        <p:nvPicPr>
-          <p:cNvPr id="8" name="Picture 7">
-            <a:extLst>
-              <a:ext uri="{FF2B5EF4-FFF2-40B4-BE49-F238E27FC236}">
-                <a16:creationId xmlns:a16="http://schemas.microsoft.com/office/drawing/2014/main" id="{493BB364-7770-0D6E-2F56-3A68DD328653}"/>
-              </a:ext>
-            </a:extLst>
-          </p:cNvPr>
-          <p:cNvPicPr>
-            <a:picLocks noChangeAspect="1"/>
-          </p:cNvPicPr>
-          <p:nvPr/>
-        </p:nvPicPr>
-        <p:blipFill>
-          <a:blip r:embed="rId3"/>
-          <a:stretch>
-            <a:fillRect/>
-          </a:stretch>
-        </p:blipFill>
-        <p:spPr>
-          <a:xfrm>
-            <a:off x="310589" y="2000389"/>
-            <a:ext cx="4049208" cy="3079319"/>
-          </a:xfrm>
-          <a:prstGeom prst="rect">
-            <a:avLst/>
-          </a:prstGeom>
-        </p:spPr>
-      </p:pic>
-    </p:spTree>
-    <p:extLst>
-      <p:ext uri="{BB962C8B-B14F-4D97-AF65-F5344CB8AC3E}">
-        <p14:creationId xmlns:p14="http://schemas.microsoft.com/office/powerpoint/2010/main" val="3274263035"/>
-      </p:ext>
-    </p:extLst>
-  </p:cSld>
-  <p:clrMapOvr>
-    <a:masterClrMapping/>
-  </p:clrMapOvr>
-</p:sld>
-</file>
-
-<file path=ppt/slides/slide34.xml><?xml version="1.0" encoding="utf-8"?>
-<p:sld xmlns:a="http://schemas.openxmlformats.org/drawingml/2006/main" xmlns:r="http://schemas.openxmlformats.org/officeDocument/2006/relationships" xmlns:p="http://schemas.openxmlformats.org/presentationml/2006/main">
-  <p:cSld>
-    <p:spTree>
-      <p:nvGrpSpPr>
-        <p:cNvPr id="1" name=""/>
-        <p:cNvGrpSpPr/>
-        <p:nvPr/>
-      </p:nvGrpSpPr>
-      <p:grpSpPr>
-        <a:xfrm>
-          <a:off x="0" y="0"/>
-          <a:ext cx="0" cy="0"/>
-          <a:chOff x="0" y="0"/>
-          <a:chExt cx="0" cy="0"/>
-        </a:xfrm>
-      </p:grpSpPr>
-      <p:sp>
-        <p:nvSpPr>
-          <p:cNvPr id="2" name="Title 1"/>
-          <p:cNvSpPr>
-            <a:spLocks noGrp="1"/>
-          </p:cNvSpPr>
-          <p:nvPr>
-            <p:ph type="title"/>
-          </p:nvPr>
-        </p:nvSpPr>
-        <p:spPr/>
-        <p:txBody>
-          <a:bodyPr/>
-          <a:lstStyle/>
-          <a:p>
-            <a:pPr marL="0" lvl="0" indent="0">
-              <a:buNone/>
-            </a:pPr>
-            <a:r>
-              <a:t>Marker Size</a:t>
-            </a:r>
-          </a:p>
-        </p:txBody>
-      </p:sp>
-      <p:sp>
-        <p:nvSpPr>
-          <p:cNvPr id="3" name="Content Placeholder 2"/>
-          <p:cNvSpPr>
-            <a:spLocks noGrp="1"/>
-          </p:cNvSpPr>
-          <p:nvPr>
-            <p:ph idx="1"/>
-          </p:nvPr>
-        </p:nvSpPr>
-        <p:spPr/>
-        <p:txBody>
-          <a:bodyPr>
-            <a:normAutofit fontScale="92500" lnSpcReduction="10000"/>
-          </a:bodyPr>
-          <a:lstStyle/>
-          <a:p>
-            <a:pPr marL="0" lvl="0" indent="0">
-              <a:buNone/>
-            </a:pPr>
-            <a:r>
-              <a:rPr b="1" dirty="0"/>
-              <a:t>Marker size</a:t>
-            </a:r>
-            <a:r>
-              <a:rPr dirty="0"/>
-              <a:t> is moderately effective aesthetic</a:t>
-            </a:r>
-          </a:p>
-          <a:p>
-            <a:pPr lvl="0"/>
-            <a:r>
-              <a:rPr dirty="0"/>
-              <a:t>Used properly, marker size can highlight important relationships in complex data sets</a:t>
-            </a:r>
-          </a:p>
-          <a:p>
-            <a:pPr lvl="1"/>
-            <a:r>
-              <a:rPr dirty="0"/>
-              <a:t>Numeric values</a:t>
-            </a:r>
-          </a:p>
-          <a:p>
-            <a:pPr lvl="1"/>
-            <a:r>
-              <a:rPr dirty="0"/>
-              <a:t>Ordinal variables</a:t>
-            </a:r>
-          </a:p>
-          <a:p>
-            <a:pPr lvl="0"/>
-            <a:r>
-              <a:rPr dirty="0"/>
-              <a:t>Viewers can generally perceive relative differences, but not actual values</a:t>
-            </a:r>
-          </a:p>
-          <a:p>
-            <a:pPr lvl="0"/>
-            <a:r>
-              <a:rPr dirty="0"/>
-              <a:t>Small size differences are not perceptible</a:t>
-            </a:r>
-          </a:p>
-          <a:p>
-            <a:pPr lvl="1"/>
-            <a:r>
-              <a:rPr dirty="0"/>
-              <a:t>Only relative relationship in numeric variables</a:t>
-            </a:r>
-          </a:p>
-          <a:p>
-            <a:pPr lvl="1"/>
-            <a:r>
-              <a:rPr dirty="0"/>
-              <a:t>Limited steps of </a:t>
-            </a:r>
-            <a:r>
-              <a:rPr lang="en-US" dirty="0" err="1"/>
-              <a:t>ordianal</a:t>
-            </a:r>
-            <a:r>
-              <a:rPr dirty="0"/>
-              <a:t> variables</a:t>
-            </a:r>
-          </a:p>
-        </p:txBody>
-      </p:sp>
-    </p:spTree>
-  </p:cSld>
-  <p:clrMapOvr>
-    <a:masterClrMapping/>
-  </p:clrMapOvr>
-</p:sld>
-</file>
-
-<file path=ppt/slides/slide35.xml><?xml version="1.0" encoding="utf-8"?>
-<p:sld xmlns:a="http://schemas.openxmlformats.org/drawingml/2006/main" xmlns:r="http://schemas.openxmlformats.org/officeDocument/2006/relationships" xmlns:p="http://schemas.openxmlformats.org/presentationml/2006/main">
-  <p:cSld>
-    <p:spTree>
-      <p:nvGrpSpPr>
-        <p:cNvPr id="1" name=""/>
-        <p:cNvGrpSpPr/>
-        <p:nvPr/>
-      </p:nvGrpSpPr>
-      <p:grpSpPr>
-        <a:xfrm>
-          <a:off x="0" y="0"/>
-          <a:ext cx="0" cy="0"/>
-          <a:chOff x="0" y="0"/>
-          <a:chExt cx="0" cy="0"/>
-        </a:xfrm>
-      </p:grpSpPr>
-      <p:sp>
-        <p:nvSpPr>
-          <p:cNvPr id="2" name="Title 1"/>
-          <p:cNvSpPr>
-            <a:spLocks noGrp="1"/>
-          </p:cNvSpPr>
-          <p:nvPr>
-            <p:ph type="title"/>
-          </p:nvPr>
-        </p:nvSpPr>
-        <p:spPr/>
-        <p:txBody>
-          <a:bodyPr>
-            <a:normAutofit fontScale="90000"/>
-          </a:bodyPr>
-          <a:lstStyle/>
-          <a:p>
-            <a:pPr marL="0" lvl="0" indent="0">
-              <a:buNone/>
-            </a:pPr>
-            <a:r>
-              <a:t>Engine Size by Marker Size and Price by Sequential Color Palette</a:t>
-            </a:r>
-          </a:p>
-        </p:txBody>
-      </p:sp>
-      <p:pic>
-        <p:nvPicPr>
-          <p:cNvPr id="5" name="Picture 4">
-            <a:extLst>
-              <a:ext uri="{FF2B5EF4-FFF2-40B4-BE49-F238E27FC236}">
-                <a16:creationId xmlns:a16="http://schemas.microsoft.com/office/drawing/2014/main" id="{1B234609-BBC2-A19D-880C-BADCFEAC28D2}"/>
-              </a:ext>
-            </a:extLst>
-          </p:cNvPr>
-          <p:cNvPicPr>
-            <a:picLocks noChangeAspect="1"/>
-          </p:cNvPicPr>
-          <p:nvPr/>
-        </p:nvPicPr>
-        <p:blipFill>
-          <a:blip r:embed="rId2"/>
-          <a:stretch>
-            <a:fillRect/>
-          </a:stretch>
-        </p:blipFill>
-        <p:spPr>
-          <a:xfrm>
-            <a:off x="4915643" y="1108848"/>
-            <a:ext cx="3933785" cy="4034652"/>
-          </a:xfrm>
-          <a:prstGeom prst="rect">
-            <a:avLst/>
-          </a:prstGeom>
-        </p:spPr>
-      </p:pic>
-      <p:sp>
-        <p:nvSpPr>
-          <p:cNvPr id="3" name="Text Placeholder 3">
-            <a:extLst>
-              <a:ext uri="{FF2B5EF4-FFF2-40B4-BE49-F238E27FC236}">
-                <a16:creationId xmlns:a16="http://schemas.microsoft.com/office/drawing/2014/main" id="{97E3AB7E-43EF-6732-9DAC-40E0B6B49A48}"/>
-              </a:ext>
-            </a:extLst>
-          </p:cNvPr>
-          <p:cNvSpPr txBox="1">
-            <a:spLocks/>
-          </p:cNvSpPr>
-          <p:nvPr/>
-        </p:nvSpPr>
-        <p:spPr>
-          <a:xfrm>
-            <a:off x="457202" y="1358096"/>
-            <a:ext cx="4357866" cy="3236527"/>
-          </a:xfrm>
-          <a:prstGeom prst="rect">
-            <a:avLst/>
-          </a:prstGeom>
-        </p:spPr>
-        <p:txBody>
-          <a:bodyPr>
-            <a:normAutofit lnSpcReduction="10000"/>
-          </a:bodyPr>
-          <a:lstStyle>
-            <a:lvl1pPr marL="342900" indent="-342900" algn="l" defTabSz="342900" rtl="0" eaLnBrk="1" latinLnBrk="0" hangingPunct="1">
-              <a:spcBef>
-                <a:spcPct val="20000"/>
-              </a:spcBef>
-              <a:buFont typeface="Arial"/>
-              <a:buChar char="•"/>
-              <a:defRPr sz="2400" kern="1200">
-                <a:solidFill>
-                  <a:schemeClr val="tx1"/>
-                </a:solidFill>
-                <a:latin typeface="+mn-lt"/>
-                <a:ea typeface="+mn-ea"/>
-                <a:cs typeface="+mn-cs"/>
-              </a:defRPr>
-            </a:lvl1pPr>
-            <a:lvl2pPr marL="685800" indent="-342900" algn="l" defTabSz="342900" rtl="0" eaLnBrk="1" latinLnBrk="0" hangingPunct="1">
-              <a:spcBef>
-                <a:spcPct val="20000"/>
-              </a:spcBef>
-              <a:buFont typeface="Arial"/>
-              <a:buChar char="–"/>
-              <a:defRPr sz="2100" kern="1200">
-                <a:solidFill>
-                  <a:schemeClr val="tx1"/>
-                </a:solidFill>
-                <a:latin typeface="+mn-lt"/>
-                <a:ea typeface="+mn-ea"/>
-                <a:cs typeface="+mn-cs"/>
-              </a:defRPr>
-            </a:lvl2pPr>
-            <a:lvl3pPr marL="1028700" indent="-342900" algn="l" defTabSz="342900" rtl="0" eaLnBrk="1" latinLnBrk="0" hangingPunct="1">
-              <a:spcBef>
-                <a:spcPct val="20000"/>
-              </a:spcBef>
-              <a:buFont typeface="Arial"/>
-              <a:buChar char="•"/>
-              <a:defRPr sz="1800" kern="1200">
-                <a:solidFill>
-                  <a:schemeClr val="tx1"/>
-                </a:solidFill>
-                <a:latin typeface="+mn-lt"/>
-                <a:ea typeface="+mn-ea"/>
-                <a:cs typeface="+mn-cs"/>
-              </a:defRPr>
-            </a:lvl3pPr>
-            <a:lvl4pPr marL="1371600" indent="-342900" algn="l" defTabSz="342900" rtl="0" eaLnBrk="1" latinLnBrk="0" hangingPunct="1">
-              <a:spcBef>
-                <a:spcPct val="20000"/>
-              </a:spcBef>
-              <a:buFont typeface="Arial"/>
-              <a:buChar char="–"/>
-              <a:defRPr sz="1500" kern="1200">
-                <a:solidFill>
-                  <a:schemeClr val="tx1"/>
-                </a:solidFill>
-                <a:latin typeface="+mn-lt"/>
-                <a:ea typeface="+mn-ea"/>
-                <a:cs typeface="+mn-cs"/>
-              </a:defRPr>
-            </a:lvl4pPr>
-            <a:lvl5pPr marL="1714500" indent="-342900" algn="l" defTabSz="342900" rtl="0" eaLnBrk="1" latinLnBrk="0" hangingPunct="1">
-              <a:spcBef>
-                <a:spcPct val="20000"/>
-              </a:spcBef>
-              <a:buFont typeface="Arial"/>
-              <a:buChar char="»"/>
-              <a:defRPr sz="1500" kern="1200">
-                <a:solidFill>
-                  <a:schemeClr val="tx1"/>
-                </a:solidFill>
-                <a:latin typeface="+mn-lt"/>
-                <a:ea typeface="+mn-ea"/>
-                <a:cs typeface="+mn-cs"/>
-              </a:defRPr>
-            </a:lvl5pPr>
-            <a:lvl6pPr marL="2057400" indent="-342900" algn="l" defTabSz="342900" rtl="0" eaLnBrk="1" latinLnBrk="0" hangingPunct="1">
-              <a:spcBef>
-                <a:spcPct val="20000"/>
-              </a:spcBef>
-              <a:buFont typeface="Arial"/>
-              <a:buChar char="•"/>
-              <a:defRPr sz="1500" kern="1200">
-                <a:solidFill>
-                  <a:schemeClr val="tx1"/>
-                </a:solidFill>
-                <a:latin typeface="+mn-lt"/>
-                <a:ea typeface="+mn-ea"/>
-                <a:cs typeface="+mn-cs"/>
-              </a:defRPr>
-            </a:lvl6pPr>
-            <a:lvl7pPr marL="2400300" indent="-342900" algn="l" defTabSz="342900" rtl="0" eaLnBrk="1" latinLnBrk="0" hangingPunct="1">
-              <a:spcBef>
-                <a:spcPct val="20000"/>
-              </a:spcBef>
-              <a:buFont typeface="Arial"/>
-              <a:buChar char="•"/>
-              <a:defRPr sz="1500" kern="1200">
-                <a:solidFill>
-                  <a:schemeClr val="tx1"/>
-                </a:solidFill>
-                <a:latin typeface="+mn-lt"/>
-                <a:ea typeface="+mn-ea"/>
-                <a:cs typeface="+mn-cs"/>
-              </a:defRPr>
-            </a:lvl7pPr>
-            <a:lvl8pPr marL="2743200" indent="-342900" algn="l" defTabSz="342900" rtl="0" eaLnBrk="1" latinLnBrk="0" hangingPunct="1">
-              <a:spcBef>
-                <a:spcPct val="20000"/>
-              </a:spcBef>
-              <a:buFont typeface="Arial"/>
-              <a:buChar char="•"/>
-              <a:defRPr sz="1500" kern="1200">
-                <a:solidFill>
-                  <a:schemeClr val="tx1"/>
-                </a:solidFill>
-                <a:latin typeface="+mn-lt"/>
-                <a:ea typeface="+mn-ea"/>
-                <a:cs typeface="+mn-cs"/>
-              </a:defRPr>
-            </a:lvl8pPr>
-            <a:lvl9pPr marL="3086100" indent="-342900" algn="l" defTabSz="342900" rtl="0" eaLnBrk="1" latinLnBrk="0" hangingPunct="1">
-              <a:spcBef>
-                <a:spcPct val="20000"/>
-              </a:spcBef>
-              <a:buFont typeface="Arial"/>
-              <a:buChar char="•"/>
-              <a:defRPr sz="1500" kern="1200">
-                <a:solidFill>
-                  <a:schemeClr val="tx1"/>
-                </a:solidFill>
-                <a:latin typeface="+mn-lt"/>
-                <a:ea typeface="+mn-ea"/>
-                <a:cs typeface="+mn-cs"/>
-              </a:defRPr>
-            </a:lvl9pPr>
-          </a:lstStyle>
-          <a:p>
-            <a:pPr marL="0" indent="0">
-              <a:buNone/>
-            </a:pPr>
-            <a:r>
-              <a:rPr lang="en-US" dirty="0"/>
-              <a:t>Sequential color pallet for price, marker size for engine size</a:t>
-            </a:r>
-          </a:p>
-          <a:p>
-            <a:pPr>
-              <a:buFont typeface="Arial" panose="020B0604020202020204" pitchFamily="34" charset="0"/>
-              <a:buChar char="•"/>
-            </a:pPr>
-            <a:r>
-              <a:rPr lang="en-US" dirty="0"/>
-              <a:t>Color pallet same as previous example</a:t>
-            </a:r>
-          </a:p>
-          <a:p>
-            <a:pPr>
-              <a:buFont typeface="Arial" panose="020B0604020202020204" pitchFamily="34" charset="0"/>
-              <a:buChar char="•"/>
-            </a:pPr>
-            <a:r>
-              <a:rPr lang="en-US" dirty="0"/>
-              <a:t>Engine size by relative marker size  </a:t>
-            </a:r>
-          </a:p>
-          <a:p>
-            <a:pPr>
-              <a:buFont typeface="Arial" panose="020B0604020202020204" pitchFamily="34" charset="0"/>
-              <a:buChar char="•"/>
-            </a:pPr>
-            <a:r>
-              <a:rPr lang="en-US" dirty="0"/>
-              <a:t>Can you see the patterns in this 4-dimensional projection?  </a:t>
-            </a:r>
-          </a:p>
-        </p:txBody>
-      </p:sp>
-    </p:spTree>
-  </p:cSld>
-  <p:clrMapOvr>
-    <a:masterClrMapping/>
-  </p:clrMapOvr>
-</p:sld>
-</file>
-
-<file path=ppt/slides/slide36.xml><?xml version="1.0" encoding="utf-8"?>
-<p:sld xmlns:a="http://schemas.openxmlformats.org/drawingml/2006/main" xmlns:r="http://schemas.openxmlformats.org/officeDocument/2006/relationships" xmlns:p="http://schemas.openxmlformats.org/presentationml/2006/main">
-  <p:cSld>
-    <p:spTree>
-      <p:nvGrpSpPr>
-        <p:cNvPr id="1" name=""/>
-        <p:cNvGrpSpPr/>
-        <p:nvPr/>
-      </p:nvGrpSpPr>
-      <p:grpSpPr>
-        <a:xfrm>
-          <a:off x="0" y="0"/>
-          <a:ext cx="0" cy="0"/>
-          <a:chOff x="0" y="0"/>
-          <a:chExt cx="0" cy="0"/>
-        </a:xfrm>
-      </p:grpSpPr>
-      <p:sp>
-        <p:nvSpPr>
-          <p:cNvPr id="2" name="Title 1"/>
-          <p:cNvSpPr>
-            <a:spLocks noGrp="1"/>
-          </p:cNvSpPr>
-          <p:nvPr>
-            <p:ph type="title"/>
-          </p:nvPr>
-        </p:nvSpPr>
-        <p:spPr/>
-        <p:txBody>
-          <a:bodyPr/>
-          <a:lstStyle/>
-          <a:p>
-            <a:pPr marL="0" lvl="0" indent="0">
-              <a:buNone/>
-            </a:pPr>
-            <a:r>
-              <a:t>Line Plots and Line Type</a:t>
-            </a:r>
-          </a:p>
-        </p:txBody>
-      </p:sp>
-      <p:sp>
-        <p:nvSpPr>
-          <p:cNvPr id="3" name="Content Placeholder 2"/>
-          <p:cNvSpPr>
-            <a:spLocks noGrp="1"/>
-          </p:cNvSpPr>
-          <p:nvPr>
-            <p:ph idx="1"/>
-          </p:nvPr>
-        </p:nvSpPr>
-        <p:spPr/>
-        <p:txBody>
-          <a:bodyPr/>
-          <a:lstStyle/>
-          <a:p>
-            <a:pPr marL="0" lvl="0" indent="0">
-              <a:buNone/>
-            </a:pPr>
-            <a:r>
-              <a:rPr b="1" dirty="0"/>
-              <a:t>Line plots</a:t>
-            </a:r>
-            <a:r>
-              <a:rPr dirty="0"/>
-              <a:t> connect discrete, ordered, data points by a line</a:t>
-            </a:r>
-          </a:p>
-          <a:p>
-            <a:pPr lvl="0"/>
-            <a:r>
-              <a:rPr dirty="0"/>
-              <a:t>Can use different colors and line pattern types to differentiate categories</a:t>
-            </a:r>
-          </a:p>
-          <a:p>
-            <a:pPr lvl="0"/>
-            <a:r>
-              <a:rPr dirty="0"/>
-              <a:t>Only useful for a limited number of lines on one graph</a:t>
-            </a:r>
-          </a:p>
-          <a:p>
-            <a:pPr lvl="0"/>
-            <a:r>
-              <a:rPr dirty="0"/>
-              <a:t>Too many similar colors and line patterns on one plot leads to viewer confusion and poor perception</a:t>
-            </a:r>
-          </a:p>
-        </p:txBody>
-      </p:sp>
-    </p:spTree>
-  </p:cSld>
-  <p:clrMapOvr>
-    <a:masterClrMapping/>
-  </p:clrMapOvr>
-</p:sld>
-</file>
-
-<file path=ppt/slides/slide37.xml><?xml version="1.0" encoding="utf-8"?>
-<p:sld xmlns:a="http://schemas.openxmlformats.org/drawingml/2006/main" xmlns:r="http://schemas.openxmlformats.org/officeDocument/2006/relationships" xmlns:p="http://schemas.openxmlformats.org/presentationml/2006/main">
-  <p:cSld>
-    <p:spTree>
-      <p:nvGrpSpPr>
-        <p:cNvPr id="1" name=""/>
-        <p:cNvGrpSpPr/>
-        <p:nvPr/>
-      </p:nvGrpSpPr>
-      <p:grpSpPr>
-        <a:xfrm>
-          <a:off x="0" y="0"/>
-          <a:ext cx="0" cy="0"/>
-          <a:chOff x="0" y="0"/>
-          <a:chExt cx="0" cy="0"/>
-        </a:xfrm>
-      </p:grpSpPr>
-      <p:sp>
-        <p:nvSpPr>
-          <p:cNvPr id="2" name="Title 1"/>
-          <p:cNvSpPr>
-            <a:spLocks noGrp="1"/>
-          </p:cNvSpPr>
-          <p:nvPr>
-            <p:ph type="title"/>
-          </p:nvPr>
-        </p:nvSpPr>
-        <p:spPr/>
-        <p:txBody>
-          <a:bodyPr/>
-          <a:lstStyle/>
-          <a:p>
-            <a:pPr marL="0" lvl="0" indent="0">
-              <a:buNone/>
-            </a:pPr>
-            <a:r>
-              <a:t>Limits of Line Type</a:t>
-            </a:r>
-          </a:p>
-        </p:txBody>
-      </p:sp>
-      <p:pic>
-        <p:nvPicPr>
-          <p:cNvPr id="5" name="Picture 4">
-            <a:extLst>
-              <a:ext uri="{FF2B5EF4-FFF2-40B4-BE49-F238E27FC236}">
-                <a16:creationId xmlns:a16="http://schemas.microsoft.com/office/drawing/2014/main" id="{6CA63A8C-76CE-07D1-C49D-F35A34FB73B8}"/>
-              </a:ext>
-            </a:extLst>
-          </p:cNvPr>
-          <p:cNvPicPr>
-            <a:picLocks noChangeAspect="1"/>
-          </p:cNvPicPr>
-          <p:nvPr/>
-        </p:nvPicPr>
-        <p:blipFill>
-          <a:blip r:embed="rId2"/>
-          <a:stretch>
-            <a:fillRect/>
-          </a:stretch>
-        </p:blipFill>
-        <p:spPr>
-          <a:xfrm>
-            <a:off x="3535277" y="1266181"/>
-            <a:ext cx="5608723" cy="3240230"/>
-          </a:xfrm>
-          <a:prstGeom prst="rect">
-            <a:avLst/>
-          </a:prstGeom>
-        </p:spPr>
-      </p:pic>
-      <p:sp>
-        <p:nvSpPr>
-          <p:cNvPr id="6" name="Text Placeholder 3">
-            <a:extLst>
-              <a:ext uri="{FF2B5EF4-FFF2-40B4-BE49-F238E27FC236}">
-                <a16:creationId xmlns:a16="http://schemas.microsoft.com/office/drawing/2014/main" id="{F92608D8-9052-3429-1009-E119939D1062}"/>
-              </a:ext>
-            </a:extLst>
-          </p:cNvPr>
-          <p:cNvSpPr txBox="1">
-            <a:spLocks/>
-          </p:cNvSpPr>
-          <p:nvPr/>
-        </p:nvSpPr>
-        <p:spPr>
-          <a:xfrm>
-            <a:off x="457202" y="1415970"/>
-            <a:ext cx="3078075" cy="3521550"/>
-          </a:xfrm>
-          <a:prstGeom prst="rect">
-            <a:avLst/>
-          </a:prstGeom>
-        </p:spPr>
-        <p:txBody>
-          <a:bodyPr>
-            <a:normAutofit/>
-          </a:bodyPr>
-          <a:lstStyle>
-            <a:lvl1pPr marL="342900" indent="-342900" algn="l" defTabSz="342900" rtl="0" eaLnBrk="1" latinLnBrk="0" hangingPunct="1">
-              <a:spcBef>
-                <a:spcPct val="20000"/>
-              </a:spcBef>
-              <a:buFont typeface="Arial"/>
-              <a:buChar char="•"/>
-              <a:defRPr sz="2400" kern="1200">
-                <a:solidFill>
-                  <a:schemeClr val="tx1"/>
-                </a:solidFill>
-                <a:latin typeface="+mn-lt"/>
-                <a:ea typeface="+mn-ea"/>
-                <a:cs typeface="+mn-cs"/>
-              </a:defRPr>
-            </a:lvl1pPr>
-            <a:lvl2pPr marL="685800" indent="-342900" algn="l" defTabSz="342900" rtl="0" eaLnBrk="1" latinLnBrk="0" hangingPunct="1">
-              <a:spcBef>
-                <a:spcPct val="20000"/>
-              </a:spcBef>
-              <a:buFont typeface="Arial"/>
-              <a:buChar char="–"/>
-              <a:defRPr sz="2100" kern="1200">
-                <a:solidFill>
-                  <a:schemeClr val="tx1"/>
-                </a:solidFill>
-                <a:latin typeface="+mn-lt"/>
-                <a:ea typeface="+mn-ea"/>
-                <a:cs typeface="+mn-cs"/>
-              </a:defRPr>
-            </a:lvl2pPr>
-            <a:lvl3pPr marL="1028700" indent="-342900" algn="l" defTabSz="342900" rtl="0" eaLnBrk="1" latinLnBrk="0" hangingPunct="1">
-              <a:spcBef>
-                <a:spcPct val="20000"/>
-              </a:spcBef>
-              <a:buFont typeface="Arial"/>
-              <a:buChar char="•"/>
-              <a:defRPr sz="1800" kern="1200">
-                <a:solidFill>
-                  <a:schemeClr val="tx1"/>
-                </a:solidFill>
-                <a:latin typeface="+mn-lt"/>
-                <a:ea typeface="+mn-ea"/>
-                <a:cs typeface="+mn-cs"/>
-              </a:defRPr>
-            </a:lvl3pPr>
-            <a:lvl4pPr marL="1371600" indent="-342900" algn="l" defTabSz="342900" rtl="0" eaLnBrk="1" latinLnBrk="0" hangingPunct="1">
-              <a:spcBef>
-                <a:spcPct val="20000"/>
-              </a:spcBef>
-              <a:buFont typeface="Arial"/>
-              <a:buChar char="–"/>
-              <a:defRPr sz="1500" kern="1200">
-                <a:solidFill>
-                  <a:schemeClr val="tx1"/>
-                </a:solidFill>
-                <a:latin typeface="+mn-lt"/>
-                <a:ea typeface="+mn-ea"/>
-                <a:cs typeface="+mn-cs"/>
-              </a:defRPr>
-            </a:lvl4pPr>
-            <a:lvl5pPr marL="1714500" indent="-342900" algn="l" defTabSz="342900" rtl="0" eaLnBrk="1" latinLnBrk="0" hangingPunct="1">
-              <a:spcBef>
-                <a:spcPct val="20000"/>
-              </a:spcBef>
-              <a:buFont typeface="Arial"/>
-              <a:buChar char="»"/>
-              <a:defRPr sz="1500" kern="1200">
-                <a:solidFill>
-                  <a:schemeClr val="tx1"/>
-                </a:solidFill>
-                <a:latin typeface="+mn-lt"/>
-                <a:ea typeface="+mn-ea"/>
-                <a:cs typeface="+mn-cs"/>
-              </a:defRPr>
-            </a:lvl5pPr>
-            <a:lvl6pPr marL="2057400" indent="-342900" algn="l" defTabSz="342900" rtl="0" eaLnBrk="1" latinLnBrk="0" hangingPunct="1">
-              <a:spcBef>
-                <a:spcPct val="20000"/>
-              </a:spcBef>
-              <a:buFont typeface="Arial"/>
-              <a:buChar char="•"/>
-              <a:defRPr sz="1500" kern="1200">
-                <a:solidFill>
-                  <a:schemeClr val="tx1"/>
-                </a:solidFill>
-                <a:latin typeface="+mn-lt"/>
-                <a:ea typeface="+mn-ea"/>
-                <a:cs typeface="+mn-cs"/>
-              </a:defRPr>
-            </a:lvl6pPr>
-            <a:lvl7pPr marL="2400300" indent="-342900" algn="l" defTabSz="342900" rtl="0" eaLnBrk="1" latinLnBrk="0" hangingPunct="1">
-              <a:spcBef>
-                <a:spcPct val="20000"/>
-              </a:spcBef>
-              <a:buFont typeface="Arial"/>
-              <a:buChar char="•"/>
-              <a:defRPr sz="1500" kern="1200">
-                <a:solidFill>
-                  <a:schemeClr val="tx1"/>
-                </a:solidFill>
-                <a:latin typeface="+mn-lt"/>
-                <a:ea typeface="+mn-ea"/>
-                <a:cs typeface="+mn-cs"/>
-              </a:defRPr>
-            </a:lvl7pPr>
-            <a:lvl8pPr marL="2743200" indent="-342900" algn="l" defTabSz="342900" rtl="0" eaLnBrk="1" latinLnBrk="0" hangingPunct="1">
-              <a:spcBef>
-                <a:spcPct val="20000"/>
-              </a:spcBef>
-              <a:buFont typeface="Arial"/>
-              <a:buChar char="•"/>
-              <a:defRPr sz="1500" kern="1200">
-                <a:solidFill>
-                  <a:schemeClr val="tx1"/>
-                </a:solidFill>
-                <a:latin typeface="+mn-lt"/>
-                <a:ea typeface="+mn-ea"/>
-                <a:cs typeface="+mn-cs"/>
-              </a:defRPr>
-            </a:lvl8pPr>
-            <a:lvl9pPr marL="3086100" indent="-342900" algn="l" defTabSz="342900" rtl="0" eaLnBrk="1" latinLnBrk="0" hangingPunct="1">
-              <a:spcBef>
-                <a:spcPct val="20000"/>
-              </a:spcBef>
-              <a:buFont typeface="Arial"/>
-              <a:buChar char="•"/>
-              <a:defRPr sz="1500" kern="1200">
-                <a:solidFill>
-                  <a:schemeClr val="tx1"/>
-                </a:solidFill>
-                <a:latin typeface="+mn-lt"/>
-                <a:ea typeface="+mn-ea"/>
-                <a:cs typeface="+mn-cs"/>
-              </a:defRPr>
-            </a:lvl9pPr>
-          </a:lstStyle>
-          <a:p>
-            <a:pPr marL="0" indent="0">
-              <a:buNone/>
-            </a:pPr>
-            <a:r>
-              <a:rPr lang="en-US" dirty="0"/>
-              <a:t>Line type indicates type of transformation </a:t>
-            </a:r>
-          </a:p>
-          <a:p>
-            <a:pPr>
-              <a:buFont typeface="Arial" panose="020B0604020202020204" pitchFamily="34" charset="0"/>
-              <a:buChar char="•"/>
-            </a:pPr>
-            <a:r>
-              <a:rPr lang="en-US" dirty="0"/>
-              <a:t>It is easy to perceive the 4 line types</a:t>
-            </a:r>
-          </a:p>
-          <a:p>
-            <a:pPr>
-              <a:buFont typeface="Arial" panose="020B0604020202020204" pitchFamily="34" charset="0"/>
-              <a:buChar char="•"/>
-            </a:pPr>
-            <a:r>
-              <a:rPr lang="en-US" dirty="0"/>
-              <a:t>Only a </a:t>
-            </a:r>
-            <a:r>
-              <a:rPr lang="en-US" b="1" dirty="0"/>
-              <a:t>limited number of line types can be perceived!</a:t>
-            </a:r>
-          </a:p>
-        </p:txBody>
-      </p:sp>
-    </p:spTree>
-  </p:cSld>
-  <p:clrMapOvr>
-    <a:masterClrMapping/>
-  </p:clrMapOvr>
-</p:sld>
-</file>
-
-<file path=ppt/slides/slide38.xml><?xml version="1.0" encoding="utf-8"?>
-<p:sld xmlns:a="http://schemas.openxmlformats.org/drawingml/2006/main" xmlns:r="http://schemas.openxmlformats.org/officeDocument/2006/relationships" xmlns:p="http://schemas.openxmlformats.org/presentationml/2006/main">
-  <p:cSld>
-    <p:spTree>
-      <p:nvGrpSpPr>
-        <p:cNvPr id="1" name=""/>
-        <p:cNvGrpSpPr/>
-        <p:nvPr/>
-      </p:nvGrpSpPr>
-      <p:grpSpPr>
-        <a:xfrm>
-          <a:off x="0" y="0"/>
-          <a:ext cx="0" cy="0"/>
-          <a:chOff x="0" y="0"/>
-          <a:chExt cx="0" cy="0"/>
-        </a:xfrm>
-      </p:grpSpPr>
-      <p:sp>
-        <p:nvSpPr>
-          <p:cNvPr id="2" name="Title 1"/>
-          <p:cNvSpPr>
-            <a:spLocks noGrp="1"/>
-          </p:cNvSpPr>
-          <p:nvPr>
-            <p:ph type="title"/>
-          </p:nvPr>
-        </p:nvSpPr>
-        <p:spPr/>
-        <p:txBody>
-          <a:bodyPr/>
-          <a:lstStyle/>
-          <a:p>
-            <a:pPr marL="0" lvl="0" indent="0">
-              <a:buNone/>
-            </a:pPr>
-            <a:r>
-              <a:t>Marker Shape</a:t>
-            </a:r>
-          </a:p>
-        </p:txBody>
-      </p:sp>
-      <p:sp>
-        <p:nvSpPr>
-          <p:cNvPr id="3" name="Content Placeholder 2"/>
-          <p:cNvSpPr>
-            <a:spLocks noGrp="1"/>
-          </p:cNvSpPr>
-          <p:nvPr>
-            <p:ph idx="1"/>
-          </p:nvPr>
-        </p:nvSpPr>
-        <p:spPr/>
-        <p:txBody>
-          <a:bodyPr/>
-          <a:lstStyle/>
-          <a:p>
-            <a:pPr marL="0" lvl="0" indent="0">
-              <a:buNone/>
-            </a:pPr>
-            <a:r>
-              <a:rPr b="1" dirty="0"/>
-              <a:t>Marker shape</a:t>
-            </a:r>
-            <a:r>
-              <a:rPr dirty="0"/>
-              <a:t> is useful for displaying categorical relationships</a:t>
-            </a:r>
-          </a:p>
-          <a:p>
-            <a:pPr lvl="0"/>
-            <a:r>
-              <a:rPr dirty="0"/>
-              <a:t>This aesthetic is only useful when two conditions are met:</a:t>
-            </a:r>
-          </a:p>
-          <a:p>
-            <a:pPr lvl="1">
-              <a:buAutoNum type="arabicPeriod"/>
-            </a:pPr>
-            <a:r>
-              <a:rPr dirty="0"/>
-              <a:t>The number of categories is small</a:t>
-            </a:r>
-          </a:p>
-          <a:p>
-            <a:pPr lvl="1">
-              <a:buAutoNum type="arabicPeriod"/>
-            </a:pPr>
-            <a:r>
-              <a:rPr dirty="0"/>
-              <a:t>Distinctive shape are chosen for the markers</a:t>
-            </a:r>
-          </a:p>
-          <a:p>
-            <a:pPr lvl="0"/>
-            <a:r>
-              <a:rPr dirty="0"/>
-              <a:t>Human perception limits the number of shapes humans can perceive well</a:t>
-            </a:r>
-          </a:p>
-        </p:txBody>
-      </p:sp>
-    </p:spTree>
-  </p:cSld>
-  <p:clrMapOvr>
-    <a:masterClrMapping/>
-  </p:clrMapOvr>
-</p:sld>
-</file>
-
-<file path=ppt/slides/slide39.xml><?xml version="1.0" encoding="utf-8"?>
-<p:sld xmlns:a="http://schemas.openxmlformats.org/drawingml/2006/main" xmlns:r="http://schemas.openxmlformats.org/officeDocument/2006/relationships" xmlns:p="http://schemas.openxmlformats.org/presentationml/2006/main">
-  <p:cSld>
-    <p:spTree>
-      <p:nvGrpSpPr>
-        <p:cNvPr id="1" name=""/>
-        <p:cNvGrpSpPr/>
-        <p:nvPr/>
-      </p:nvGrpSpPr>
-      <p:grpSpPr>
-        <a:xfrm>
-          <a:off x="0" y="0"/>
-          <a:ext cx="0" cy="0"/>
-          <a:chOff x="0" y="0"/>
-          <a:chExt cx="0" cy="0"/>
-        </a:xfrm>
-      </p:grpSpPr>
-      <p:sp>
-        <p:nvSpPr>
-          <p:cNvPr id="2" name="Title 1"/>
-          <p:cNvSpPr>
-            <a:spLocks noGrp="1"/>
-          </p:cNvSpPr>
-          <p:nvPr>
-            <p:ph type="title"/>
-          </p:nvPr>
-        </p:nvSpPr>
-        <p:spPr/>
-        <p:txBody>
-          <a:bodyPr/>
-          <a:lstStyle/>
-          <a:p>
-            <a:pPr marL="0" lvl="0" indent="0">
-              <a:buNone/>
-            </a:pPr>
-            <a:r>
-              <a:t>Aspiration by Marker Shape</a:t>
-            </a:r>
-          </a:p>
-        </p:txBody>
-      </p:sp>
-      <p:sp>
-        <p:nvSpPr>
-          <p:cNvPr id="3" name="Text Placeholder 3">
-            <a:extLst>
-              <a:ext uri="{FF2B5EF4-FFF2-40B4-BE49-F238E27FC236}">
-                <a16:creationId xmlns:a16="http://schemas.microsoft.com/office/drawing/2014/main" id="{0F154E65-A52E-2F68-7EBF-15BA314E33B6}"/>
-              </a:ext>
-            </a:extLst>
-          </p:cNvPr>
-          <p:cNvSpPr txBox="1">
-            <a:spLocks/>
-          </p:cNvSpPr>
-          <p:nvPr/>
-        </p:nvSpPr>
-        <p:spPr>
-          <a:xfrm>
-            <a:off x="457202" y="1358096"/>
-            <a:ext cx="4462039" cy="3236527"/>
-          </a:xfrm>
-          <a:prstGeom prst="rect">
-            <a:avLst/>
-          </a:prstGeom>
-        </p:spPr>
-        <p:txBody>
-          <a:bodyPr>
-            <a:normAutofit lnSpcReduction="10000"/>
-          </a:bodyPr>
-          <a:lstStyle>
-            <a:lvl1pPr marL="342900" indent="-342900" algn="l" defTabSz="342900" rtl="0" eaLnBrk="1" latinLnBrk="0" hangingPunct="1">
-              <a:spcBef>
-                <a:spcPct val="20000"/>
-              </a:spcBef>
-              <a:buFont typeface="Arial"/>
-              <a:buChar char="•"/>
-              <a:defRPr sz="2400" kern="1200">
-                <a:solidFill>
-                  <a:schemeClr val="tx1"/>
-                </a:solidFill>
-                <a:latin typeface="+mn-lt"/>
-                <a:ea typeface="+mn-ea"/>
-                <a:cs typeface="+mn-cs"/>
-              </a:defRPr>
-            </a:lvl1pPr>
-            <a:lvl2pPr marL="685800" indent="-342900" algn="l" defTabSz="342900" rtl="0" eaLnBrk="1" latinLnBrk="0" hangingPunct="1">
-              <a:spcBef>
-                <a:spcPct val="20000"/>
-              </a:spcBef>
-              <a:buFont typeface="Arial"/>
-              <a:buChar char="–"/>
-              <a:defRPr sz="2100" kern="1200">
-                <a:solidFill>
-                  <a:schemeClr val="tx1"/>
-                </a:solidFill>
-                <a:latin typeface="+mn-lt"/>
-                <a:ea typeface="+mn-ea"/>
-                <a:cs typeface="+mn-cs"/>
-              </a:defRPr>
-            </a:lvl2pPr>
-            <a:lvl3pPr marL="1028700" indent="-342900" algn="l" defTabSz="342900" rtl="0" eaLnBrk="1" latinLnBrk="0" hangingPunct="1">
-              <a:spcBef>
-                <a:spcPct val="20000"/>
-              </a:spcBef>
-              <a:buFont typeface="Arial"/>
-              <a:buChar char="•"/>
-              <a:defRPr sz="1800" kern="1200">
-                <a:solidFill>
-                  <a:schemeClr val="tx1"/>
-                </a:solidFill>
-                <a:latin typeface="+mn-lt"/>
-                <a:ea typeface="+mn-ea"/>
-                <a:cs typeface="+mn-cs"/>
-              </a:defRPr>
-            </a:lvl3pPr>
-            <a:lvl4pPr marL="1371600" indent="-342900" algn="l" defTabSz="342900" rtl="0" eaLnBrk="1" latinLnBrk="0" hangingPunct="1">
-              <a:spcBef>
-                <a:spcPct val="20000"/>
-              </a:spcBef>
-              <a:buFont typeface="Arial"/>
-              <a:buChar char="–"/>
-              <a:defRPr sz="1500" kern="1200">
-                <a:solidFill>
-                  <a:schemeClr val="tx1"/>
-                </a:solidFill>
-                <a:latin typeface="+mn-lt"/>
-                <a:ea typeface="+mn-ea"/>
-                <a:cs typeface="+mn-cs"/>
-              </a:defRPr>
-            </a:lvl4pPr>
-            <a:lvl5pPr marL="1714500" indent="-342900" algn="l" defTabSz="342900" rtl="0" eaLnBrk="1" latinLnBrk="0" hangingPunct="1">
-              <a:spcBef>
-                <a:spcPct val="20000"/>
-              </a:spcBef>
-              <a:buFont typeface="Arial"/>
-              <a:buChar char="»"/>
-              <a:defRPr sz="1500" kern="1200">
-                <a:solidFill>
-                  <a:schemeClr val="tx1"/>
-                </a:solidFill>
-                <a:latin typeface="+mn-lt"/>
-                <a:ea typeface="+mn-ea"/>
-                <a:cs typeface="+mn-cs"/>
-              </a:defRPr>
-            </a:lvl5pPr>
-            <a:lvl6pPr marL="2057400" indent="-342900" algn="l" defTabSz="342900" rtl="0" eaLnBrk="1" latinLnBrk="0" hangingPunct="1">
-              <a:spcBef>
-                <a:spcPct val="20000"/>
-              </a:spcBef>
-              <a:buFont typeface="Arial"/>
-              <a:buChar char="•"/>
-              <a:defRPr sz="1500" kern="1200">
-                <a:solidFill>
-                  <a:schemeClr val="tx1"/>
-                </a:solidFill>
-                <a:latin typeface="+mn-lt"/>
-                <a:ea typeface="+mn-ea"/>
-                <a:cs typeface="+mn-cs"/>
-              </a:defRPr>
-            </a:lvl6pPr>
-            <a:lvl7pPr marL="2400300" indent="-342900" algn="l" defTabSz="342900" rtl="0" eaLnBrk="1" latinLnBrk="0" hangingPunct="1">
-              <a:spcBef>
-                <a:spcPct val="20000"/>
-              </a:spcBef>
-              <a:buFont typeface="Arial"/>
-              <a:buChar char="•"/>
-              <a:defRPr sz="1500" kern="1200">
-                <a:solidFill>
-                  <a:schemeClr val="tx1"/>
-                </a:solidFill>
-                <a:latin typeface="+mn-lt"/>
-                <a:ea typeface="+mn-ea"/>
-                <a:cs typeface="+mn-cs"/>
-              </a:defRPr>
-            </a:lvl7pPr>
-            <a:lvl8pPr marL="2743200" indent="-342900" algn="l" defTabSz="342900" rtl="0" eaLnBrk="1" latinLnBrk="0" hangingPunct="1">
-              <a:spcBef>
-                <a:spcPct val="20000"/>
-              </a:spcBef>
-              <a:buFont typeface="Arial"/>
-              <a:buChar char="•"/>
-              <a:defRPr sz="1500" kern="1200">
-                <a:solidFill>
-                  <a:schemeClr val="tx1"/>
-                </a:solidFill>
-                <a:latin typeface="+mn-lt"/>
-                <a:ea typeface="+mn-ea"/>
-                <a:cs typeface="+mn-cs"/>
-              </a:defRPr>
-            </a:lvl8pPr>
-            <a:lvl9pPr marL="3086100" indent="-342900" algn="l" defTabSz="342900" rtl="0" eaLnBrk="1" latinLnBrk="0" hangingPunct="1">
-              <a:spcBef>
-                <a:spcPct val="20000"/>
-              </a:spcBef>
-              <a:buFont typeface="Arial"/>
-              <a:buChar char="•"/>
-              <a:defRPr sz="1500" kern="1200">
-                <a:solidFill>
-                  <a:schemeClr val="tx1"/>
-                </a:solidFill>
-                <a:latin typeface="+mn-lt"/>
-                <a:ea typeface="+mn-ea"/>
-                <a:cs typeface="+mn-cs"/>
-              </a:defRPr>
-            </a:lvl9pPr>
-          </a:lstStyle>
-          <a:p>
-            <a:pPr marL="0" indent="0">
-              <a:buNone/>
-            </a:pPr>
-            <a:r>
-              <a:rPr lang="en-US" dirty="0"/>
               <a:t>Spare use of color and marker shape projects 4 dimensions</a:t>
             </a:r>
           </a:p>
@@ -9681,10 +9674,10 @@
       </p:sp>
       <p:pic>
         <p:nvPicPr>
-          <p:cNvPr id="6" name="Picture 5">
+          <p:cNvPr id="5" name="Picture 4">
             <a:extLst>
               <a:ext uri="{FF2B5EF4-FFF2-40B4-BE49-F238E27FC236}">
-                <a16:creationId xmlns:a16="http://schemas.microsoft.com/office/drawing/2014/main" id="{780B116F-E19D-1516-0525-7FC9747D10A6}"/>
+                <a16:creationId xmlns:a16="http://schemas.microsoft.com/office/drawing/2014/main" id="{51194DEF-0D2F-CB09-6DE1-A081639A1E1C}"/>
               </a:ext>
             </a:extLst>
           </p:cNvPr>
@@ -9701,8 +9694,8 @@
         </p:blipFill>
         <p:spPr>
           <a:xfrm>
-            <a:off x="4178781" y="877531"/>
-            <a:ext cx="4741441" cy="4194723"/>
+            <a:off x="3987758" y="1016000"/>
+            <a:ext cx="5156242" cy="4081594"/>
           </a:xfrm>
           <a:prstGeom prst="rect">
             <a:avLst/>
@@ -10097,8 +10090,8 @@
           </a:p>
         </p:txBody>
       </p:sp>
-      <mc:AlternateContent xmlns:mc="http://schemas.openxmlformats.org/markup-compatibility/2006">
-        <mc:Choice xmlns:a14="http://schemas.microsoft.com/office/drawing/2010/main" Requires="a14">
+      <mc:AlternateContent xmlns:mc="http://schemas.openxmlformats.org/markup-compatibility/2006" xmlns:a14="http://schemas.microsoft.com/office/drawing/2010/main">
+        <mc:Choice Requires="a14">
           <p:sp>
             <p:nvSpPr>
               <p:cNvPr id="3" name="Content Placeholder 2"/>
@@ -10222,7 +10215,7 @@
             </p:txBody>
           </p:sp>
         </mc:Choice>
-        <mc:Fallback>
+        <mc:Fallback xmlns="">
           <p:sp>
             <p:nvSpPr>
               <p:cNvPr id="3" name="Content Placeholder 2"/>
@@ -10669,10 +10662,10 @@
       </p:sp>
       <p:pic>
         <p:nvPicPr>
-          <p:cNvPr id="6" name="Picture 5">
+          <p:cNvPr id="5" name="Picture 4">
             <a:extLst>
               <a:ext uri="{FF2B5EF4-FFF2-40B4-BE49-F238E27FC236}">
-                <a16:creationId xmlns:a16="http://schemas.microsoft.com/office/drawing/2014/main" id="{FFC2139F-05BC-6517-43F1-8B97D077B831}"/>
+                <a16:creationId xmlns:a16="http://schemas.microsoft.com/office/drawing/2014/main" id="{0D0D9806-A3ED-7D69-EEEC-DA0E47FB00E2}"/>
               </a:ext>
             </a:extLst>
           </p:cNvPr>
@@ -10689,8 +10682,8 @@
         </p:blipFill>
         <p:spPr>
           <a:xfrm>
-            <a:off x="3026124" y="1150220"/>
-            <a:ext cx="6079105" cy="3691856"/>
+            <a:off x="2938272" y="1194816"/>
+            <a:ext cx="6205728" cy="3714377"/>
           </a:xfrm>
           <a:prstGeom prst="rect">
             <a:avLst/>
@@ -10747,15 +10740,7 @@
             </a:pPr>
             <a:r>
               <a:rPr dirty="0"/>
-              <a:t>Regression Line and </a:t>
-            </a:r>
-            <a:r>
-              <a:rPr dirty="0" err="1"/>
-              <a:t>Tramsformation</a:t>
-            </a:r>
-            <a:r>
-              <a:rPr dirty="0"/>
-              <a:t> Example</a:t>
+              <a:t>Regression Line and Transformation Example</a:t>
             </a:r>
           </a:p>
         </p:txBody>
@@ -10868,10 +10853,10 @@
       </mc:AlternateContent>
       <p:pic>
         <p:nvPicPr>
-          <p:cNvPr id="5" name="Picture 4">
+          <p:cNvPr id="6" name="Picture 5">
             <a:extLst>
               <a:ext uri="{FF2B5EF4-FFF2-40B4-BE49-F238E27FC236}">
-                <a16:creationId xmlns:a16="http://schemas.microsoft.com/office/drawing/2014/main" id="{15261806-6831-AA73-8714-4C00EAD1F1A2}"/>
+                <a16:creationId xmlns:a16="http://schemas.microsoft.com/office/drawing/2014/main" id="{C038BBCF-18E3-AE69-F74B-05D1B8132A4B}"/>
               </a:ext>
             </a:extLst>
           </p:cNvPr>
@@ -10888,8 +10873,8 @@
         </p:blipFill>
         <p:spPr>
           <a:xfrm>
-            <a:off x="3387465" y="1435260"/>
-            <a:ext cx="5656566" cy="3339670"/>
+            <a:off x="3351349" y="1152594"/>
+            <a:ext cx="5792651" cy="3354382"/>
           </a:xfrm>
           <a:prstGeom prst="rect">
             <a:avLst/>
@@ -10945,12 +10930,64 @@
           </a:p>
         </p:txBody>
       </p:sp>
+      <p:sp>
+        <p:nvSpPr>
+          <p:cNvPr id="6" name="Content Placeholder 2">
+            <a:extLst>
+              <a:ext uri="{FF2B5EF4-FFF2-40B4-BE49-F238E27FC236}">
+                <a16:creationId xmlns:a16="http://schemas.microsoft.com/office/drawing/2014/main" id="{A3007566-6100-A41C-BAE1-CF241058118F}"/>
+              </a:ext>
+            </a:extLst>
+          </p:cNvPr>
+          <p:cNvSpPr>
+            <a:spLocks noGrp="1"/>
+          </p:cNvSpPr>
+          <p:nvPr>
+            <p:ph idx="1"/>
+          </p:nvPr>
+        </p:nvSpPr>
+        <p:spPr>
+          <a:xfrm>
+            <a:off x="457200" y="1851030"/>
+            <a:ext cx="3169534" cy="2737371"/>
+          </a:xfrm>
+        </p:spPr>
+        <p:txBody>
+          <a:bodyPr>
+            <a:normAutofit/>
+          </a:bodyPr>
+          <a:lstStyle/>
+          <a:p>
+            <a:pPr marL="0" lvl="0" indent="0">
+              <a:buNone/>
+            </a:pPr>
+            <a:r>
+              <a:rPr dirty="0"/>
+              <a:t>Second order polynomial fit</a:t>
+            </a:r>
+            <a:r>
+              <a:rPr lang="en-US" dirty="0"/>
+              <a:t> to transformed variables     </a:t>
+            </a:r>
+          </a:p>
+          <a:p>
+            <a:pPr marL="0" lvl="0" indent="0">
+              <a:buNone/>
+            </a:pPr>
+            <a:r>
+              <a:rPr lang="en-US" dirty="0"/>
+              <a:t>Regression lines are nearly strait! </a:t>
+            </a:r>
+            <a:endParaRPr dirty="0"/>
+          </a:p>
+        </p:txBody>
+      </p:sp>
       <p:pic>
         <p:nvPicPr>
-          <p:cNvPr id="5" name="Picture 4">
+          <p:cNvPr id="4" name="Picture 3">
             <a:extLst>
               <a:ext uri="{FF2B5EF4-FFF2-40B4-BE49-F238E27FC236}">
-                <a16:creationId xmlns:a16="http://schemas.microsoft.com/office/drawing/2014/main" id="{A5DCFCB4-8358-1EA4-9BC4-B2A4A51F057F}"/>
+                <a16:creationId xmlns:a16="http://schemas.microsoft.com/office/drawing/2014/main" id="{552C3B70-2ED9-A8BE-11F5-AD963708680A}"/>
               </a:ext>
             </a:extLst>
           </p:cNvPr>
@@ -10967,66 +11004,14 @@
         </p:blipFill>
         <p:spPr>
           <a:xfrm>
-            <a:off x="3343677" y="993781"/>
-            <a:ext cx="5656449" cy="3943740"/>
+            <a:off x="3702303" y="930472"/>
+            <a:ext cx="5331331" cy="4161720"/>
           </a:xfrm>
           <a:prstGeom prst="rect">
             <a:avLst/>
           </a:prstGeom>
         </p:spPr>
       </p:pic>
-      <p:sp>
-        <p:nvSpPr>
-          <p:cNvPr id="6" name="Content Placeholder 2">
-            <a:extLst>
-              <a:ext uri="{FF2B5EF4-FFF2-40B4-BE49-F238E27FC236}">
-                <a16:creationId xmlns:a16="http://schemas.microsoft.com/office/drawing/2014/main" id="{A3007566-6100-A41C-BAE1-CF241058118F}"/>
-              </a:ext>
-            </a:extLst>
-          </p:cNvPr>
-          <p:cNvSpPr>
-            <a:spLocks noGrp="1"/>
-          </p:cNvSpPr>
-          <p:nvPr>
-            <p:ph idx="1"/>
-          </p:nvPr>
-        </p:nvSpPr>
-        <p:spPr>
-          <a:xfrm>
-            <a:off x="457200" y="1851030"/>
-            <a:ext cx="3169534" cy="2737371"/>
-          </a:xfrm>
-        </p:spPr>
-        <p:txBody>
-          <a:bodyPr>
-            <a:normAutofit/>
-          </a:bodyPr>
-          <a:lstStyle/>
-          <a:p>
-            <a:pPr marL="0" lvl="0" indent="0">
-              <a:buNone/>
-            </a:pPr>
-            <a:r>
-              <a:rPr dirty="0"/>
-              <a:t>Second order polynomial fit</a:t>
-            </a:r>
-            <a:r>
-              <a:rPr lang="en-US" dirty="0"/>
-              <a:t> to transformed variables     </a:t>
-            </a:r>
-          </a:p>
-          <a:p>
-            <a:pPr marL="0" lvl="0" indent="0">
-              <a:buNone/>
-            </a:pPr>
-            <a:r>
-              <a:rPr lang="en-US" dirty="0"/>
-              <a:t>Regression lines are nearly strait! </a:t>
-            </a:r>
-            <a:endParaRPr dirty="0"/>
-          </a:p>
-        </p:txBody>
-      </p:sp>
     </p:spTree>
   </p:cSld>
   <p:clrMapOvr>
@@ -11369,6 +11354,775 @@
         </p:txBody>
       </p:sp>
     </p:spTree>
+  </p:cSld>
+  <p:clrMapOvr>
+    <a:masterClrMapping/>
+  </p:clrMapOvr>
+</p:sld>
+</file>
+
+<file path=ppt/slides/slide50.xml><?xml version="1.0" encoding="utf-8"?>
+<p:sld xmlns:a="http://schemas.openxmlformats.org/drawingml/2006/main" xmlns:r="http://schemas.openxmlformats.org/officeDocument/2006/relationships" xmlns:p="http://schemas.openxmlformats.org/presentationml/2006/main">
+  <p:cSld>
+    <p:spTree>
+      <p:nvGrpSpPr>
+        <p:cNvPr id="1" name=""/>
+        <p:cNvGrpSpPr/>
+        <p:nvPr/>
+      </p:nvGrpSpPr>
+      <p:grpSpPr>
+        <a:xfrm>
+          <a:off x="0" y="0"/>
+          <a:ext cx="0" cy="0"/>
+          <a:chOff x="0" y="0"/>
+          <a:chExt cx="0" cy="0"/>
+        </a:xfrm>
+      </p:grpSpPr>
+      <p:sp>
+        <p:nvSpPr>
+          <p:cNvPr id="2" name="Title 1"/>
+          <p:cNvSpPr>
+            <a:spLocks noGrp="1"/>
+          </p:cNvSpPr>
+          <p:nvPr>
+            <p:ph type="title"/>
+          </p:nvPr>
+        </p:nvSpPr>
+        <p:spPr>
+          <a:xfrm>
+            <a:off x="457200" y="205979"/>
+            <a:ext cx="8229600" cy="476927"/>
+          </a:xfrm>
+        </p:spPr>
+        <p:txBody>
+          <a:bodyPr>
+            <a:normAutofit fontScale="90000"/>
+          </a:bodyPr>
+          <a:lstStyle/>
+          <a:p>
+            <a:pPr marL="0" lvl="0" indent="0">
+              <a:buNone/>
+            </a:pPr>
+            <a:r>
+              <a:rPr dirty="0"/>
+              <a:t>Properties of Common Aesthetics</a:t>
+            </a:r>
+          </a:p>
+        </p:txBody>
+      </p:sp>
+      <p:graphicFrame>
+        <p:nvGraphicFramePr>
+          <p:cNvPr id="6" name="Content Placeholder 5"/>
+          <p:cNvGraphicFramePr>
+            <a:graphicFrameLocks noGrp="1"/>
+          </p:cNvGraphicFramePr>
+          <p:nvPr>
+            <p:ph idx="1"/>
+          </p:nvPr>
+        </p:nvGraphicFramePr>
+        <p:xfrm>
+          <a:off x="337595" y="710298"/>
+          <a:ext cx="8613495" cy="4389120"/>
+        </p:xfrm>
+        <a:graphic>
+          <a:graphicData uri="http://schemas.openxmlformats.org/drawingml/2006/table">
+            <a:tbl>
+              <a:tblPr firstRow="1" bandRow="1">
+                <a:tableStyleId>{5C22544A-7EE6-4342-B048-85BDC9FD1C3A}</a:tableStyleId>
+              </a:tblPr>
+              <a:tblGrid>
+                <a:gridCol w="2871165">
+                  <a:extLst>
+                    <a:ext uri="{9D8B030D-6E8A-4147-A177-3AD203B41FA5}">
+                      <a16:colId xmlns:a16="http://schemas.microsoft.com/office/drawing/2014/main" val="20000"/>
+                    </a:ext>
+                  </a:extLst>
+                </a:gridCol>
+                <a:gridCol w="1467412">
+                  <a:extLst>
+                    <a:ext uri="{9D8B030D-6E8A-4147-A177-3AD203B41FA5}">
+                      <a16:colId xmlns:a16="http://schemas.microsoft.com/office/drawing/2014/main" val="20001"/>
+                    </a:ext>
+                  </a:extLst>
+                </a:gridCol>
+                <a:gridCol w="4274918">
+                  <a:extLst>
+                    <a:ext uri="{9D8B030D-6E8A-4147-A177-3AD203B41FA5}">
+                      <a16:colId xmlns:a16="http://schemas.microsoft.com/office/drawing/2014/main" val="20002"/>
+                    </a:ext>
+                  </a:extLst>
+                </a:gridCol>
+              </a:tblGrid>
+              <a:tr h="323776">
+                <a:tc>
+                  <a:txBody>
+                    <a:bodyPr/>
+                    <a:lstStyle/>
+                    <a:p>
+                      <a:pPr marL="0" lvl="0" indent="0" algn="l">
+                        <a:buNone/>
+                      </a:pPr>
+                      <a:r>
+                        <a:rPr sz="1800"/>
+                        <a:t>Property or Aesthetic</a:t>
+                      </a:r>
+                    </a:p>
+                  </a:txBody>
+                  <a:tcPr/>
+                </a:tc>
+                <a:tc>
+                  <a:txBody>
+                    <a:bodyPr/>
+                    <a:lstStyle/>
+                    <a:p>
+                      <a:pPr marL="0" lvl="0" indent="0" algn="l">
+                        <a:buNone/>
+                      </a:pPr>
+                      <a:r>
+                        <a:rPr sz="1800"/>
+                        <a:t>Perception</a:t>
+                      </a:r>
+                    </a:p>
+                  </a:txBody>
+                  <a:tcPr/>
+                </a:tc>
+                <a:tc>
+                  <a:txBody>
+                    <a:bodyPr/>
+                    <a:lstStyle/>
+                    <a:p>
+                      <a:pPr marL="0" lvl="0" indent="0" algn="l">
+                        <a:buNone/>
+                      </a:pPr>
+                      <a:r>
+                        <a:rPr sz="1800" dirty="0"/>
+                        <a:t>Data Types</a:t>
+                      </a:r>
+                    </a:p>
+                  </a:txBody>
+                  <a:tcPr/>
+                </a:tc>
+                <a:extLst>
+                  <a:ext uri="{0D108BD9-81ED-4DB2-BD59-A6C34878D82A}">
+                    <a16:rowId xmlns:a16="http://schemas.microsoft.com/office/drawing/2014/main" val="10000"/>
+                  </a:ext>
+                </a:extLst>
+              </a:tr>
+              <a:tr h="323776">
+                <a:tc>
+                  <a:txBody>
+                    <a:bodyPr/>
+                    <a:lstStyle/>
+                    <a:p>
+                      <a:pPr marL="0" lvl="0" indent="0" algn="l">
+                        <a:buNone/>
+                      </a:pPr>
+                      <a:r>
+                        <a:rPr sz="1800"/>
+                        <a:t>Aspect ratio</a:t>
+                      </a:r>
+                    </a:p>
+                  </a:txBody>
+                  <a:tcPr/>
+                </a:tc>
+                <a:tc>
+                  <a:txBody>
+                    <a:bodyPr/>
+                    <a:lstStyle/>
+                    <a:p>
+                      <a:pPr marL="0" lvl="0" indent="0" algn="l">
+                        <a:buNone/>
+                      </a:pPr>
+                      <a:r>
+                        <a:rPr sz="1800"/>
+                        <a:t>Good</a:t>
+                      </a:r>
+                    </a:p>
+                  </a:txBody>
+                  <a:tcPr/>
+                </a:tc>
+                <a:tc>
+                  <a:txBody>
+                    <a:bodyPr/>
+                    <a:lstStyle/>
+                    <a:p>
+                      <a:pPr marL="0" lvl="0" indent="0" algn="l">
+                        <a:buNone/>
+                      </a:pPr>
+                      <a:r>
+                        <a:rPr sz="1800"/>
+                        <a:t>Numeric</a:t>
+                      </a:r>
+                    </a:p>
+                  </a:txBody>
+                  <a:tcPr/>
+                </a:tc>
+                <a:extLst>
+                  <a:ext uri="{0D108BD9-81ED-4DB2-BD59-A6C34878D82A}">
+                    <a16:rowId xmlns:a16="http://schemas.microsoft.com/office/drawing/2014/main" val="10001"/>
+                  </a:ext>
+                </a:extLst>
+              </a:tr>
+              <a:tr h="323776">
+                <a:tc>
+                  <a:txBody>
+                    <a:bodyPr/>
+                    <a:lstStyle/>
+                    <a:p>
+                      <a:pPr marL="0" lvl="0" indent="0" algn="l">
+                        <a:buNone/>
+                      </a:pPr>
+                      <a:r>
+                        <a:rPr sz="1800"/>
+                        <a:t>Regression lines</a:t>
+                      </a:r>
+                    </a:p>
+                  </a:txBody>
+                  <a:tcPr/>
+                </a:tc>
+                <a:tc>
+                  <a:txBody>
+                    <a:bodyPr/>
+                    <a:lstStyle/>
+                    <a:p>
+                      <a:pPr marL="0" lvl="0" indent="0" algn="l">
+                        <a:buNone/>
+                      </a:pPr>
+                      <a:r>
+                        <a:rPr sz="1800"/>
+                        <a:t>Good</a:t>
+                      </a:r>
+                    </a:p>
+                  </a:txBody>
+                  <a:tcPr/>
+                </a:tc>
+                <a:tc>
+                  <a:txBody>
+                    <a:bodyPr/>
+                    <a:lstStyle/>
+                    <a:p>
+                      <a:pPr marL="0" lvl="0" indent="0" algn="l">
+                        <a:buNone/>
+                      </a:pPr>
+                      <a:r>
+                        <a:rPr sz="1800"/>
+                        <a:t>Numeric plus categorical</a:t>
+                      </a:r>
+                    </a:p>
+                  </a:txBody>
+                  <a:tcPr/>
+                </a:tc>
+                <a:extLst>
+                  <a:ext uri="{0D108BD9-81ED-4DB2-BD59-A6C34878D82A}">
+                    <a16:rowId xmlns:a16="http://schemas.microsoft.com/office/drawing/2014/main" val="10002"/>
+                  </a:ext>
+                </a:extLst>
+              </a:tr>
+              <a:tr h="323776">
+                <a:tc>
+                  <a:txBody>
+                    <a:bodyPr/>
+                    <a:lstStyle/>
+                    <a:p>
+                      <a:pPr marL="0" lvl="0" indent="0" algn="l">
+                        <a:buNone/>
+                      </a:pPr>
+                      <a:r>
+                        <a:rPr sz="1800"/>
+                        <a:t>Marker position</a:t>
+                      </a:r>
+                    </a:p>
+                  </a:txBody>
+                  <a:tcPr/>
+                </a:tc>
+                <a:tc>
+                  <a:txBody>
+                    <a:bodyPr/>
+                    <a:lstStyle/>
+                    <a:p>
+                      <a:pPr marL="0" lvl="0" indent="0" algn="l">
+                        <a:buNone/>
+                      </a:pPr>
+                      <a:r>
+                        <a:rPr sz="1800"/>
+                        <a:t>Good</a:t>
+                      </a:r>
+                    </a:p>
+                  </a:txBody>
+                  <a:tcPr/>
+                </a:tc>
+                <a:tc>
+                  <a:txBody>
+                    <a:bodyPr/>
+                    <a:lstStyle/>
+                    <a:p>
+                      <a:pPr marL="0" lvl="0" indent="0" algn="l">
+                        <a:buNone/>
+                      </a:pPr>
+                      <a:r>
+                        <a:rPr sz="1800"/>
+                        <a:t>Numeric</a:t>
+                      </a:r>
+                    </a:p>
+                  </a:txBody>
+                  <a:tcPr/>
+                </a:tc>
+                <a:extLst>
+                  <a:ext uri="{0D108BD9-81ED-4DB2-BD59-A6C34878D82A}">
+                    <a16:rowId xmlns:a16="http://schemas.microsoft.com/office/drawing/2014/main" val="10003"/>
+                  </a:ext>
+                </a:extLst>
+              </a:tr>
+              <a:tr h="323776">
+                <a:tc>
+                  <a:txBody>
+                    <a:bodyPr/>
+                    <a:lstStyle/>
+                    <a:p>
+                      <a:pPr marL="0" lvl="0" indent="0" algn="l">
+                        <a:buNone/>
+                      </a:pPr>
+                      <a:r>
+                        <a:rPr sz="1800"/>
+                        <a:t>Bar length</a:t>
+                      </a:r>
+                    </a:p>
+                  </a:txBody>
+                  <a:tcPr/>
+                </a:tc>
+                <a:tc>
+                  <a:txBody>
+                    <a:bodyPr/>
+                    <a:lstStyle/>
+                    <a:p>
+                      <a:pPr marL="0" lvl="0" indent="0" algn="l">
+                        <a:buNone/>
+                      </a:pPr>
+                      <a:r>
+                        <a:rPr sz="1800"/>
+                        <a:t>Good</a:t>
+                      </a:r>
+                    </a:p>
+                  </a:txBody>
+                  <a:tcPr/>
+                </a:tc>
+                <a:tc>
+                  <a:txBody>
+                    <a:bodyPr/>
+                    <a:lstStyle/>
+                    <a:p>
+                      <a:pPr marL="0" lvl="0" indent="0" algn="l">
+                        <a:buNone/>
+                      </a:pPr>
+                      <a:r>
+                        <a:rPr sz="1800"/>
+                        <a:t>Counts, numeric</a:t>
+                      </a:r>
+                    </a:p>
+                  </a:txBody>
+                  <a:tcPr/>
+                </a:tc>
+                <a:extLst>
+                  <a:ext uri="{0D108BD9-81ED-4DB2-BD59-A6C34878D82A}">
+                    <a16:rowId xmlns:a16="http://schemas.microsoft.com/office/drawing/2014/main" val="10004"/>
+                  </a:ext>
+                </a:extLst>
+              </a:tr>
+              <a:tr h="323776">
+                <a:tc>
+                  <a:txBody>
+                    <a:bodyPr/>
+                    <a:lstStyle/>
+                    <a:p>
+                      <a:pPr marL="0" lvl="0" indent="0" algn="l">
+                        <a:buNone/>
+                      </a:pPr>
+                      <a:r>
+                        <a:rPr sz="1800"/>
+                        <a:t>Sequential color palette</a:t>
+                      </a:r>
+                    </a:p>
+                  </a:txBody>
+                  <a:tcPr/>
+                </a:tc>
+                <a:tc>
+                  <a:txBody>
+                    <a:bodyPr/>
+                    <a:lstStyle/>
+                    <a:p>
+                      <a:pPr marL="0" lvl="0" indent="0" algn="l">
+                        <a:buNone/>
+                      </a:pPr>
+                      <a:r>
+                        <a:rPr sz="1800"/>
+                        <a:t>Moderate</a:t>
+                      </a:r>
+                    </a:p>
+                  </a:txBody>
+                  <a:tcPr/>
+                </a:tc>
+                <a:tc>
+                  <a:txBody>
+                    <a:bodyPr/>
+                    <a:lstStyle/>
+                    <a:p>
+                      <a:pPr marL="0" lvl="0" indent="0" algn="l">
+                        <a:buNone/>
+                      </a:pPr>
+                      <a:r>
+                        <a:rPr sz="1800"/>
+                        <a:t>Numeric, ordered categorical</a:t>
+                      </a:r>
+                    </a:p>
+                  </a:txBody>
+                  <a:tcPr/>
+                </a:tc>
+                <a:extLst>
+                  <a:ext uri="{0D108BD9-81ED-4DB2-BD59-A6C34878D82A}">
+                    <a16:rowId xmlns:a16="http://schemas.microsoft.com/office/drawing/2014/main" val="10005"/>
+                  </a:ext>
+                </a:extLst>
+              </a:tr>
+              <a:tr h="323776">
+                <a:tc>
+                  <a:txBody>
+                    <a:bodyPr/>
+                    <a:lstStyle/>
+                    <a:p>
+                      <a:pPr marL="0" lvl="0" indent="0" algn="l">
+                        <a:buNone/>
+                      </a:pPr>
+                      <a:r>
+                        <a:rPr sz="1800"/>
+                        <a:t>Marker size</a:t>
+                      </a:r>
+                    </a:p>
+                  </a:txBody>
+                  <a:tcPr/>
+                </a:tc>
+                <a:tc>
+                  <a:txBody>
+                    <a:bodyPr/>
+                    <a:lstStyle/>
+                    <a:p>
+                      <a:pPr marL="0" lvl="0" indent="0" algn="l">
+                        <a:buNone/>
+                      </a:pPr>
+                      <a:r>
+                        <a:rPr sz="1800"/>
+                        <a:t>Moderate</a:t>
+                      </a:r>
+                    </a:p>
+                  </a:txBody>
+                  <a:tcPr/>
+                </a:tc>
+                <a:tc>
+                  <a:txBody>
+                    <a:bodyPr/>
+                    <a:lstStyle/>
+                    <a:p>
+                      <a:pPr marL="0" lvl="0" indent="0" algn="l">
+                        <a:buNone/>
+                      </a:pPr>
+                      <a:r>
+                        <a:rPr sz="1800"/>
+                        <a:t>Numeric, ordered categorical</a:t>
+                      </a:r>
+                    </a:p>
+                  </a:txBody>
+                  <a:tcPr/>
+                </a:tc>
+                <a:extLst>
+                  <a:ext uri="{0D108BD9-81ED-4DB2-BD59-A6C34878D82A}">
+                    <a16:rowId xmlns:a16="http://schemas.microsoft.com/office/drawing/2014/main" val="10006"/>
+                  </a:ext>
+                </a:extLst>
+              </a:tr>
+              <a:tr h="323776">
+                <a:tc>
+                  <a:txBody>
+                    <a:bodyPr/>
+                    <a:lstStyle/>
+                    <a:p>
+                      <a:pPr marL="0" lvl="0" indent="0" algn="l">
+                        <a:buNone/>
+                      </a:pPr>
+                      <a:r>
+                        <a:rPr sz="1800"/>
+                        <a:t>Line types</a:t>
+                      </a:r>
+                    </a:p>
+                  </a:txBody>
+                  <a:tcPr/>
+                </a:tc>
+                <a:tc>
+                  <a:txBody>
+                    <a:bodyPr/>
+                    <a:lstStyle/>
+                    <a:p>
+                      <a:pPr marL="0" lvl="0" indent="0" algn="l">
+                        <a:buNone/>
+                      </a:pPr>
+                      <a:r>
+                        <a:rPr sz="1800"/>
+                        <a:t>Limited</a:t>
+                      </a:r>
+                    </a:p>
+                  </a:txBody>
+                  <a:tcPr/>
+                </a:tc>
+                <a:tc>
+                  <a:txBody>
+                    <a:bodyPr/>
+                    <a:lstStyle/>
+                    <a:p>
+                      <a:pPr marL="0" lvl="0" indent="0" algn="l">
+                        <a:buNone/>
+                      </a:pPr>
+                      <a:r>
+                        <a:rPr sz="1800"/>
+                        <a:t>Categorical</a:t>
+                      </a:r>
+                    </a:p>
+                  </a:txBody>
+                  <a:tcPr/>
+                </a:tc>
+                <a:extLst>
+                  <a:ext uri="{0D108BD9-81ED-4DB2-BD59-A6C34878D82A}">
+                    <a16:rowId xmlns:a16="http://schemas.microsoft.com/office/drawing/2014/main" val="10007"/>
+                  </a:ext>
+                </a:extLst>
+              </a:tr>
+              <a:tr h="323776">
+                <a:tc>
+                  <a:txBody>
+                    <a:bodyPr/>
+                    <a:lstStyle/>
+                    <a:p>
+                      <a:pPr marL="0" lvl="0" indent="0" algn="l">
+                        <a:buNone/>
+                      </a:pPr>
+                      <a:r>
+                        <a:rPr sz="1800"/>
+                        <a:t>Qualitative color palette</a:t>
+                      </a:r>
+                    </a:p>
+                  </a:txBody>
+                  <a:tcPr/>
+                </a:tc>
+                <a:tc>
+                  <a:txBody>
+                    <a:bodyPr/>
+                    <a:lstStyle/>
+                    <a:p>
+                      <a:pPr marL="0" lvl="0" indent="0" algn="l">
+                        <a:buNone/>
+                      </a:pPr>
+                      <a:r>
+                        <a:rPr sz="1800"/>
+                        <a:t>Limited</a:t>
+                      </a:r>
+                    </a:p>
+                  </a:txBody>
+                  <a:tcPr/>
+                </a:tc>
+                <a:tc>
+                  <a:txBody>
+                    <a:bodyPr/>
+                    <a:lstStyle/>
+                    <a:p>
+                      <a:pPr marL="0" lvl="0" indent="0" algn="l">
+                        <a:buNone/>
+                      </a:pPr>
+                      <a:r>
+                        <a:rPr sz="1800"/>
+                        <a:t>Categorical</a:t>
+                      </a:r>
+                    </a:p>
+                  </a:txBody>
+                  <a:tcPr/>
+                </a:tc>
+                <a:extLst>
+                  <a:ext uri="{0D108BD9-81ED-4DB2-BD59-A6C34878D82A}">
+                    <a16:rowId xmlns:a16="http://schemas.microsoft.com/office/drawing/2014/main" val="10008"/>
+                  </a:ext>
+                </a:extLst>
+              </a:tr>
+              <a:tr h="323776">
+                <a:tc>
+                  <a:txBody>
+                    <a:bodyPr/>
+                    <a:lstStyle/>
+                    <a:p>
+                      <a:pPr marL="0" lvl="0" indent="0" algn="l">
+                        <a:buNone/>
+                      </a:pPr>
+                      <a:r>
+                        <a:rPr sz="1800"/>
+                        <a:t>Marker shape</a:t>
+                      </a:r>
+                    </a:p>
+                  </a:txBody>
+                  <a:tcPr/>
+                </a:tc>
+                <a:tc>
+                  <a:txBody>
+                    <a:bodyPr/>
+                    <a:lstStyle/>
+                    <a:p>
+                      <a:pPr marL="0" lvl="0" indent="0" algn="l">
+                        <a:buNone/>
+                      </a:pPr>
+                      <a:r>
+                        <a:rPr sz="1800"/>
+                        <a:t>Limited</a:t>
+                      </a:r>
+                    </a:p>
+                  </a:txBody>
+                  <a:tcPr/>
+                </a:tc>
+                <a:tc>
+                  <a:txBody>
+                    <a:bodyPr/>
+                    <a:lstStyle/>
+                    <a:p>
+                      <a:pPr marL="0" lvl="0" indent="0" algn="l">
+                        <a:buNone/>
+                      </a:pPr>
+                      <a:r>
+                        <a:rPr sz="1800"/>
+                        <a:t>Categorical</a:t>
+                      </a:r>
+                    </a:p>
+                  </a:txBody>
+                  <a:tcPr/>
+                </a:tc>
+                <a:extLst>
+                  <a:ext uri="{0D108BD9-81ED-4DB2-BD59-A6C34878D82A}">
+                    <a16:rowId xmlns:a16="http://schemas.microsoft.com/office/drawing/2014/main" val="10009"/>
+                  </a:ext>
+                </a:extLst>
+              </a:tr>
+              <a:tr h="323776">
+                <a:tc>
+                  <a:txBody>
+                    <a:bodyPr/>
+                    <a:lstStyle/>
+                    <a:p>
+                      <a:pPr marL="0" lvl="0" indent="0" algn="l">
+                        <a:buNone/>
+                      </a:pPr>
+                      <a:r>
+                        <a:rPr sz="1800"/>
+                        <a:t>Area</a:t>
+                      </a:r>
+                    </a:p>
+                  </a:txBody>
+                  <a:tcPr/>
+                </a:tc>
+                <a:tc>
+                  <a:txBody>
+                    <a:bodyPr/>
+                    <a:lstStyle/>
+                    <a:p>
+                      <a:pPr marL="0" lvl="0" indent="0" algn="l">
+                        <a:buNone/>
+                      </a:pPr>
+                      <a:r>
+                        <a:rPr sz="1800"/>
+                        <a:t>Limited</a:t>
+                      </a:r>
+                    </a:p>
+                  </a:txBody>
+                  <a:tcPr/>
+                </a:tc>
+                <a:tc>
+                  <a:txBody>
+                    <a:bodyPr/>
+                    <a:lstStyle/>
+                    <a:p>
+                      <a:pPr marL="0" lvl="0" indent="0" algn="l">
+                        <a:buNone/>
+                      </a:pPr>
+                      <a:r>
+                        <a:rPr sz="1800"/>
+                        <a:t>Numeric or categorical</a:t>
+                      </a:r>
+                    </a:p>
+                  </a:txBody>
+                  <a:tcPr/>
+                </a:tc>
+                <a:extLst>
+                  <a:ext uri="{0D108BD9-81ED-4DB2-BD59-A6C34878D82A}">
+                    <a16:rowId xmlns:a16="http://schemas.microsoft.com/office/drawing/2014/main" val="10010"/>
+                  </a:ext>
+                </a:extLst>
+              </a:tr>
+              <a:tr h="312758">
+                <a:tc>
+                  <a:txBody>
+                    <a:bodyPr/>
+                    <a:lstStyle/>
+                    <a:p>
+                      <a:pPr marL="0" lvl="0" indent="0" algn="l">
+                        <a:buNone/>
+                      </a:pPr>
+                      <a:r>
+                        <a:rPr sz="1800"/>
+                        <a:t>Angle</a:t>
+                      </a:r>
+                    </a:p>
+                  </a:txBody>
+                  <a:tcPr/>
+                </a:tc>
+                <a:tc>
+                  <a:txBody>
+                    <a:bodyPr/>
+                    <a:lstStyle/>
+                    <a:p>
+                      <a:pPr marL="0" lvl="0" indent="0" algn="l">
+                        <a:buNone/>
+                      </a:pPr>
+                      <a:r>
+                        <a:rPr sz="1800"/>
+                        <a:t>Limited</a:t>
+                      </a:r>
+                    </a:p>
+                  </a:txBody>
+                  <a:tcPr/>
+                </a:tc>
+                <a:tc>
+                  <a:txBody>
+                    <a:bodyPr/>
+                    <a:lstStyle/>
+                    <a:p>
+                      <a:pPr marL="0" lvl="0" indent="0" algn="l">
+                        <a:buNone/>
+                      </a:pPr>
+                      <a:r>
+                        <a:rPr sz="1800" dirty="0"/>
+                        <a:t>Numeric</a:t>
+                      </a:r>
+                    </a:p>
+                  </a:txBody>
+                  <a:tcPr/>
+                </a:tc>
+                <a:extLst>
+                  <a:ext uri="{0D108BD9-81ED-4DB2-BD59-A6C34878D82A}">
+                    <a16:rowId xmlns:a16="http://schemas.microsoft.com/office/drawing/2014/main" val="10011"/>
+                  </a:ext>
+                </a:extLst>
+              </a:tr>
+            </a:tbl>
+          </a:graphicData>
+        </a:graphic>
+      </p:graphicFrame>
+    </p:spTree>
+    <p:extLst>
+      <p:ext uri="{BB962C8B-B14F-4D97-AF65-F5344CB8AC3E}">
+        <p14:creationId xmlns:p14="http://schemas.microsoft.com/office/powerpoint/2010/main" val="3380756405"/>
+      </p:ext>
+    </p:extLst>
   </p:cSld>
   <p:clrMapOvr>
     <a:masterClrMapping/>

</xml_diff>

<commit_message>
Small corrections and addition of links to slide deck
</commit_message>
<xml_diff>
--- a/LectureSlides/01_PreceptionForScientificVisualization.pptx
+++ b/LectureSlides/01_PreceptionForScientificVisualization.pptx
@@ -4,6 +4,9 @@
   <p:sldMasterIdLst>
     <p:sldMasterId id="2147483648" r:id="rId1"/>
   </p:sldMasterIdLst>
+  <p:notesMasterIdLst>
+    <p:notesMasterId r:id="rId53"/>
+  </p:notesMasterIdLst>
   <p:sldIdLst>
     <p:sldId id="256" r:id="rId2"/>
     <p:sldId id="257" r:id="rId3"/>
@@ -24,37 +27,38 @@
     <p:sldId id="273" r:id="rId18"/>
     <p:sldId id="274" r:id="rId19"/>
     <p:sldId id="275" r:id="rId20"/>
-    <p:sldId id="276" r:id="rId21"/>
-    <p:sldId id="277" r:id="rId22"/>
-    <p:sldId id="311" r:id="rId23"/>
-    <p:sldId id="278" r:id="rId24"/>
-    <p:sldId id="279" r:id="rId25"/>
-    <p:sldId id="280" r:id="rId26"/>
-    <p:sldId id="281" r:id="rId27"/>
-    <p:sldId id="282" r:id="rId28"/>
-    <p:sldId id="283" r:id="rId29"/>
-    <p:sldId id="284" r:id="rId30"/>
-    <p:sldId id="286" r:id="rId31"/>
-    <p:sldId id="287" r:id="rId32"/>
-    <p:sldId id="312" r:id="rId33"/>
-    <p:sldId id="313" r:id="rId34"/>
-    <p:sldId id="288" r:id="rId35"/>
-    <p:sldId id="290" r:id="rId36"/>
-    <p:sldId id="291" r:id="rId37"/>
-    <p:sldId id="292" r:id="rId38"/>
-    <p:sldId id="293" r:id="rId39"/>
-    <p:sldId id="294" r:id="rId40"/>
-    <p:sldId id="295" r:id="rId41"/>
-    <p:sldId id="296" r:id="rId42"/>
-    <p:sldId id="298" r:id="rId43"/>
-    <p:sldId id="300" r:id="rId44"/>
-    <p:sldId id="301" r:id="rId45"/>
-    <p:sldId id="303" r:id="rId46"/>
-    <p:sldId id="308" r:id="rId47"/>
-    <p:sldId id="304" r:id="rId48"/>
-    <p:sldId id="305" r:id="rId49"/>
-    <p:sldId id="307" r:id="rId50"/>
-    <p:sldId id="314" r:id="rId51"/>
+    <p:sldId id="315" r:id="rId21"/>
+    <p:sldId id="276" r:id="rId22"/>
+    <p:sldId id="277" r:id="rId23"/>
+    <p:sldId id="311" r:id="rId24"/>
+    <p:sldId id="278" r:id="rId25"/>
+    <p:sldId id="279" r:id="rId26"/>
+    <p:sldId id="280" r:id="rId27"/>
+    <p:sldId id="281" r:id="rId28"/>
+    <p:sldId id="282" r:id="rId29"/>
+    <p:sldId id="283" r:id="rId30"/>
+    <p:sldId id="284" r:id="rId31"/>
+    <p:sldId id="286" r:id="rId32"/>
+    <p:sldId id="287" r:id="rId33"/>
+    <p:sldId id="312" r:id="rId34"/>
+    <p:sldId id="313" r:id="rId35"/>
+    <p:sldId id="288" r:id="rId36"/>
+    <p:sldId id="290" r:id="rId37"/>
+    <p:sldId id="291" r:id="rId38"/>
+    <p:sldId id="292" r:id="rId39"/>
+    <p:sldId id="293" r:id="rId40"/>
+    <p:sldId id="294" r:id="rId41"/>
+    <p:sldId id="295" r:id="rId42"/>
+    <p:sldId id="296" r:id="rId43"/>
+    <p:sldId id="298" r:id="rId44"/>
+    <p:sldId id="300" r:id="rId45"/>
+    <p:sldId id="301" r:id="rId46"/>
+    <p:sldId id="303" r:id="rId47"/>
+    <p:sldId id="308" r:id="rId48"/>
+    <p:sldId id="304" r:id="rId49"/>
+    <p:sldId id="305" r:id="rId50"/>
+    <p:sldId id="307" r:id="rId51"/>
+    <p:sldId id="316" r:id="rId52"/>
   </p:sldIdLst>
   <p:sldSz cx="9144000" cy="5143500" type="screen16x9"/>
   <p:notesSz cx="6858000" cy="9144000"/>
@@ -172,6 +176,439 @@
 </p:presentation>
 </file>
 
+<file path=ppt/notesMasters/notesMaster1.xml><?xml version="1.0" encoding="utf-8"?>
+<p:notesMaster xmlns:a="http://schemas.openxmlformats.org/drawingml/2006/main" xmlns:r="http://schemas.openxmlformats.org/officeDocument/2006/relationships" xmlns:p="http://schemas.openxmlformats.org/presentationml/2006/main">
+  <p:cSld>
+    <p:bg>
+      <p:bgRef idx="1001">
+        <a:schemeClr val="bg1"/>
+      </p:bgRef>
+    </p:bg>
+    <p:spTree>
+      <p:nvGrpSpPr>
+        <p:cNvPr id="1" name=""/>
+        <p:cNvGrpSpPr/>
+        <p:nvPr/>
+      </p:nvGrpSpPr>
+      <p:grpSpPr>
+        <a:xfrm>
+          <a:off x="0" y="0"/>
+          <a:ext cx="0" cy="0"/>
+          <a:chOff x="0" y="0"/>
+          <a:chExt cx="0" cy="0"/>
+        </a:xfrm>
+      </p:grpSpPr>
+      <p:sp>
+        <p:nvSpPr>
+          <p:cNvPr id="2" name="Header Placeholder 1"/>
+          <p:cNvSpPr>
+            <a:spLocks noGrp="1"/>
+          </p:cNvSpPr>
+          <p:nvPr>
+            <p:ph type="hdr" sz="quarter"/>
+          </p:nvPr>
+        </p:nvSpPr>
+        <p:spPr>
+          <a:xfrm>
+            <a:off x="0" y="0"/>
+            <a:ext cx="2971800" cy="458788"/>
+          </a:xfrm>
+          <a:prstGeom prst="rect">
+            <a:avLst/>
+          </a:prstGeom>
+        </p:spPr>
+        <p:txBody>
+          <a:bodyPr vert="horz" lIns="91440" tIns="45720" rIns="91440" bIns="45720" rtlCol="0"/>
+          <a:lstStyle>
+            <a:lvl1pPr algn="l">
+              <a:defRPr sz="1200"/>
+            </a:lvl1pPr>
+          </a:lstStyle>
+          <a:p>
+            <a:endParaRPr lang="en-US"/>
+          </a:p>
+        </p:txBody>
+      </p:sp>
+      <p:sp>
+        <p:nvSpPr>
+          <p:cNvPr id="3" name="Date Placeholder 2"/>
+          <p:cNvSpPr>
+            <a:spLocks noGrp="1"/>
+          </p:cNvSpPr>
+          <p:nvPr>
+            <p:ph type="dt" idx="1"/>
+          </p:nvPr>
+        </p:nvSpPr>
+        <p:spPr>
+          <a:xfrm>
+            <a:off x="3884613" y="0"/>
+            <a:ext cx="2971800" cy="458788"/>
+          </a:xfrm>
+          <a:prstGeom prst="rect">
+            <a:avLst/>
+          </a:prstGeom>
+        </p:spPr>
+        <p:txBody>
+          <a:bodyPr vert="horz" lIns="91440" tIns="45720" rIns="91440" bIns="45720" rtlCol="0"/>
+          <a:lstStyle>
+            <a:lvl1pPr algn="r">
+              <a:defRPr sz="1200"/>
+            </a:lvl1pPr>
+          </a:lstStyle>
+          <a:p>
+            <a:fld id="{3C48B955-8536-4BAC-8F14-FFC29379D0BF}" type="datetimeFigureOut">
+              <a:rPr lang="en-US" smtClean="0"/>
+              <a:t>9/3/2024</a:t>
+            </a:fld>
+            <a:endParaRPr lang="en-US"/>
+          </a:p>
+        </p:txBody>
+      </p:sp>
+      <p:sp>
+        <p:nvSpPr>
+          <p:cNvPr id="4" name="Slide Image Placeholder 3"/>
+          <p:cNvSpPr>
+            <a:spLocks noGrp="1" noRot="1" noChangeAspect="1"/>
+          </p:cNvSpPr>
+          <p:nvPr>
+            <p:ph type="sldImg" idx="2"/>
+          </p:nvPr>
+        </p:nvSpPr>
+        <p:spPr>
+          <a:xfrm>
+            <a:off x="685800" y="1143000"/>
+            <a:ext cx="5486400" cy="3086100"/>
+          </a:xfrm>
+          <a:prstGeom prst="rect">
+            <a:avLst/>
+          </a:prstGeom>
+          <a:noFill/>
+          <a:ln w="12700">
+            <a:solidFill>
+              <a:prstClr val="black"/>
+            </a:solidFill>
+          </a:ln>
+        </p:spPr>
+        <p:txBody>
+          <a:bodyPr vert="horz" lIns="91440" tIns="45720" rIns="91440" bIns="45720" rtlCol="0" anchor="ctr"/>
+          <a:lstStyle/>
+          <a:p>
+            <a:endParaRPr lang="en-US"/>
+          </a:p>
+        </p:txBody>
+      </p:sp>
+      <p:sp>
+        <p:nvSpPr>
+          <p:cNvPr id="5" name="Notes Placeholder 4"/>
+          <p:cNvSpPr>
+            <a:spLocks noGrp="1"/>
+          </p:cNvSpPr>
+          <p:nvPr>
+            <p:ph type="body" sz="quarter" idx="3"/>
+          </p:nvPr>
+        </p:nvSpPr>
+        <p:spPr>
+          <a:xfrm>
+            <a:off x="685800" y="4400550"/>
+            <a:ext cx="5486400" cy="3600450"/>
+          </a:xfrm>
+          <a:prstGeom prst="rect">
+            <a:avLst/>
+          </a:prstGeom>
+        </p:spPr>
+        <p:txBody>
+          <a:bodyPr vert="horz" lIns="91440" tIns="45720" rIns="91440" bIns="45720" rtlCol="0"/>
+          <a:lstStyle/>
+          <a:p>
+            <a:pPr lvl="0"/>
+            <a:r>
+              <a:rPr lang="en-US"/>
+              <a:t>Click to edit Master text styles</a:t>
+            </a:r>
+          </a:p>
+          <a:p>
+            <a:pPr lvl="1"/>
+            <a:r>
+              <a:rPr lang="en-US"/>
+              <a:t>Second level</a:t>
+            </a:r>
+          </a:p>
+          <a:p>
+            <a:pPr lvl="2"/>
+            <a:r>
+              <a:rPr lang="en-US"/>
+              <a:t>Third level</a:t>
+            </a:r>
+          </a:p>
+          <a:p>
+            <a:pPr lvl="3"/>
+            <a:r>
+              <a:rPr lang="en-US"/>
+              <a:t>Fourth level</a:t>
+            </a:r>
+          </a:p>
+          <a:p>
+            <a:pPr lvl="4"/>
+            <a:r>
+              <a:rPr lang="en-US"/>
+              <a:t>Fifth level</a:t>
+            </a:r>
+          </a:p>
+        </p:txBody>
+      </p:sp>
+      <p:sp>
+        <p:nvSpPr>
+          <p:cNvPr id="6" name="Footer Placeholder 5"/>
+          <p:cNvSpPr>
+            <a:spLocks noGrp="1"/>
+          </p:cNvSpPr>
+          <p:nvPr>
+            <p:ph type="ftr" sz="quarter" idx="4"/>
+          </p:nvPr>
+        </p:nvSpPr>
+        <p:spPr>
+          <a:xfrm>
+            <a:off x="0" y="8685213"/>
+            <a:ext cx="2971800" cy="458787"/>
+          </a:xfrm>
+          <a:prstGeom prst="rect">
+            <a:avLst/>
+          </a:prstGeom>
+        </p:spPr>
+        <p:txBody>
+          <a:bodyPr vert="horz" lIns="91440" tIns="45720" rIns="91440" bIns="45720" rtlCol="0" anchor="b"/>
+          <a:lstStyle>
+            <a:lvl1pPr algn="l">
+              <a:defRPr sz="1200"/>
+            </a:lvl1pPr>
+          </a:lstStyle>
+          <a:p>
+            <a:endParaRPr lang="en-US"/>
+          </a:p>
+        </p:txBody>
+      </p:sp>
+      <p:sp>
+        <p:nvSpPr>
+          <p:cNvPr id="7" name="Slide Number Placeholder 6"/>
+          <p:cNvSpPr>
+            <a:spLocks noGrp="1"/>
+          </p:cNvSpPr>
+          <p:nvPr>
+            <p:ph type="sldNum" sz="quarter" idx="5"/>
+          </p:nvPr>
+        </p:nvSpPr>
+        <p:spPr>
+          <a:xfrm>
+            <a:off x="3884613" y="8685213"/>
+            <a:ext cx="2971800" cy="458787"/>
+          </a:xfrm>
+          <a:prstGeom prst="rect">
+            <a:avLst/>
+          </a:prstGeom>
+        </p:spPr>
+        <p:txBody>
+          <a:bodyPr vert="horz" lIns="91440" tIns="45720" rIns="91440" bIns="45720" rtlCol="0" anchor="b"/>
+          <a:lstStyle>
+            <a:lvl1pPr algn="r">
+              <a:defRPr sz="1200"/>
+            </a:lvl1pPr>
+          </a:lstStyle>
+          <a:p>
+            <a:fld id="{AA7BAB8E-9F72-444E-B07F-4C82828652A6}" type="slidenum">
+              <a:rPr lang="en-US" smtClean="0"/>
+              <a:t>‹#›</a:t>
+            </a:fld>
+            <a:endParaRPr lang="en-US"/>
+          </a:p>
+        </p:txBody>
+      </p:sp>
+    </p:spTree>
+    <p:extLst>
+      <p:ext uri="{BB962C8B-B14F-4D97-AF65-F5344CB8AC3E}">
+        <p14:creationId xmlns:p14="http://schemas.microsoft.com/office/powerpoint/2010/main" val="2071345499"/>
+      </p:ext>
+    </p:extLst>
+  </p:cSld>
+  <p:clrMap bg1="lt1" tx1="dk1" bg2="lt2" tx2="dk2" accent1="accent1" accent2="accent2" accent3="accent3" accent4="accent4" accent5="accent5" accent6="accent6" hlink="hlink" folHlink="folHlink"/>
+  <p:notesStyle>
+    <a:lvl1pPr marL="0" algn="l" defTabSz="914400" rtl="0" eaLnBrk="1" latinLnBrk="0" hangingPunct="1">
+      <a:defRPr sz="1200" kern="1200">
+        <a:solidFill>
+          <a:schemeClr val="tx1"/>
+        </a:solidFill>
+        <a:latin typeface="+mn-lt"/>
+        <a:ea typeface="+mn-ea"/>
+        <a:cs typeface="+mn-cs"/>
+      </a:defRPr>
+    </a:lvl1pPr>
+    <a:lvl2pPr marL="457200" algn="l" defTabSz="914400" rtl="0" eaLnBrk="1" latinLnBrk="0" hangingPunct="1">
+      <a:defRPr sz="1200" kern="1200">
+        <a:solidFill>
+          <a:schemeClr val="tx1"/>
+        </a:solidFill>
+        <a:latin typeface="+mn-lt"/>
+        <a:ea typeface="+mn-ea"/>
+        <a:cs typeface="+mn-cs"/>
+      </a:defRPr>
+    </a:lvl2pPr>
+    <a:lvl3pPr marL="914400" algn="l" defTabSz="914400" rtl="0" eaLnBrk="1" latinLnBrk="0" hangingPunct="1">
+      <a:defRPr sz="1200" kern="1200">
+        <a:solidFill>
+          <a:schemeClr val="tx1"/>
+        </a:solidFill>
+        <a:latin typeface="+mn-lt"/>
+        <a:ea typeface="+mn-ea"/>
+        <a:cs typeface="+mn-cs"/>
+      </a:defRPr>
+    </a:lvl3pPr>
+    <a:lvl4pPr marL="1371600" algn="l" defTabSz="914400" rtl="0" eaLnBrk="1" latinLnBrk="0" hangingPunct="1">
+      <a:defRPr sz="1200" kern="1200">
+        <a:solidFill>
+          <a:schemeClr val="tx1"/>
+        </a:solidFill>
+        <a:latin typeface="+mn-lt"/>
+        <a:ea typeface="+mn-ea"/>
+        <a:cs typeface="+mn-cs"/>
+      </a:defRPr>
+    </a:lvl4pPr>
+    <a:lvl5pPr marL="1828800" algn="l" defTabSz="914400" rtl="0" eaLnBrk="1" latinLnBrk="0" hangingPunct="1">
+      <a:defRPr sz="1200" kern="1200">
+        <a:solidFill>
+          <a:schemeClr val="tx1"/>
+        </a:solidFill>
+        <a:latin typeface="+mn-lt"/>
+        <a:ea typeface="+mn-ea"/>
+        <a:cs typeface="+mn-cs"/>
+      </a:defRPr>
+    </a:lvl5pPr>
+    <a:lvl6pPr marL="2286000" algn="l" defTabSz="914400" rtl="0" eaLnBrk="1" latinLnBrk="0" hangingPunct="1">
+      <a:defRPr sz="1200" kern="1200">
+        <a:solidFill>
+          <a:schemeClr val="tx1"/>
+        </a:solidFill>
+        <a:latin typeface="+mn-lt"/>
+        <a:ea typeface="+mn-ea"/>
+        <a:cs typeface="+mn-cs"/>
+      </a:defRPr>
+    </a:lvl6pPr>
+    <a:lvl7pPr marL="2743200" algn="l" defTabSz="914400" rtl="0" eaLnBrk="1" latinLnBrk="0" hangingPunct="1">
+      <a:defRPr sz="1200" kern="1200">
+        <a:solidFill>
+          <a:schemeClr val="tx1"/>
+        </a:solidFill>
+        <a:latin typeface="+mn-lt"/>
+        <a:ea typeface="+mn-ea"/>
+        <a:cs typeface="+mn-cs"/>
+      </a:defRPr>
+    </a:lvl7pPr>
+    <a:lvl8pPr marL="3200400" algn="l" defTabSz="914400" rtl="0" eaLnBrk="1" latinLnBrk="0" hangingPunct="1">
+      <a:defRPr sz="1200" kern="1200">
+        <a:solidFill>
+          <a:schemeClr val="tx1"/>
+        </a:solidFill>
+        <a:latin typeface="+mn-lt"/>
+        <a:ea typeface="+mn-ea"/>
+        <a:cs typeface="+mn-cs"/>
+      </a:defRPr>
+    </a:lvl8pPr>
+    <a:lvl9pPr marL="3657600" algn="l" defTabSz="914400" rtl="0" eaLnBrk="1" latinLnBrk="0" hangingPunct="1">
+      <a:defRPr sz="1200" kern="1200">
+        <a:solidFill>
+          <a:schemeClr val="tx1"/>
+        </a:solidFill>
+        <a:latin typeface="+mn-lt"/>
+        <a:ea typeface="+mn-ea"/>
+        <a:cs typeface="+mn-cs"/>
+      </a:defRPr>
+    </a:lvl9pPr>
+  </p:notesStyle>
+</p:notesMaster>
+</file>
+
+<file path=ppt/notesSlides/notesSlide1.xml><?xml version="1.0" encoding="utf-8"?>
+<p:notes xmlns:a="http://schemas.openxmlformats.org/drawingml/2006/main" xmlns:r="http://schemas.openxmlformats.org/officeDocument/2006/relationships" xmlns:p="http://schemas.openxmlformats.org/presentationml/2006/main">
+  <p:cSld>
+    <p:spTree>
+      <p:nvGrpSpPr>
+        <p:cNvPr id="1" name=""/>
+        <p:cNvGrpSpPr/>
+        <p:nvPr/>
+      </p:nvGrpSpPr>
+      <p:grpSpPr>
+        <a:xfrm>
+          <a:off x="0" y="0"/>
+          <a:ext cx="0" cy="0"/>
+          <a:chOff x="0" y="0"/>
+          <a:chExt cx="0" cy="0"/>
+        </a:xfrm>
+      </p:grpSpPr>
+      <p:sp>
+        <p:nvSpPr>
+          <p:cNvPr id="2" name="Slide Image Placeholder 1"/>
+          <p:cNvSpPr>
+            <a:spLocks noGrp="1" noRot="1" noChangeAspect="1"/>
+          </p:cNvSpPr>
+          <p:nvPr>
+            <p:ph type="sldImg"/>
+          </p:nvPr>
+        </p:nvSpPr>
+        <p:spPr/>
+      </p:sp>
+      <p:sp>
+        <p:nvSpPr>
+          <p:cNvPr id="3" name="Notes Placeholder 2"/>
+          <p:cNvSpPr>
+            <a:spLocks noGrp="1"/>
+          </p:cNvSpPr>
+          <p:nvPr>
+            <p:ph type="body" idx="1"/>
+          </p:nvPr>
+        </p:nvSpPr>
+        <p:spPr/>
+        <p:txBody>
+          <a:bodyPr/>
+          <a:lstStyle/>
+          <a:p>
+            <a:endParaRPr lang="en-US" dirty="0"/>
+          </a:p>
+        </p:txBody>
+      </p:sp>
+      <p:sp>
+        <p:nvSpPr>
+          <p:cNvPr id="4" name="Slide Number Placeholder 3"/>
+          <p:cNvSpPr>
+            <a:spLocks noGrp="1"/>
+          </p:cNvSpPr>
+          <p:nvPr>
+            <p:ph type="sldNum" sz="quarter" idx="5"/>
+          </p:nvPr>
+        </p:nvSpPr>
+        <p:spPr/>
+        <p:txBody>
+          <a:bodyPr/>
+          <a:lstStyle/>
+          <a:p>
+            <a:fld id="{AA7BAB8E-9F72-444E-B07F-4C82828652A6}" type="slidenum">
+              <a:rPr lang="en-US" smtClean="0"/>
+              <a:t>32</a:t>
+            </a:fld>
+            <a:endParaRPr lang="en-US"/>
+          </a:p>
+        </p:txBody>
+      </p:sp>
+    </p:spTree>
+    <p:extLst>
+      <p:ext uri="{BB962C8B-B14F-4D97-AF65-F5344CB8AC3E}">
+        <p14:creationId xmlns:p14="http://schemas.microsoft.com/office/powerpoint/2010/main" val="103738504"/>
+      </p:ext>
+    </p:extLst>
+  </p:cSld>
+  <p:clrMapOvr>
+    <a:masterClrMapping/>
+  </p:clrMapOvr>
+</p:notes>
+</file>
+
 <file path=ppt/slideLayouts/slideLayout1.xml><?xml version="1.0" encoding="utf-8"?>
 <p:sldLayout xmlns:a="http://schemas.openxmlformats.org/drawingml/2006/main" xmlns:r="http://schemas.openxmlformats.org/officeDocument/2006/relationships" xmlns:p="http://schemas.openxmlformats.org/presentationml/2006/main" type="title" preserve="1">
   <p:cSld name="Title Slide">
@@ -351,7 +788,7 @@
           <a:p>
             <a:fld id="{241EB5C9-1307-BA42-ABA2-0BC069CD8E7F}" type="datetimeFigureOut">
               <a:rPr lang="en-US" smtClean="0"/>
-              <a:t>8/30/2024</a:t>
+              <a:t>9/3/2024</a:t>
             </a:fld>
             <a:endParaRPr lang="en-US"/>
           </a:p>
@@ -519,7 +956,7 @@
           <a:p>
             <a:fld id="{241EB5C9-1307-BA42-ABA2-0BC069CD8E7F}" type="datetimeFigureOut">
               <a:rPr lang="en-US" smtClean="0"/>
-              <a:t>8/30/2024</a:t>
+              <a:t>9/3/2024</a:t>
             </a:fld>
             <a:endParaRPr lang="en-US"/>
           </a:p>
@@ -697,7 +1134,7 @@
           <a:p>
             <a:fld id="{241EB5C9-1307-BA42-ABA2-0BC069CD8E7F}" type="datetimeFigureOut">
               <a:rPr lang="en-US" smtClean="0"/>
-              <a:t>8/30/2024</a:t>
+              <a:t>9/3/2024</a:t>
             </a:fld>
             <a:endParaRPr lang="en-US"/>
           </a:p>
@@ -865,7 +1302,7 @@
           <a:p>
             <a:fld id="{241EB5C9-1307-BA42-ABA2-0BC069CD8E7F}" type="datetimeFigureOut">
               <a:rPr lang="en-US" smtClean="0"/>
-              <a:t>8/30/2024</a:t>
+              <a:t>9/3/2024</a:t>
             </a:fld>
             <a:endParaRPr lang="en-US"/>
           </a:p>
@@ -1110,7 +1547,7 @@
           <a:p>
             <a:fld id="{241EB5C9-1307-BA42-ABA2-0BC069CD8E7F}" type="datetimeFigureOut">
               <a:rPr lang="en-US" smtClean="0"/>
-              <a:t>8/30/2024</a:t>
+              <a:t>9/3/2024</a:t>
             </a:fld>
             <a:endParaRPr lang="en-US"/>
           </a:p>
@@ -1395,7 +1832,7 @@
           <a:p>
             <a:fld id="{241EB5C9-1307-BA42-ABA2-0BC069CD8E7F}" type="datetimeFigureOut">
               <a:rPr lang="en-US" smtClean="0"/>
-              <a:t>8/30/2024</a:t>
+              <a:t>9/3/2024</a:t>
             </a:fld>
             <a:endParaRPr lang="en-US"/>
           </a:p>
@@ -1814,7 +2251,7 @@
           <a:p>
             <a:fld id="{241EB5C9-1307-BA42-ABA2-0BC069CD8E7F}" type="datetimeFigureOut">
               <a:rPr lang="en-US" smtClean="0"/>
-              <a:t>8/30/2024</a:t>
+              <a:t>9/3/2024</a:t>
             </a:fld>
             <a:endParaRPr lang="en-US"/>
           </a:p>
@@ -1931,7 +2368,7 @@
           <a:p>
             <a:fld id="{241EB5C9-1307-BA42-ABA2-0BC069CD8E7F}" type="datetimeFigureOut">
               <a:rPr lang="en-US" smtClean="0"/>
-              <a:t>8/30/2024</a:t>
+              <a:t>9/3/2024</a:t>
             </a:fld>
             <a:endParaRPr lang="en-US"/>
           </a:p>
@@ -2026,7 +2463,7 @@
           <a:p>
             <a:fld id="{241EB5C9-1307-BA42-ABA2-0BC069CD8E7F}" type="datetimeFigureOut">
               <a:rPr lang="en-US" smtClean="0"/>
-              <a:t>8/30/2024</a:t>
+              <a:t>9/3/2024</a:t>
             </a:fld>
             <a:endParaRPr lang="en-US"/>
           </a:p>
@@ -2301,7 +2738,7 @@
           <a:p>
             <a:fld id="{241EB5C9-1307-BA42-ABA2-0BC069CD8E7F}" type="datetimeFigureOut">
               <a:rPr lang="en-US" smtClean="0"/>
-              <a:t>8/30/2024</a:t>
+              <a:t>9/3/2024</a:t>
             </a:fld>
             <a:endParaRPr lang="en-US"/>
           </a:p>
@@ -2553,7 +2990,7 @@
           <a:p>
             <a:fld id="{241EB5C9-1307-BA42-ABA2-0BC069CD8E7F}" type="datetimeFigureOut">
               <a:rPr lang="en-US" smtClean="0"/>
-              <a:t>8/30/2024</a:t>
+              <a:t>9/3/2024</a:t>
             </a:fld>
             <a:endParaRPr lang="en-US"/>
           </a:p>
@@ -2764,7 +3201,7 @@
           <a:p>
             <a:fld id="{241EB5C9-1307-BA42-ABA2-0BC069CD8E7F}" type="datetimeFigureOut">
               <a:rPr lang="en-US" smtClean="0"/>
-              <a:t>8/30/2024</a:t>
+              <a:t>9/3/2024</a:t>
             </a:fld>
             <a:endParaRPr lang="en-US"/>
           </a:p>
@@ -4640,7 +5077,7 @@
         <p:spPr/>
         <p:txBody>
           <a:bodyPr>
-            <a:normAutofit fontScale="92500" lnSpcReduction="20000"/>
+            <a:normAutofit fontScale="85000" lnSpcReduction="10000"/>
           </a:bodyPr>
           <a:lstStyle/>
           <a:p>
@@ -4690,6 +5127,15 @@
               <a:rPr dirty="0"/>
               <a:t>Determine if a relationship is important</a:t>
             </a:r>
+            <a:endParaRPr lang="en-US" dirty="0"/>
+          </a:p>
+          <a:p>
+            <a:pPr lvl="1"/>
+            <a:r>
+              <a:rPr lang="en-US" dirty="0"/>
+              <a:t>Provide interpretable and actionable results </a:t>
+            </a:r>
+            <a:endParaRPr dirty="0"/>
           </a:p>
           <a:p>
             <a:pPr lvl="0"/>
@@ -4697,6 +5143,11 @@
               <a:rPr dirty="0"/>
               <a:t>Our goal is to gain deep understanding for complex problem</a:t>
             </a:r>
+            <a:r>
+              <a:rPr lang="en-US" dirty="0"/>
+              <a:t>s</a:t>
+            </a:r>
+            <a:endParaRPr dirty="0"/>
           </a:p>
           <a:p>
             <a:pPr lvl="1"/>
@@ -4776,7 +5227,7 @@
         <p:spPr/>
         <p:txBody>
           <a:bodyPr>
-            <a:normAutofit fontScale="85000" lnSpcReduction="20000"/>
+            <a:normAutofit/>
           </a:bodyPr>
           <a:lstStyle/>
           <a:p>
@@ -4825,34 +5276,6 @@
             <a:r>
               <a:rPr dirty="0"/>
               <a:t>Are there errors and outliers in the data?</a:t>
-            </a:r>
-          </a:p>
-          <a:p>
-            <a:pPr lvl="1"/>
-            <a:r>
-              <a:rPr dirty="0"/>
-              <a:t>How good is a model fit?</a:t>
-            </a:r>
-          </a:p>
-          <a:p>
-            <a:pPr lvl="0"/>
-            <a:r>
-              <a:rPr dirty="0"/>
-              <a:t>Communications is an important component of data science</a:t>
-            </a:r>
-          </a:p>
-          <a:p>
-            <a:pPr lvl="1"/>
-            <a:r>
-              <a:rPr dirty="0"/>
-              <a:t>Analytic results are only useful if they are understood and trusted</a:t>
-            </a:r>
-          </a:p>
-          <a:p>
-            <a:pPr lvl="1"/>
-            <a:r>
-              <a:rPr dirty="0"/>
-              <a:t>Graphical presentation greatly assists understanding by less technical colleagues</a:t>
             </a:r>
           </a:p>
         </p:txBody>
@@ -5005,7 +5428,7 @@
               <a:buNone/>
             </a:pPr>
             <a:r>
-              <a:t>Why is Perception Important?</a:t>
+              <a:t>Why Exploration and Visualization?</a:t>
             </a:r>
           </a:p>
         </p:txBody>
@@ -5023,7 +5446,7 @@
         <p:spPr/>
         <p:txBody>
           <a:bodyPr>
-            <a:normAutofit lnSpcReduction="10000"/>
+            <a:normAutofit fontScale="92500" lnSpcReduction="20000"/>
           </a:bodyPr>
           <a:lstStyle/>
           <a:p>
@@ -5032,59 +5455,88 @@
             </a:pPr>
             <a:r>
               <a:rPr b="1" dirty="0"/>
-              <a:t>Goal:</a:t>
-            </a:r>
-            <a:r>
-              <a:rPr dirty="0"/>
-              <a:t> Communicate information visually</a:t>
+              <a:t>Exploratory data analysis (EDA)</a:t>
+            </a:r>
+            <a:r>
+              <a:rPr dirty="0"/>
+              <a:t> tools are essential to good data science</a:t>
             </a:r>
           </a:p>
           <a:p>
             <a:pPr lvl="0"/>
             <a:r>
               <a:rPr dirty="0"/>
-              <a:t>Visualization technique maximize the information a viewer perceives</a:t>
+              <a:t>Why not just start building models?</a:t>
+            </a:r>
+          </a:p>
+          <a:p>
+            <a:pPr lvl="0"/>
+            <a:r>
+              <a:rPr dirty="0"/>
+              <a:t>Communications is an important component of data science</a:t>
             </a:r>
           </a:p>
           <a:p>
             <a:pPr lvl="1"/>
             <a:r>
               <a:rPr dirty="0"/>
-              <a:t>Gain insights when exploring relationships in data</a:t>
-            </a:r>
+              <a:t>Analytic results are only useful if they are understood and trusted</a:t>
+            </a:r>
+            <a:endParaRPr lang="en-US" dirty="0"/>
           </a:p>
           <a:p>
             <a:pPr lvl="1"/>
             <a:r>
-              <a:rPr dirty="0"/>
-              <a:t>Communicate insights to others</a:t>
-            </a:r>
-          </a:p>
-          <a:p>
-            <a:pPr lvl="0"/>
-            <a:r>
-              <a:rPr dirty="0"/>
-              <a:t>Limits o</a:t>
-            </a:r>
-            <a:r>
               <a:rPr lang="en-US" dirty="0"/>
-              <a:t>f</a:t>
-            </a:r>
-            <a:r>
-              <a:rPr dirty="0"/>
-              <a:t> human perception are a significant factor in understanding complex relationships</a:t>
-            </a:r>
-          </a:p>
-          <a:p>
-            <a:pPr lvl="0"/>
-            <a:r>
-              <a:rPr dirty="0"/>
-              <a:t>Can apply results of the considerable research on human perceptions for data visualization</a:t>
-            </a:r>
+              <a:t>Graphical results are easy  interpret </a:t>
+            </a:r>
+            <a:endParaRPr dirty="0"/>
+          </a:p>
+          <a:p>
+            <a:pPr lvl="1"/>
+            <a:r>
+              <a:rPr dirty="0"/>
+              <a:t>Graphical presentation greatly assists understanding by less technica</a:t>
+            </a:r>
+            <a:r>
+              <a:rPr lang="en-US" dirty="0"/>
+              <a:t>l</a:t>
+            </a:r>
+            <a:r>
+              <a:rPr dirty="0"/>
+              <a:t> colleagues</a:t>
+            </a:r>
+            <a:endParaRPr lang="en-US" dirty="0"/>
+          </a:p>
+          <a:p>
+            <a:r>
+              <a:rPr lang="en-US" dirty="0"/>
+              <a:t>How good is a model fit?</a:t>
+            </a:r>
+          </a:p>
+          <a:p>
+            <a:pPr lvl="1"/>
+            <a:r>
+              <a:rPr lang="en-US" dirty="0"/>
+              <a:t>Use EDA methods to explore model results </a:t>
+            </a:r>
+          </a:p>
+          <a:p>
+            <a:pPr lvl="1"/>
+            <a:r>
+              <a:rPr lang="en-US" dirty="0"/>
+              <a:t>Compare model performance</a:t>
+            </a:r>
+            <a:endParaRPr dirty="0"/>
           </a:p>
         </p:txBody>
       </p:sp>
     </p:spTree>
+    <p:extLst>
+      <p:ext uri="{BB962C8B-B14F-4D97-AF65-F5344CB8AC3E}">
+        <p14:creationId xmlns:p14="http://schemas.microsoft.com/office/powerpoint/2010/main" val="1061979417"/>
+      </p:ext>
+    </p:extLst>
   </p:cSld>
   <p:clrMapOvr>
     <a:masterClrMapping/>
@@ -5128,7 +5580,7 @@
               <a:buNone/>
             </a:pPr>
             <a:r>
-              <a:t>Use Aesthetics to Improve Perception</a:t>
+              <a:t>Why is Perception Important?</a:t>
             </a:r>
           </a:p>
         </p:txBody>
@@ -5146,7 +5598,7 @@
         <p:spPr/>
         <p:txBody>
           <a:bodyPr>
-            <a:normAutofit/>
+            <a:normAutofit lnSpcReduction="10000"/>
           </a:bodyPr>
           <a:lstStyle/>
           <a:p>
@@ -5154,43 +5606,55 @@
               <a:buNone/>
             </a:pPr>
             <a:r>
-              <a:rPr dirty="0"/>
-              <a:t>Use aesthetics to improve perception</a:t>
+              <a:rPr b="1" dirty="0"/>
+              <a:t>Goal:</a:t>
+            </a:r>
+            <a:r>
+              <a:rPr dirty="0"/>
+              <a:t> Communicate information visually</a:t>
             </a:r>
           </a:p>
           <a:p>
             <a:pPr lvl="0"/>
             <a:r>
               <a:rPr dirty="0"/>
-              <a:t>We take a very broad view of the term ‘aesthetic’ here</a:t>
+              <a:t>Visualization technique maximize the information a viewer perceives</a:t>
+            </a:r>
+          </a:p>
+          <a:p>
+            <a:pPr lvl="1"/>
+            <a:r>
+              <a:rPr dirty="0"/>
+              <a:t>Gain insights when exploring relationships in data</a:t>
+            </a:r>
+          </a:p>
+          <a:p>
+            <a:pPr lvl="1"/>
+            <a:r>
+              <a:rPr dirty="0"/>
+              <a:t>Communicate insights to others</a:t>
             </a:r>
           </a:p>
           <a:p>
             <a:pPr lvl="0"/>
             <a:r>
               <a:rPr dirty="0"/>
-              <a:t>A plot aesthetics is any property of a visualization which highlight aspects of the data relationships</a:t>
+              <a:t>Limits o</a:t>
+            </a:r>
+            <a:r>
+              <a:rPr lang="en-US" dirty="0"/>
+              <a:t>f</a:t>
+            </a:r>
+            <a:r>
+              <a:rPr dirty="0"/>
+              <a:t> human perception are a significant factor in understanding complex relationships</a:t>
             </a:r>
           </a:p>
           <a:p>
             <a:pPr lvl="0"/>
             <a:r>
               <a:rPr dirty="0"/>
-              <a:t>Aesthetics are used to project additional dimensions of complex data</a:t>
-            </a:r>
-          </a:p>
-          <a:p>
-            <a:pPr lvl="1"/>
-            <a:r>
-              <a:rPr dirty="0"/>
-              <a:t>Plots generally restricted to 2-dimensional surface</a:t>
-            </a:r>
-          </a:p>
-          <a:p>
-            <a:pPr lvl="1"/>
-            <a:r>
-              <a:rPr dirty="0"/>
-              <a:t>Must project multiple dimensions of complex data on 2-d surface</a:t>
+              <a:t>Can apply results of the considerable research on human perceptions for data visualization</a:t>
             </a:r>
           </a:p>
         </p:txBody>
@@ -5265,42 +5729,56 @@
               <a:buNone/>
             </a:pPr>
             <a:r>
-              <a:rPr lang="en-US" b="1" dirty="0"/>
-              <a:t>Important note!!  </a:t>
-            </a:r>
-          </a:p>
-          <a:p>
-            <a:pPr marL="0" lvl="0" indent="0">
-              <a:buNone/>
-            </a:pPr>
-            <a:endParaRPr lang="en-US" dirty="0"/>
-          </a:p>
-          <a:p>
-            <a:pPr marL="0" lvl="0" indent="0" algn="ctr">
-              <a:buNone/>
-            </a:pPr>
-            <a:r>
-              <a:rPr lang="en-US" sz="2800" b="1" dirty="0">
-                <a:solidFill>
-                  <a:srgbClr val="C00000"/>
-                </a:solidFill>
-              </a:rPr>
-              <a:t>I expect you to use good perceptual methodology for creating plots for your project!!</a:t>
-            </a:r>
-            <a:endParaRPr sz="2800" b="1" dirty="0">
-              <a:solidFill>
-                <a:srgbClr val="C00000"/>
-              </a:solidFill>
-            </a:endParaRPr>
+              <a:rPr dirty="0"/>
+              <a:t>Use </a:t>
+            </a:r>
+            <a:r>
+              <a:rPr b="1" dirty="0"/>
+              <a:t>aesthetics</a:t>
+            </a:r>
+            <a:r>
+              <a:rPr dirty="0"/>
+              <a:t> to improve perception</a:t>
+            </a:r>
+          </a:p>
+          <a:p>
+            <a:pPr lvl="0"/>
+            <a:r>
+              <a:rPr dirty="0"/>
+              <a:t>We take a very broad view of the term ‘aesthetic’ here</a:t>
+            </a:r>
+          </a:p>
+          <a:p>
+            <a:pPr lvl="0"/>
+            <a:r>
+              <a:rPr dirty="0"/>
+              <a:t>A plot aesthetics is any property of a visualization which highlight aspects of the data relationships</a:t>
+            </a:r>
+          </a:p>
+          <a:p>
+            <a:pPr lvl="0"/>
+            <a:r>
+              <a:rPr dirty="0"/>
+              <a:t>Aesthetics are used to project additional dimensions of complex data</a:t>
+            </a:r>
+          </a:p>
+          <a:p>
+            <a:pPr lvl="1"/>
+            <a:r>
+              <a:rPr dirty="0"/>
+              <a:t>Plots generally restricted to 2-dimensional surface</a:t>
+            </a:r>
+          </a:p>
+          <a:p>
+            <a:pPr lvl="1"/>
+            <a:r>
+              <a:rPr dirty="0"/>
+              <a:t>Must project multiple dimensions of complex data on 2-d surface</a:t>
+            </a:r>
           </a:p>
         </p:txBody>
       </p:sp>
     </p:spTree>
-    <p:extLst>
-      <p:ext uri="{BB962C8B-B14F-4D97-AF65-F5344CB8AC3E}">
-        <p14:creationId xmlns:p14="http://schemas.microsoft.com/office/powerpoint/2010/main" val="2438337757"/>
-      </p:ext>
-    </p:extLst>
   </p:cSld>
   <p:clrMapOvr>
     <a:masterClrMapping/>
@@ -5344,7 +5822,7 @@
               <a:buNone/>
             </a:pPr>
             <a:r>
-              <a:t>Organization of Plot Aesthetics</a:t>
+              <a:t>Use Aesthetics to Improve Perception</a:t>
             </a:r>
           </a:p>
         </p:txBody>
@@ -5361,55 +5839,51 @@
         </p:nvSpPr>
         <p:spPr/>
         <p:txBody>
-          <a:bodyPr/>
+          <a:bodyPr>
+            <a:normAutofit/>
+          </a:bodyPr>
           <a:lstStyle/>
           <a:p>
             <a:pPr marL="0" lvl="0" indent="0">
               <a:buNone/>
             </a:pPr>
             <a:r>
-              <a:t>We can organize aesthetics by their effectiveness:</a:t>
-            </a:r>
-          </a:p>
-          <a:p>
-            <a:pPr marL="342900" lvl="0" indent="-342900">
-              <a:buAutoNum type="arabicPeriod"/>
+              <a:rPr lang="en-US" b="1" dirty="0"/>
+              <a:t>Important note!!  </a:t>
+            </a:r>
+          </a:p>
+          <a:p>
+            <a:pPr marL="0" lvl="0" indent="0">
+              <a:buNone/>
             </a:pPr>
-            <a:r>
-              <a:rPr b="1"/>
-              <a:t>Easy to perceive plot aesthetics:</a:t>
-            </a:r>
-            <a:r>
-              <a:t> help most people gain understanding of data relationships</a:t>
-            </a:r>
-          </a:p>
-          <a:p>
-            <a:pPr marL="342900" lvl="0" indent="-342900">
-              <a:buAutoNum type="arabicPeriod"/>
+            <a:endParaRPr lang="en-US" dirty="0"/>
+          </a:p>
+          <a:p>
+            <a:pPr marL="0" lvl="0" indent="0" algn="ctr">
+              <a:buNone/>
             </a:pPr>
             <a:r>
-              <a:rPr b="1"/>
-              <a:t>Aesthetics with moderate perceptive power:</a:t>
-            </a:r>
-            <a:r>
-              <a:t> useful properties to project data relationships when used sparingly</a:t>
-            </a:r>
-          </a:p>
-          <a:p>
-            <a:pPr marL="342900" lvl="0" indent="-342900">
-              <a:buAutoNum type="arabicPeriod"/>
-            </a:pPr>
-            <a:r>
-              <a:rPr b="1"/>
-              <a:t>Aesthetics with limited perceptive power:</a:t>
-            </a:r>
-            <a:r>
-              <a:t> useful within strict limits</a:t>
-            </a:r>
+              <a:rPr lang="en-US" sz="2800" b="1" dirty="0">
+                <a:solidFill>
+                  <a:srgbClr val="C00000"/>
+                </a:solidFill>
+              </a:rPr>
+              <a:t>I expect you to use good perceptual methodology for creating plots for your project!!</a:t>
+            </a:r>
+            <a:endParaRPr sz="2800" b="1" dirty="0">
+              <a:solidFill>
+                <a:srgbClr val="C00000"/>
+              </a:solidFill>
+            </a:endParaRPr>
           </a:p>
         </p:txBody>
       </p:sp>
     </p:spTree>
+    <p:extLst>
+      <p:ext uri="{BB962C8B-B14F-4D97-AF65-F5344CB8AC3E}">
+        <p14:creationId xmlns:p14="http://schemas.microsoft.com/office/powerpoint/2010/main" val="2438337757"/>
+      </p:ext>
+    </p:extLst>
   </p:cSld>
   <p:clrMapOvr>
     <a:masterClrMapping/>
@@ -5444,6 +5918,115 @@
             <p:ph type="title"/>
           </p:nvPr>
         </p:nvSpPr>
+        <p:spPr/>
+        <p:txBody>
+          <a:bodyPr/>
+          <a:lstStyle/>
+          <a:p>
+            <a:pPr marL="0" lvl="0" indent="0">
+              <a:buNone/>
+            </a:pPr>
+            <a:r>
+              <a:t>Organization of Plot Aesthetics</a:t>
+            </a:r>
+          </a:p>
+        </p:txBody>
+      </p:sp>
+      <p:sp>
+        <p:nvSpPr>
+          <p:cNvPr id="3" name="Content Placeholder 2"/>
+          <p:cNvSpPr>
+            <a:spLocks noGrp="1"/>
+          </p:cNvSpPr>
+          <p:nvPr>
+            <p:ph idx="1"/>
+          </p:nvPr>
+        </p:nvSpPr>
+        <p:spPr/>
+        <p:txBody>
+          <a:bodyPr/>
+          <a:lstStyle/>
+          <a:p>
+            <a:pPr marL="0" lvl="0" indent="0">
+              <a:buNone/>
+            </a:pPr>
+            <a:r>
+              <a:t>We can organize aesthetics by their effectiveness:</a:t>
+            </a:r>
+          </a:p>
+          <a:p>
+            <a:pPr marL="342900" lvl="0" indent="-342900">
+              <a:buAutoNum type="arabicPeriod"/>
+            </a:pPr>
+            <a:r>
+              <a:rPr b="1"/>
+              <a:t>Easy to perceive plot aesthetics:</a:t>
+            </a:r>
+            <a:r>
+              <a:t> help most people gain understanding of data relationships</a:t>
+            </a:r>
+          </a:p>
+          <a:p>
+            <a:pPr marL="342900" lvl="0" indent="-342900">
+              <a:buAutoNum type="arabicPeriod"/>
+            </a:pPr>
+            <a:r>
+              <a:rPr b="1"/>
+              <a:t>Aesthetics with moderate perceptive power:</a:t>
+            </a:r>
+            <a:r>
+              <a:t> useful properties to project data relationships when used sparingly</a:t>
+            </a:r>
+          </a:p>
+          <a:p>
+            <a:pPr marL="342900" lvl="0" indent="-342900">
+              <a:buAutoNum type="arabicPeriod"/>
+            </a:pPr>
+            <a:r>
+              <a:rPr b="1"/>
+              <a:t>Aesthetics with limited perceptive power:</a:t>
+            </a:r>
+            <a:r>
+              <a:t> useful within strict limits</a:t>
+            </a:r>
+          </a:p>
+        </p:txBody>
+      </p:sp>
+    </p:spTree>
+  </p:cSld>
+  <p:clrMapOvr>
+    <a:masterClrMapping/>
+  </p:clrMapOvr>
+</p:sld>
+</file>
+
+<file path=ppt/slides/slide25.xml><?xml version="1.0" encoding="utf-8"?>
+<p:sld xmlns:a="http://schemas.openxmlformats.org/drawingml/2006/main" xmlns:r="http://schemas.openxmlformats.org/officeDocument/2006/relationships" xmlns:p="http://schemas.openxmlformats.org/presentationml/2006/main">
+  <p:cSld>
+    <p:spTree>
+      <p:nvGrpSpPr>
+        <p:cNvPr id="1" name=""/>
+        <p:cNvGrpSpPr/>
+        <p:nvPr/>
+      </p:nvGrpSpPr>
+      <p:grpSpPr>
+        <a:xfrm>
+          <a:off x="0" y="0"/>
+          <a:ext cx="0" cy="0"/>
+          <a:chOff x="0" y="0"/>
+          <a:chExt cx="0" cy="0"/>
+        </a:xfrm>
+      </p:grpSpPr>
+      <p:sp>
+        <p:nvSpPr>
+          <p:cNvPr id="2" name="Title 1"/>
+          <p:cNvSpPr>
+            <a:spLocks noGrp="1"/>
+          </p:cNvSpPr>
+          <p:nvPr>
+            <p:ph type="title"/>
+          </p:nvPr>
+        </p:nvSpPr>
         <p:spPr>
           <a:xfrm>
             <a:off x="457200" y="205979"/>
@@ -5476,7 +6059,7 @@
             <p:ph idx="1"/>
             <p:extLst>
               <p:ext uri="{D42A27DB-BD31-4B8C-83A1-F6EECF244321}">
-                <p14:modId xmlns:p14="http://schemas.microsoft.com/office/powerpoint/2010/main" val="4132571391"/>
+                <p14:modId xmlns:p14="http://schemas.microsoft.com/office/powerpoint/2010/main" val="719774672"/>
               </p:ext>
             </p:extLst>
           </p:nvPr>
@@ -5611,9 +6194,10 @@
                         <a:buNone/>
                       </a:pPr>
                       <a:r>
-                        <a:rPr sz="1800"/>
-                        <a:t>Numeric</a:t>
+                        <a:rPr lang="en-US" sz="1800" dirty="0"/>
+                        <a:t>Any</a:t>
                       </a:r>
+                      <a:endParaRPr sz="1800" dirty="0"/>
                     </a:p>
                   </a:txBody>
                   <a:tcPr/>
@@ -5666,8 +6250,16 @@
                         <a:buNone/>
                       </a:pPr>
                       <a:r>
-                        <a:rPr sz="1800"/>
-                        <a:t>Numeric plus categorical</a:t>
+                        <a:rPr sz="1800" dirty="0"/>
+                        <a:t>Numeric</a:t>
+                      </a:r>
+                      <a:r>
+                        <a:rPr lang="en-US" sz="1800" dirty="0"/>
+                        <a:t>,</a:t>
+                      </a:r>
+                      <a:r>
+                        <a:rPr sz="1800" dirty="0"/>
+                        <a:t> categorical</a:t>
                       </a:r>
                     </a:p>
                   </a:txBody>
@@ -5721,9 +6313,14 @@
                         <a:buNone/>
                       </a:pPr>
                       <a:r>
-                        <a:rPr sz="1800"/>
+                        <a:rPr sz="1800" dirty="0"/>
                         <a:t>Numeric</a:t>
                       </a:r>
+                      <a:r>
+                        <a:rPr lang="en-US" sz="1800" dirty="0"/>
+                        <a:t>, counts</a:t>
+                      </a:r>
+                      <a:endParaRPr sz="1800" dirty="0"/>
                     </a:p>
                   </a:txBody>
                   <a:tcPr/>
@@ -5831,8 +6428,16 @@
                         <a:buNone/>
                       </a:pPr>
                       <a:r>
-                        <a:rPr sz="1800"/>
-                        <a:t>Numeric, ordered categorical</a:t>
+                        <a:rPr sz="1800" dirty="0"/>
+                        <a:t>Numeric, </a:t>
+                      </a:r>
+                      <a:r>
+                        <a:rPr lang="en-US" sz="1800" dirty="0"/>
+                        <a:t>counts, </a:t>
+                      </a:r>
+                      <a:r>
+                        <a:rPr sz="1800" dirty="0"/>
+                        <a:t>ordered categorical</a:t>
                       </a:r>
                     </a:p>
                   </a:txBody>
@@ -5886,8 +6491,16 @@
                         <a:buNone/>
                       </a:pPr>
                       <a:r>
-                        <a:rPr sz="1800"/>
-                        <a:t>Numeric, ordered categorical</a:t>
+                        <a:rPr sz="1800" dirty="0"/>
+                        <a:t>Numeric, </a:t>
+                      </a:r>
+                      <a:r>
+                        <a:rPr lang="en-US" sz="1800" dirty="0"/>
+                        <a:t>counts, </a:t>
+                      </a:r>
+                      <a:r>
+                        <a:rPr sz="1800" dirty="0"/>
+                        <a:t>ordered categorical</a:t>
                       </a:r>
                     </a:p>
                   </a:txBody>
@@ -6106,8 +6719,24 @@
                         <a:buNone/>
                       </a:pPr>
                       <a:r>
-                        <a:rPr sz="1800"/>
-                        <a:t>Numeric or categorical</a:t>
+                        <a:rPr sz="1800" dirty="0"/>
+                        <a:t>Numeric</a:t>
+                      </a:r>
+                      <a:r>
+                        <a:rPr lang="en-US" sz="1800" dirty="0"/>
+                        <a:t>, counts,</a:t>
+                      </a:r>
+                      <a:r>
+                        <a:rPr sz="1800" dirty="0"/>
+                        <a:t> </a:t>
+                      </a:r>
+                      <a:r>
+                        <a:rPr lang="en-US" sz="1800" dirty="0"/>
+                        <a:t>ordered </a:t>
+                      </a:r>
+                      <a:r>
+                        <a:rPr sz="1800" dirty="0"/>
+                        <a:t>categorical</a:t>
                       </a:r>
                     </a:p>
                   </a:txBody>
@@ -6186,7 +6815,7 @@
 </p:sld>
 </file>
 
-<file path=ppt/slides/slide25.xml><?xml version="1.0" encoding="utf-8"?>
+<file path=ppt/slides/slide26.xml><?xml version="1.0" encoding="utf-8"?>
 <p:sld xmlns:a="http://schemas.openxmlformats.org/drawingml/2006/main" xmlns:r="http://schemas.openxmlformats.org/officeDocument/2006/relationships" xmlns:p="http://schemas.openxmlformats.org/presentationml/2006/main">
   <p:cSld>
     <p:spTree>
@@ -6227,8 +6856,8 @@
           </a:p>
         </p:txBody>
       </p:sp>
-      <mc:AlternateContent xmlns:mc="http://schemas.openxmlformats.org/markup-compatibility/2006" xmlns:a14="http://schemas.microsoft.com/office/drawing/2010/main">
-        <mc:Choice Requires="a14">
+      <mc:AlternateContent xmlns:mc="http://schemas.openxmlformats.org/markup-compatibility/2006">
+        <mc:Choice xmlns:a14="http://schemas.microsoft.com/office/drawing/2010/main" Requires="a14">
           <p:sp>
             <p:nvSpPr>
               <p:cNvPr id="3" name="Content Placeholder 2"/>
@@ -6269,7 +6898,15 @@
                 <a:pPr lvl="0"/>
                 <a:r>
                   <a:rPr dirty="0"/>
-                  <a:t>But, wrong aspect ratio can hide or mislead!</a:t>
+                  <a:t>But, </a:t>
+                </a:r>
+                <a:r>
+                  <a:rPr lang="en-US" dirty="0"/>
+                  <a:t>poor choice of</a:t>
+                </a:r>
+                <a:r>
+                  <a:rPr dirty="0"/>
+                  <a:t> aspect ratio can hide or mislead!</a:t>
                 </a:r>
               </a:p>
               <a:p>
@@ -6350,14 +6987,18 @@
               <a:p>
                 <a:pPr lvl="1"/>
                 <a:r>
+                  <a:rPr lang="en-US" dirty="0"/>
+                  <a:t>B</a:t>
+                </a:r>
+                <a:r>
                   <a:rPr dirty="0"/>
-                  <a:t>Optimal banking angle controlled by aspect ratio</a:t>
+                  <a:t>anking angle controlled by aspect ratio</a:t>
                 </a:r>
               </a:p>
             </p:txBody>
           </p:sp>
         </mc:Choice>
-        <mc:Fallback xmlns="">
+        <mc:Fallback>
           <p:sp>
             <p:nvSpPr>
               <p:cNvPr id="3" name="Content Placeholder 2"/>
@@ -6399,7 +7040,7 @@
 </p:sld>
 </file>
 
-<file path=ppt/slides/slide26.xml><?xml version="1.0" encoding="utf-8"?>
+<file path=ppt/slides/slide27.xml><?xml version="1.0" encoding="utf-8"?>
 <p:sld xmlns:a="http://schemas.openxmlformats.org/drawingml/2006/main" xmlns:r="http://schemas.openxmlformats.org/officeDocument/2006/relationships" xmlns:p="http://schemas.openxmlformats.org/presentationml/2006/main">
   <p:cSld>
     <p:spTree>
@@ -6450,9 +7091,16 @@
             <p:ph idx="1"/>
           </p:nvPr>
         </p:nvSpPr>
-        <p:spPr/>
-        <p:txBody>
-          <a:bodyPr/>
+        <p:spPr>
+          <a:xfrm>
+            <a:off x="457200" y="1200150"/>
+            <a:ext cx="8229600" cy="3778249"/>
+          </a:xfrm>
+        </p:spPr>
+        <p:txBody>
+          <a:bodyPr>
+            <a:normAutofit/>
+          </a:bodyPr>
           <a:lstStyle/>
           <a:p>
             <a:pPr marL="0" lvl="0" indent="0">
@@ -6460,15 +7108,19 @@
             </a:pPr>
             <a:r>
               <a:rPr dirty="0"/>
-              <a:t>Longest scientific time series</a:t>
+              <a:t>Longest</a:t>
             </a:r>
             <a:r>
               <a:rPr lang="en-US" dirty="0"/>
-              <a:t> in </a:t>
-            </a:r>
-            <a:r>
-              <a:rPr lang="en-US" dirty="0" err="1"/>
-              <a:t>existance</a:t>
+              <a:t> directly measured</a:t>
+            </a:r>
+            <a:r>
+              <a:rPr dirty="0"/>
+              <a:t> scientific time series</a:t>
+            </a:r>
+            <a:r>
+              <a:rPr lang="en-US" dirty="0"/>
+              <a:t> in existence</a:t>
             </a:r>
             <a:r>
               <a:rPr dirty="0"/>
@@ -6490,6 +7142,32 @@
 ## 3  1703.0         23.0
 ## 4  1704.0         36.0</a:t>
             </a:r>
+            <a:endParaRPr lang="en-US" sz="2000" dirty="0">
+              <a:latin typeface="Courier"/>
+            </a:endParaRPr>
+          </a:p>
+          <a:p>
+            <a:pPr lvl="0" indent="0">
+              <a:buNone/>
+            </a:pPr>
+            <a:endParaRPr lang="en-US" sz="2000" dirty="0">
+              <a:latin typeface="Courier"/>
+            </a:endParaRPr>
+          </a:p>
+          <a:p>
+            <a:pPr lvl="0" indent="0">
+              <a:buNone/>
+            </a:pPr>
+            <a:r>
+              <a:rPr lang="en-US" sz="1800" dirty="0">
+                <a:solidFill>
+                  <a:schemeClr val="accent2">
+                    <a:lumMod val="75000"/>
+                  </a:schemeClr>
+                </a:solidFill>
+              </a:rPr>
+              <a:t>* Longest directly observed temperature series starts in 1772</a:t>
+            </a:r>
           </a:p>
         </p:txBody>
       </p:sp>
@@ -6501,7 +7179,7 @@
 </p:sld>
 </file>
 
-<file path=ppt/slides/slide27.xml><?xml version="1.0" encoding="utf-8"?>
+<file path=ppt/slides/slide28.xml><?xml version="1.0" encoding="utf-8"?>
 <p:sld xmlns:a="http://schemas.openxmlformats.org/drawingml/2006/main" xmlns:r="http://schemas.openxmlformats.org/officeDocument/2006/relationships" xmlns:p="http://schemas.openxmlformats.org/presentationml/2006/main">
   <p:cSld>
     <p:spTree>
@@ -6648,7 +7326,7 @@
 </p:sld>
 </file>
 
-<file path=ppt/slides/slide28.xml><?xml version="1.0" encoding="utf-8"?>
+<file path=ppt/slides/slide29.xml><?xml version="1.0" encoding="utf-8"?>
 <p:sld xmlns:a="http://schemas.openxmlformats.org/drawingml/2006/main" xmlns:r="http://schemas.openxmlformats.org/officeDocument/2006/relationships" xmlns:p="http://schemas.openxmlformats.org/presentationml/2006/main">
   <p:cSld>
     <p:spTree>
@@ -6798,167 +7476,6 @@
 </p:sld>
 </file>
 
-<file path=ppt/slides/slide29.xml><?xml version="1.0" encoding="utf-8"?>
-<p:sld xmlns:a="http://schemas.openxmlformats.org/drawingml/2006/main" xmlns:r="http://schemas.openxmlformats.org/officeDocument/2006/relationships" xmlns:p="http://schemas.openxmlformats.org/presentationml/2006/main">
-  <p:cSld>
-    <p:spTree>
-      <p:nvGrpSpPr>
-        <p:cNvPr id="1" name=""/>
-        <p:cNvGrpSpPr/>
-        <p:nvPr/>
-      </p:nvGrpSpPr>
-      <p:grpSpPr>
-        <a:xfrm>
-          <a:off x="0" y="0"/>
-          <a:ext cx="0" cy="0"/>
-          <a:chOff x="0" y="0"/>
-          <a:chExt cx="0" cy="0"/>
-        </a:xfrm>
-      </p:grpSpPr>
-      <p:sp>
-        <p:nvSpPr>
-          <p:cNvPr id="2" name="Title 1"/>
-          <p:cNvSpPr>
-            <a:spLocks noGrp="1"/>
-          </p:cNvSpPr>
-          <p:nvPr>
-            <p:ph type="title"/>
-          </p:nvPr>
-        </p:nvSpPr>
-        <p:spPr/>
-        <p:txBody>
-          <a:bodyPr/>
-          <a:lstStyle/>
-          <a:p>
-            <a:pPr marL="0" lvl="0" indent="0">
-              <a:buNone/>
-            </a:pPr>
-            <a:r>
-              <a:t>Sequential and Divergent Color Palettes</a:t>
-            </a:r>
-          </a:p>
-        </p:txBody>
-      </p:sp>
-      <p:sp>
-        <p:nvSpPr>
-          <p:cNvPr id="3" name="Content Placeholder 2"/>
-          <p:cNvSpPr>
-            <a:spLocks noGrp="1"/>
-          </p:cNvSpPr>
-          <p:nvPr>
-            <p:ph idx="1"/>
-          </p:nvPr>
-        </p:nvSpPr>
-        <p:spPr/>
-        <p:txBody>
-          <a:bodyPr>
-            <a:normAutofit lnSpcReduction="10000"/>
-          </a:bodyPr>
-          <a:lstStyle/>
-          <a:p>
-            <a:pPr marL="0" lvl="0" indent="0">
-              <a:buNone/>
-            </a:pPr>
-            <a:r>
-              <a:rPr dirty="0"/>
-              <a:t>Use of </a:t>
-            </a:r>
-            <a:r>
-              <a:rPr b="1" dirty="0"/>
-              <a:t>color</a:t>
-            </a:r>
-            <a:r>
-              <a:rPr dirty="0"/>
-              <a:t> as an aesthetic in visualization is a complicated subject.</a:t>
-            </a:r>
-          </a:p>
-          <a:p>
-            <a:pPr lvl="0"/>
-            <a:r>
-              <a:rPr dirty="0"/>
-              <a:t>color is often used, also </a:t>
-            </a:r>
-            <a:r>
-              <a:rPr b="1" dirty="0"/>
-              <a:t>often abused</a:t>
-            </a:r>
-            <a:r>
-              <a:rPr lang="en-US" b="1" dirty="0"/>
-              <a:t>!</a:t>
-            </a:r>
-            <a:endParaRPr b="1" dirty="0"/>
-          </a:p>
-          <a:p>
-            <a:pPr lvl="0"/>
-            <a:r>
-              <a:rPr dirty="0"/>
-              <a:t>A </a:t>
-            </a:r>
-            <a:r>
-              <a:rPr b="1" dirty="0"/>
-              <a:t>qualitative palette</a:t>
-            </a:r>
-            <a:r>
-              <a:rPr dirty="0"/>
-              <a:t> is a palette of individual colors for categorical values</a:t>
-            </a:r>
-          </a:p>
-          <a:p>
-            <a:pPr lvl="0"/>
-            <a:r>
-              <a:rPr b="1" dirty="0"/>
-              <a:t>Sequential palettes</a:t>
-            </a:r>
-            <a:r>
-              <a:rPr dirty="0"/>
-              <a:t> and </a:t>
-            </a:r>
-            <a:r>
-              <a:rPr b="1" dirty="0"/>
-              <a:t>divergent palettes</a:t>
-            </a:r>
-            <a:r>
-              <a:rPr dirty="0"/>
-              <a:t> are a sequence of colors</a:t>
-            </a:r>
-          </a:p>
-          <a:p>
-            <a:pPr lvl="1"/>
-            <a:r>
-              <a:rPr dirty="0"/>
-              <a:t>Numeric variables</a:t>
-            </a:r>
-          </a:p>
-          <a:p>
-            <a:pPr lvl="1"/>
-            <a:r>
-              <a:rPr dirty="0"/>
-              <a:t>Ord</a:t>
-            </a:r>
-            <a:r>
-              <a:rPr lang="en-US" dirty="0"/>
-              <a:t>inal or ord</a:t>
-            </a:r>
-            <a:r>
-              <a:rPr dirty="0"/>
-              <a:t>ered categorical variable</a:t>
-            </a:r>
-            <a:r>
-              <a:rPr lang="en-US" dirty="0"/>
-              <a:t>s</a:t>
-            </a:r>
-            <a:endParaRPr dirty="0"/>
-          </a:p>
-        </p:txBody>
-      </p:sp>
-    </p:spTree>
-  </p:cSld>
-  <p:clrMapOvr>
-    <a:masterClrMapping/>
-  </p:clrMapOvr>
-</p:sld>
-</file>
-
 <file path=ppt/slides/slide3.xml><?xml version="1.0" encoding="utf-8"?>
 <p:sld xmlns:a="http://schemas.openxmlformats.org/drawingml/2006/main" xmlns:r="http://schemas.openxmlformats.org/officeDocument/2006/relationships" xmlns:p="http://schemas.openxmlformats.org/presentationml/2006/main">
   <p:cSld>
@@ -7101,6 +7618,197 @@
 </file>
 
 <file path=ppt/slides/slide30.xml><?xml version="1.0" encoding="utf-8"?>
+<p:sld xmlns:a="http://schemas.openxmlformats.org/drawingml/2006/main" xmlns:r="http://schemas.openxmlformats.org/officeDocument/2006/relationships" xmlns:p="http://schemas.openxmlformats.org/presentationml/2006/main">
+  <p:cSld>
+    <p:spTree>
+      <p:nvGrpSpPr>
+        <p:cNvPr id="1" name=""/>
+        <p:cNvGrpSpPr/>
+        <p:nvPr/>
+      </p:nvGrpSpPr>
+      <p:grpSpPr>
+        <a:xfrm>
+          <a:off x="0" y="0"/>
+          <a:ext cx="0" cy="0"/>
+          <a:chOff x="0" y="0"/>
+          <a:chExt cx="0" cy="0"/>
+        </a:xfrm>
+      </p:grpSpPr>
+      <p:sp>
+        <p:nvSpPr>
+          <p:cNvPr id="2" name="Title 1"/>
+          <p:cNvSpPr>
+            <a:spLocks noGrp="1"/>
+          </p:cNvSpPr>
+          <p:nvPr>
+            <p:ph type="title"/>
+          </p:nvPr>
+        </p:nvSpPr>
+        <p:spPr/>
+        <p:txBody>
+          <a:bodyPr/>
+          <a:lstStyle/>
+          <a:p>
+            <a:pPr marL="0" lvl="0" indent="0">
+              <a:buNone/>
+            </a:pPr>
+            <a:r>
+              <a:t>Sequential and Divergent Color Palettes</a:t>
+            </a:r>
+          </a:p>
+        </p:txBody>
+      </p:sp>
+      <p:sp>
+        <p:nvSpPr>
+          <p:cNvPr id="3" name="Content Placeholder 2"/>
+          <p:cNvSpPr>
+            <a:spLocks noGrp="1"/>
+          </p:cNvSpPr>
+          <p:nvPr>
+            <p:ph idx="1"/>
+          </p:nvPr>
+        </p:nvSpPr>
+        <p:spPr>
+          <a:xfrm>
+            <a:off x="457200" y="1200150"/>
+            <a:ext cx="8229600" cy="3839209"/>
+          </a:xfrm>
+        </p:spPr>
+        <p:txBody>
+          <a:bodyPr>
+            <a:normAutofit fontScale="92500" lnSpcReduction="10000"/>
+          </a:bodyPr>
+          <a:lstStyle/>
+          <a:p>
+            <a:pPr marL="0" lvl="0" indent="0">
+              <a:buNone/>
+            </a:pPr>
+            <a:r>
+              <a:rPr dirty="0"/>
+              <a:t>Use of </a:t>
+            </a:r>
+            <a:r>
+              <a:rPr b="1" dirty="0"/>
+              <a:t>color</a:t>
+            </a:r>
+            <a:r>
+              <a:rPr dirty="0"/>
+              <a:t> as an aesthetic in visualization is a complicated subject.</a:t>
+            </a:r>
+          </a:p>
+          <a:p>
+            <a:pPr lvl="0"/>
+            <a:r>
+              <a:rPr dirty="0"/>
+              <a:t>color is often used, also </a:t>
+            </a:r>
+            <a:r>
+              <a:rPr b="1" dirty="0"/>
+              <a:t>often abused</a:t>
+            </a:r>
+            <a:r>
+              <a:rPr lang="en-US" b="1" dirty="0"/>
+              <a:t>!</a:t>
+            </a:r>
+            <a:endParaRPr b="1" dirty="0"/>
+          </a:p>
+          <a:p>
+            <a:pPr lvl="0"/>
+            <a:r>
+              <a:rPr dirty="0"/>
+              <a:t>A </a:t>
+            </a:r>
+            <a:r>
+              <a:rPr b="1" dirty="0"/>
+              <a:t>qualitative palette</a:t>
+            </a:r>
+            <a:r>
+              <a:rPr dirty="0"/>
+              <a:t> is a palette of individual colors for categorical values</a:t>
+            </a:r>
+          </a:p>
+          <a:p>
+            <a:pPr lvl="0"/>
+            <a:r>
+              <a:rPr b="1" dirty="0"/>
+              <a:t>Sequential palettes</a:t>
+            </a:r>
+            <a:r>
+              <a:rPr dirty="0"/>
+              <a:t> and </a:t>
+            </a:r>
+            <a:r>
+              <a:rPr b="1" dirty="0"/>
+              <a:t>divergent palettes</a:t>
+            </a:r>
+            <a:r>
+              <a:rPr dirty="0"/>
+              <a:t> are a sequence of colors</a:t>
+            </a:r>
+          </a:p>
+          <a:p>
+            <a:pPr lvl="1"/>
+            <a:r>
+              <a:rPr dirty="0"/>
+              <a:t>Numeric variables</a:t>
+            </a:r>
+          </a:p>
+          <a:p>
+            <a:pPr lvl="1"/>
+            <a:r>
+              <a:rPr dirty="0"/>
+              <a:t>Ord</a:t>
+            </a:r>
+            <a:r>
+              <a:rPr lang="en-US" dirty="0"/>
+              <a:t>inal or ord</a:t>
+            </a:r>
+            <a:r>
+              <a:rPr dirty="0"/>
+              <a:t>ered categorical variable</a:t>
+            </a:r>
+            <a:r>
+              <a:rPr lang="en-US" dirty="0"/>
+              <a:t>s</a:t>
+            </a:r>
+          </a:p>
+          <a:p>
+            <a:r>
+              <a:rPr lang="en-US" dirty="0"/>
+              <a:t>For examples of the foregoing palette types see the </a:t>
+            </a:r>
+            <a:r>
+              <a:rPr lang="en-US" dirty="0">
+                <a:hlinkClick r:id="rId2"/>
+              </a:rPr>
+              <a:t>Seaborn Choosing Color Palettes Tutorial</a:t>
+            </a:r>
+            <a:endParaRPr lang="en-US" dirty="0"/>
+          </a:p>
+          <a:p>
+            <a:r>
+              <a:rPr lang="en-US" dirty="0"/>
+              <a:t>To examine the wide range of available color pallets see </a:t>
+            </a:r>
+            <a:r>
+              <a:rPr lang="en-US" dirty="0">
+                <a:hlinkClick r:id="rId3"/>
+              </a:rPr>
+              <a:t>Choosing Color Maps in Matplotlib </a:t>
+            </a:r>
+            <a:endParaRPr dirty="0"/>
+          </a:p>
+        </p:txBody>
+      </p:sp>
+    </p:spTree>
+  </p:cSld>
+  <p:clrMapOvr>
+    <a:masterClrMapping/>
+  </p:clrMapOvr>
+</p:sld>
+</file>
+
+<file path=ppt/slides/slide31.xml><?xml version="1.0" encoding="utf-8"?>
 <p:sld xmlns:a="http://schemas.openxmlformats.org/drawingml/2006/main" xmlns:r="http://schemas.openxmlformats.org/officeDocument/2006/relationships" xmlns:p="http://schemas.openxmlformats.org/presentationml/2006/main">
   <p:cSld>
     <p:spTree>
@@ -7384,7 +8092,7 @@
 </p:sld>
 </file>
 
-<file path=ppt/slides/slide31.xml><?xml version="1.0" encoding="utf-8"?>
+<file path=ppt/slides/slide32.xml><?xml version="1.0" encoding="utf-8"?>
 <p:sld xmlns:a="http://schemas.openxmlformats.org/drawingml/2006/main" xmlns:r="http://schemas.openxmlformats.org/officeDocument/2006/relationships" xmlns:p="http://schemas.openxmlformats.org/presentationml/2006/main">
   <p:cSld>
     <p:spTree>
@@ -7447,7 +8155,7 @@
         <p:spPr/>
         <p:txBody>
           <a:bodyPr>
-            <a:normAutofit/>
+            <a:normAutofit fontScale="85000" lnSpcReduction="20000"/>
           </a:bodyPr>
           <a:lstStyle/>
           <a:p>
@@ -7511,6 +8219,40 @@
               <a:rPr dirty="0"/>
               <a:t>for categories</a:t>
             </a:r>
+            <a:endParaRPr lang="en-US" dirty="0"/>
+          </a:p>
+          <a:p>
+            <a:pPr lvl="0"/>
+            <a:r>
+              <a:rPr lang="en-US" dirty="0">
+                <a:solidFill>
+                  <a:srgbClr val="C00000"/>
+                </a:solidFill>
+              </a:rPr>
+              <a:t>Warning! Avoid using meaningless color in graphics</a:t>
+            </a:r>
+          </a:p>
+          <a:p>
+            <a:pPr lvl="1"/>
+            <a:r>
+              <a:rPr lang="en-US" b="1" dirty="0"/>
+              <a:t>Using color for no reason is a distraction!</a:t>
+            </a:r>
+          </a:p>
+          <a:p>
+            <a:pPr lvl="1"/>
+            <a:r>
+              <a:rPr lang="en-US" dirty="0"/>
+              <a:t>Example: meaningless color for bar plots </a:t>
+            </a:r>
+          </a:p>
+          <a:p>
+            <a:pPr lvl="1"/>
+            <a:r>
+              <a:rPr lang="en-US" dirty="0"/>
+              <a:t>Example: meaningless color in box plots</a:t>
+            </a:r>
+            <a:endParaRPr dirty="0"/>
           </a:p>
         </p:txBody>
       </p:sp>
@@ -7522,7 +8264,7 @@
 </p:sld>
 </file>
 
-<file path=ppt/slides/slide32.xml><?xml version="1.0" encoding="utf-8"?>
+<file path=ppt/slides/slide33.xml><?xml version="1.0" encoding="utf-8"?>
 <p:sld xmlns:a="http://schemas.openxmlformats.org/drawingml/2006/main" xmlns:r="http://schemas.openxmlformats.org/officeDocument/2006/relationships" xmlns:p="http://schemas.openxmlformats.org/presentationml/2006/main">
   <p:cSld>
     <p:spTree>
@@ -7735,7 +8477,7 @@
             </a:pPr>
             <a:r>
               <a:rPr lang="en-US" dirty="0"/>
-              <a:t>Large color pallet reduces perception</a:t>
+              <a:t>Large qualitative color pallet reduces perception</a:t>
             </a:r>
           </a:p>
           <a:p>
@@ -7803,7 +8545,7 @@
 </p:sld>
 </file>
 
-<file path=ppt/slides/slide33.xml><?xml version="1.0" encoding="utf-8"?>
+<file path=ppt/slides/slide34.xml><?xml version="1.0" encoding="utf-8"?>
 <p:sld xmlns:a="http://schemas.openxmlformats.org/drawingml/2006/main" xmlns:r="http://schemas.openxmlformats.org/officeDocument/2006/relationships" xmlns:p="http://schemas.openxmlformats.org/presentationml/2006/main">
   <p:cSld>
     <p:spTree>
@@ -8016,7 +8758,7 @@
             </a:pPr>
             <a:r>
               <a:rPr lang="en-US" dirty="0"/>
-              <a:t>Ordered box plot is an alternative to color and shape for variables with too many categories   </a:t>
+              <a:t>Ordered box plot is an alternative to qualitative color and shape for variables with too many categories   </a:t>
             </a:r>
           </a:p>
           <a:p>
@@ -8100,7 +8842,7 @@
 </p:sld>
 </file>
 
-<file path=ppt/slides/slide34.xml><?xml version="1.0" encoding="utf-8"?>
+<file path=ppt/slides/slide35.xml><?xml version="1.0" encoding="utf-8"?>
 <p:sld xmlns:a="http://schemas.openxmlformats.org/drawingml/2006/main" xmlns:r="http://schemas.openxmlformats.org/officeDocument/2006/relationships" xmlns:p="http://schemas.openxmlformats.org/presentationml/2006/main">
   <p:cSld>
     <p:spTree>
@@ -8219,8 +8961,8 @@
               <a:t>Limited steps of </a:t>
             </a:r>
             <a:r>
-              <a:rPr lang="en-US" dirty="0" err="1"/>
-              <a:t>ordianal</a:t>
+              <a:rPr lang="en-US" dirty="0"/>
+              <a:t>ordinal</a:t>
             </a:r>
             <a:r>
               <a:rPr dirty="0"/>
@@ -8237,7 +8979,7 @@
 </p:sld>
 </file>
 
-<file path=ppt/slides/slide35.xml><?xml version="1.0" encoding="utf-8"?>
+<file path=ppt/slides/slide36.xml><?xml version="1.0" encoding="utf-8"?>
 <p:sld xmlns:a="http://schemas.openxmlformats.org/drawingml/2006/main" xmlns:r="http://schemas.openxmlformats.org/officeDocument/2006/relationships" xmlns:p="http://schemas.openxmlformats.org/presentationml/2006/main">
   <p:cSld>
     <p:spTree>
@@ -8523,7 +9265,7 @@
 </p:sld>
 </file>
 
-<file path=ppt/slides/slide36.xml><?xml version="1.0" encoding="utf-8"?>
+<file path=ppt/slides/slide37.xml><?xml version="1.0" encoding="utf-8"?>
 <p:sld xmlns:a="http://schemas.openxmlformats.org/drawingml/2006/main" xmlns:r="http://schemas.openxmlformats.org/officeDocument/2006/relationships" xmlns:p="http://schemas.openxmlformats.org/presentationml/2006/main">
   <p:cSld>
     <p:spTree>
@@ -8622,7 +9364,7 @@
 </p:sld>
 </file>
 
-<file path=ppt/slides/slide37.xml><?xml version="1.0" encoding="utf-8"?>
+<file path=ppt/slides/slide38.xml><?xml version="1.0" encoding="utf-8"?>
 <p:sld xmlns:a="http://schemas.openxmlformats.org/drawingml/2006/main" xmlns:r="http://schemas.openxmlformats.org/officeDocument/2006/relationships" xmlns:p="http://schemas.openxmlformats.org/presentationml/2006/main">
   <p:cSld>
     <p:spTree>
@@ -8900,7 +9642,7 @@
 </p:sld>
 </file>
 
-<file path=ppt/slides/slide38.xml><?xml version="1.0" encoding="utf-8"?>
+<file path=ppt/slides/slide39.xml><?xml version="1.0" encoding="utf-8"?>
 <p:sld xmlns:a="http://schemas.openxmlformats.org/drawingml/2006/main" xmlns:r="http://schemas.openxmlformats.org/officeDocument/2006/relationships" xmlns:p="http://schemas.openxmlformats.org/presentationml/2006/main">
   <p:cSld>
     <p:spTree>
@@ -9010,7 +9752,143 @@
 </p:sld>
 </file>
 
-<file path=ppt/slides/slide39.xml><?xml version="1.0" encoding="utf-8"?>
+<file path=ppt/slides/slide4.xml><?xml version="1.0" encoding="utf-8"?>
+<p:sld xmlns:a="http://schemas.openxmlformats.org/drawingml/2006/main" xmlns:r="http://schemas.openxmlformats.org/officeDocument/2006/relationships" xmlns:p="http://schemas.openxmlformats.org/presentationml/2006/main">
+  <p:cSld>
+    <p:spTree>
+      <p:nvGrpSpPr>
+        <p:cNvPr id="1" name=""/>
+        <p:cNvGrpSpPr/>
+        <p:nvPr/>
+      </p:nvGrpSpPr>
+      <p:grpSpPr>
+        <a:xfrm>
+          <a:off x="0" y="0"/>
+          <a:ext cx="0" cy="0"/>
+          <a:chOff x="0" y="0"/>
+          <a:chExt cx="0" cy="0"/>
+        </a:xfrm>
+      </p:grpSpPr>
+      <p:sp>
+        <p:nvSpPr>
+          <p:cNvPr id="2" name="Title 1"/>
+          <p:cNvSpPr>
+            <a:spLocks noGrp="1"/>
+          </p:cNvSpPr>
+          <p:nvPr>
+            <p:ph type="title"/>
+          </p:nvPr>
+        </p:nvSpPr>
+        <p:spPr/>
+        <p:txBody>
+          <a:bodyPr/>
+          <a:lstStyle/>
+          <a:p>
+            <a:pPr marL="0" lvl="0" indent="0">
+              <a:buNone/>
+            </a:pPr>
+            <a:r>
+              <a:t>Why This Course?</a:t>
+            </a:r>
+          </a:p>
+        </p:txBody>
+      </p:sp>
+      <p:sp>
+        <p:nvSpPr>
+          <p:cNvPr id="3" name="Content Placeholder 2"/>
+          <p:cNvSpPr>
+            <a:spLocks noGrp="1"/>
+          </p:cNvSpPr>
+          <p:nvPr>
+            <p:ph idx="1"/>
+          </p:nvPr>
+        </p:nvSpPr>
+        <p:spPr/>
+        <p:txBody>
+          <a:bodyPr>
+            <a:normAutofit fontScale="92500" lnSpcReduction="20000"/>
+          </a:bodyPr>
+          <a:lstStyle/>
+          <a:p>
+            <a:pPr marL="0" lvl="0" indent="0">
+              <a:buNone/>
+            </a:pPr>
+            <a:r>
+              <a:rPr lang="en-US" dirty="0"/>
+              <a:t>What is the difference between </a:t>
+            </a:r>
+            <a:r>
+              <a:rPr lang="en-US" b="1" dirty="0"/>
+              <a:t>statistical inference </a:t>
+            </a:r>
+            <a:r>
+              <a:rPr lang="en-US" dirty="0"/>
+              <a:t>and </a:t>
+            </a:r>
+            <a:r>
+              <a:rPr lang="en-US" b="1" dirty="0"/>
+              <a:t>predictive analytics? </a:t>
+            </a:r>
+            <a:endParaRPr b="1" dirty="0"/>
+          </a:p>
+          <a:p>
+            <a:pPr lvl="0"/>
+            <a:r>
+              <a:rPr lang="en-US" dirty="0"/>
+              <a:t>Inference and prediction closely related   </a:t>
+            </a:r>
+          </a:p>
+          <a:p>
+            <a:pPr lvl="0"/>
+            <a:r>
+              <a:rPr lang="en-US" dirty="0"/>
+              <a:t>Prediction is the domain of machine learning   </a:t>
+            </a:r>
+          </a:p>
+          <a:p>
+            <a:pPr lvl="1"/>
+            <a:r>
+              <a:rPr lang="en-US" dirty="0"/>
+              <a:t>Goal is accurate predictions  </a:t>
+            </a:r>
+          </a:p>
+          <a:p>
+            <a:pPr lvl="0"/>
+            <a:r>
+              <a:rPr lang="en-US" dirty="0"/>
+              <a:t>Statistical inference seeks to make discoveries by applying statistical models     </a:t>
+            </a:r>
+          </a:p>
+          <a:p>
+            <a:pPr lvl="1"/>
+            <a:r>
+              <a:rPr lang="en-US" dirty="0"/>
+              <a:t>Goal is to understand changes in response given changes in independent variables    </a:t>
+            </a:r>
+          </a:p>
+          <a:p>
+            <a:r>
+              <a:rPr lang="en-US" dirty="0"/>
+              <a:t>We focus on inference in this course, not machine learning specifically </a:t>
+            </a:r>
+            <a:endParaRPr dirty="0"/>
+          </a:p>
+        </p:txBody>
+      </p:sp>
+    </p:spTree>
+    <p:extLst>
+      <p:ext uri="{BB962C8B-B14F-4D97-AF65-F5344CB8AC3E}">
+        <p14:creationId xmlns:p14="http://schemas.microsoft.com/office/powerpoint/2010/main" val="1668455024"/>
+      </p:ext>
+    </p:extLst>
+  </p:cSld>
+  <p:clrMapOvr>
+    <a:masterClrMapping/>
+  </p:clrMapOvr>
+</p:sld>
+</file>
+
+<file path=ppt/slides/slide40.xml><?xml version="1.0" encoding="utf-8"?>
 <p:sld xmlns:a="http://schemas.openxmlformats.org/drawingml/2006/main" xmlns:r="http://schemas.openxmlformats.org/officeDocument/2006/relationships" xmlns:p="http://schemas.openxmlformats.org/presentationml/2006/main">
   <p:cSld>
     <p:spTree>
@@ -9294,7 +10172,7 @@
 </p:sld>
 </file>
 
-<file path=ppt/slides/slide4.xml><?xml version="1.0" encoding="utf-8"?>
+<file path=ppt/slides/slide41.xml><?xml version="1.0" encoding="utf-8"?>
 <p:sld xmlns:a="http://schemas.openxmlformats.org/drawingml/2006/main" xmlns:r="http://schemas.openxmlformats.org/officeDocument/2006/relationships" xmlns:p="http://schemas.openxmlformats.org/presentationml/2006/main">
   <p:cSld>
     <p:spTree>
@@ -9330,142 +10208,6 @@
               <a:buNone/>
             </a:pPr>
             <a:r>
-              <a:t>Why This Course?</a:t>
-            </a:r>
-          </a:p>
-        </p:txBody>
-      </p:sp>
-      <p:sp>
-        <p:nvSpPr>
-          <p:cNvPr id="3" name="Content Placeholder 2"/>
-          <p:cNvSpPr>
-            <a:spLocks noGrp="1"/>
-          </p:cNvSpPr>
-          <p:nvPr>
-            <p:ph idx="1"/>
-          </p:nvPr>
-        </p:nvSpPr>
-        <p:spPr/>
-        <p:txBody>
-          <a:bodyPr>
-            <a:normAutofit fontScale="92500" lnSpcReduction="20000"/>
-          </a:bodyPr>
-          <a:lstStyle/>
-          <a:p>
-            <a:pPr marL="0" lvl="0" indent="0">
-              <a:buNone/>
-            </a:pPr>
-            <a:r>
-              <a:rPr lang="en-US" dirty="0"/>
-              <a:t>What is the difference between </a:t>
-            </a:r>
-            <a:r>
-              <a:rPr lang="en-US" b="1" dirty="0"/>
-              <a:t>statistical inference </a:t>
-            </a:r>
-            <a:r>
-              <a:rPr lang="en-US" dirty="0"/>
-              <a:t>and </a:t>
-            </a:r>
-            <a:r>
-              <a:rPr lang="en-US" b="1" dirty="0"/>
-              <a:t>predictive analytics? </a:t>
-            </a:r>
-            <a:endParaRPr b="1" dirty="0"/>
-          </a:p>
-          <a:p>
-            <a:pPr lvl="0"/>
-            <a:r>
-              <a:rPr lang="en-US" dirty="0"/>
-              <a:t>Inference and prediction closely related   </a:t>
-            </a:r>
-          </a:p>
-          <a:p>
-            <a:pPr lvl="0"/>
-            <a:r>
-              <a:rPr lang="en-US" dirty="0"/>
-              <a:t>Prediction is the domain of machine learning   </a:t>
-            </a:r>
-          </a:p>
-          <a:p>
-            <a:pPr lvl="1"/>
-            <a:r>
-              <a:rPr lang="en-US" dirty="0"/>
-              <a:t>Goal is accurate predictions  </a:t>
-            </a:r>
-          </a:p>
-          <a:p>
-            <a:pPr lvl="0"/>
-            <a:r>
-              <a:rPr lang="en-US" dirty="0"/>
-              <a:t>Statistical inference seeks to make discoveries by applying statistical models     </a:t>
-            </a:r>
-          </a:p>
-          <a:p>
-            <a:pPr lvl="1"/>
-            <a:r>
-              <a:rPr lang="en-US" dirty="0"/>
-              <a:t>Goal is to understand changes in response given changes in independent variables    </a:t>
-            </a:r>
-          </a:p>
-          <a:p>
-            <a:r>
-              <a:rPr lang="en-US" dirty="0"/>
-              <a:t>We focus on inference in this course, not machine learning specifically </a:t>
-            </a:r>
-            <a:endParaRPr dirty="0"/>
-          </a:p>
-        </p:txBody>
-      </p:sp>
-    </p:spTree>
-    <p:extLst>
-      <p:ext uri="{BB962C8B-B14F-4D97-AF65-F5344CB8AC3E}">
-        <p14:creationId xmlns:p14="http://schemas.microsoft.com/office/powerpoint/2010/main" val="1668455024"/>
-      </p:ext>
-    </p:extLst>
-  </p:cSld>
-  <p:clrMapOvr>
-    <a:masterClrMapping/>
-  </p:clrMapOvr>
-</p:sld>
-</file>
-
-<file path=ppt/slides/slide40.xml><?xml version="1.0" encoding="utf-8"?>
-<p:sld xmlns:a="http://schemas.openxmlformats.org/drawingml/2006/main" xmlns:r="http://schemas.openxmlformats.org/officeDocument/2006/relationships" xmlns:p="http://schemas.openxmlformats.org/presentationml/2006/main">
-  <p:cSld>
-    <p:spTree>
-      <p:nvGrpSpPr>
-        <p:cNvPr id="1" name=""/>
-        <p:cNvGrpSpPr/>
-        <p:nvPr/>
-      </p:nvGrpSpPr>
-      <p:grpSpPr>
-        <a:xfrm>
-          <a:off x="0" y="0"/>
-          <a:ext cx="0" cy="0"/>
-          <a:chOff x="0" y="0"/>
-          <a:chExt cx="0" cy="0"/>
-        </a:xfrm>
-      </p:grpSpPr>
-      <p:sp>
-        <p:nvSpPr>
-          <p:cNvPr id="2" name="Title 1"/>
-          <p:cNvSpPr>
-            <a:spLocks noGrp="1"/>
-          </p:cNvSpPr>
-          <p:nvPr>
-            <p:ph type="title"/>
-          </p:nvPr>
-        </p:nvSpPr>
-        <p:spPr/>
-        <p:txBody>
-          <a:bodyPr/>
-          <a:lstStyle/>
-          <a:p>
-            <a:pPr marL="0" lvl="0" indent="0">
-              <a:buNone/>
-            </a:pPr>
-            <a:r>
               <a:t>Regression Lines</a:t>
             </a:r>
           </a:p>
@@ -9578,7 +10320,7 @@
 </p:sld>
 </file>
 
-<file path=ppt/slides/slide41.xml><?xml version="1.0" encoding="utf-8"?>
+<file path=ppt/slides/slide42.xml><?xml version="1.0" encoding="utf-8"?>
 <p:sld xmlns:a="http://schemas.openxmlformats.org/drawingml/2006/main" xmlns:r="http://schemas.openxmlformats.org/officeDocument/2006/relationships" xmlns:p="http://schemas.openxmlformats.org/presentationml/2006/main">
   <p:cSld>
     <p:spTree>
@@ -9710,7 +10452,7 @@
 </p:sld>
 </file>
 
-<file path=ppt/slides/slide42.xml><?xml version="1.0" encoding="utf-8"?>
+<file path=ppt/slides/slide43.xml><?xml version="1.0" encoding="utf-8"?>
 <p:sld xmlns:a="http://schemas.openxmlformats.org/drawingml/2006/main" xmlns:r="http://schemas.openxmlformats.org/officeDocument/2006/relationships" xmlns:p="http://schemas.openxmlformats.org/presentationml/2006/main">
   <p:cSld>
     <p:spTree>
@@ -9867,7 +10609,7 @@
 </p:sld>
 </file>
 
-<file path=ppt/slides/slide43.xml><?xml version="1.0" encoding="utf-8"?>
+<file path=ppt/slides/slide44.xml><?xml version="1.0" encoding="utf-8"?>
 <p:sld xmlns:a="http://schemas.openxmlformats.org/drawingml/2006/main" xmlns:r="http://schemas.openxmlformats.org/officeDocument/2006/relationships" xmlns:p="http://schemas.openxmlformats.org/presentationml/2006/main">
   <p:cSld>
     <p:spTree>
@@ -10049,7 +10791,7 @@
 </p:sld>
 </file>
 
-<file path=ppt/slides/slide44.xml><?xml version="1.0" encoding="utf-8"?>
+<file path=ppt/slides/slide45.xml><?xml version="1.0" encoding="utf-8"?>
 <p:sld xmlns:a="http://schemas.openxmlformats.org/drawingml/2006/main" xmlns:r="http://schemas.openxmlformats.org/officeDocument/2006/relationships" xmlns:p="http://schemas.openxmlformats.org/presentationml/2006/main">
   <p:cSld>
     <p:spTree>
@@ -10257,7 +10999,7 @@
 </p:sld>
 </file>
 
-<file path=ppt/slides/slide45.xml><?xml version="1.0" encoding="utf-8"?>
+<file path=ppt/slides/slide46.xml><?xml version="1.0" encoding="utf-8"?>
 <p:sld xmlns:a="http://schemas.openxmlformats.org/drawingml/2006/main" xmlns:r="http://schemas.openxmlformats.org/officeDocument/2006/relationships" xmlns:p="http://schemas.openxmlformats.org/presentationml/2006/main">
   <p:cSld>
     <p:spTree>
@@ -10563,7 +11305,7 @@
 </p:sld>
 </file>
 
-<file path=ppt/slides/slide46.xml><?xml version="1.0" encoding="utf-8"?>
+<file path=ppt/slides/slide47.xml><?xml version="1.0" encoding="utf-8"?>
 <p:sld xmlns:a="http://schemas.openxmlformats.org/drawingml/2006/main" xmlns:r="http://schemas.openxmlformats.org/officeDocument/2006/relationships" xmlns:p="http://schemas.openxmlformats.org/presentationml/2006/main">
   <p:cSld>
     <p:spTree>
@@ -10703,7 +11445,7 @@
 </p:sld>
 </file>
 
-<file path=ppt/slides/slide47.xml><?xml version="1.0" encoding="utf-8"?>
+<file path=ppt/slides/slide48.xml><?xml version="1.0" encoding="utf-8"?>
 <p:sld xmlns:a="http://schemas.openxmlformats.org/drawingml/2006/main" xmlns:r="http://schemas.openxmlformats.org/officeDocument/2006/relationships" xmlns:p="http://schemas.openxmlformats.org/presentationml/2006/main">
   <p:cSld>
     <p:spTree>
@@ -10889,7 +11631,7 @@
 </p:sld>
 </file>
 
-<file path=ppt/slides/slide48.xml><?xml version="1.0" encoding="utf-8"?>
+<file path=ppt/slides/slide49.xml><?xml version="1.0" encoding="utf-8"?>
 <p:sld xmlns:a="http://schemas.openxmlformats.org/drawingml/2006/main" xmlns:r="http://schemas.openxmlformats.org/officeDocument/2006/relationships" xmlns:p="http://schemas.openxmlformats.org/presentationml/2006/main">
   <p:cSld>
     <p:spTree>
@@ -11020,143 +11762,6 @@
 </p:sld>
 </file>
 
-<file path=ppt/slides/slide49.xml><?xml version="1.0" encoding="utf-8"?>
-<p:sld xmlns:a="http://schemas.openxmlformats.org/drawingml/2006/main" xmlns:r="http://schemas.openxmlformats.org/officeDocument/2006/relationships" xmlns:p="http://schemas.openxmlformats.org/presentationml/2006/main">
-  <p:cSld>
-    <p:spTree>
-      <p:nvGrpSpPr>
-        <p:cNvPr id="1" name=""/>
-        <p:cNvGrpSpPr/>
-        <p:nvPr/>
-      </p:nvGrpSpPr>
-      <p:grpSpPr>
-        <a:xfrm>
-          <a:off x="0" y="0"/>
-          <a:ext cx="0" cy="0"/>
-          <a:chOff x="0" y="0"/>
-          <a:chExt cx="0" cy="0"/>
-        </a:xfrm>
-      </p:grpSpPr>
-      <p:sp>
-        <p:nvSpPr>
-          <p:cNvPr id="2" name="Title 1"/>
-          <p:cNvSpPr>
-            <a:spLocks noGrp="1"/>
-          </p:cNvSpPr>
-          <p:nvPr>
-            <p:ph type="title"/>
-          </p:nvPr>
-        </p:nvSpPr>
-        <p:spPr/>
-        <p:txBody>
-          <a:bodyPr/>
-          <a:lstStyle/>
-          <a:p>
-            <a:pPr marL="0" lvl="0" indent="0">
-              <a:buNone/>
-            </a:pPr>
-            <a:r>
-              <a:t>Summary</a:t>
-            </a:r>
-          </a:p>
-        </p:txBody>
-      </p:sp>
-      <p:sp>
-        <p:nvSpPr>
-          <p:cNvPr id="3" name="Content Placeholder 2"/>
-          <p:cNvSpPr>
-            <a:spLocks noGrp="1"/>
-          </p:cNvSpPr>
-          <p:nvPr>
-            <p:ph idx="1"/>
-          </p:nvPr>
-        </p:nvSpPr>
-        <p:spPr>
-          <a:xfrm>
-            <a:off x="457200" y="945266"/>
-            <a:ext cx="8229600" cy="3939250"/>
-          </a:xfrm>
-        </p:spPr>
-        <p:txBody>
-          <a:bodyPr>
-            <a:normAutofit fontScale="92500" lnSpcReduction="10000"/>
-          </a:bodyPr>
-          <a:lstStyle/>
-          <a:p>
-            <a:pPr marL="0" lvl="0" indent="0">
-              <a:buNone/>
-            </a:pPr>
-            <a:r>
-              <a:rPr dirty="0"/>
-              <a:t>We have explored these key points</a:t>
-            </a:r>
-            <a:endParaRPr lang="en-US" dirty="0"/>
-          </a:p>
-          <a:p>
-            <a:r>
-              <a:rPr lang="en-US" dirty="0"/>
-              <a:t>Visualization is a powerful EDA method</a:t>
-            </a:r>
-          </a:p>
-          <a:p>
-            <a:pPr lvl="1"/>
-            <a:r>
-              <a:rPr lang="en-US" dirty="0"/>
-              <a:t>Understand relationships in data</a:t>
-            </a:r>
-          </a:p>
-          <a:p>
-            <a:pPr lvl="1"/>
-            <a:r>
-              <a:rPr lang="en-US" dirty="0"/>
-              <a:t>Communicate data science insights</a:t>
-            </a:r>
-          </a:p>
-          <a:p>
-            <a:pPr lvl="0"/>
-            <a:r>
-              <a:rPr dirty="0"/>
-              <a:t>Proper use of plot aesthetics enable projection of multiple dimensions of complex data onto the 2-dimensional plot surface.</a:t>
-            </a:r>
-          </a:p>
-          <a:p>
-            <a:pPr lvl="1"/>
-            <a:r>
-              <a:rPr dirty="0"/>
-              <a:t>All plot aesthetics have limitations which must be understood to use them effectively</a:t>
-            </a:r>
-          </a:p>
-          <a:p>
-            <a:pPr lvl="1"/>
-            <a:r>
-              <a:rPr dirty="0"/>
-              <a:t>The effectiveness of a plot aesthetic varies with the type and the application</a:t>
-            </a:r>
-          </a:p>
-          <a:p>
-            <a:pPr lvl="0"/>
-            <a:r>
-              <a:rPr dirty="0"/>
-              <a:t>Regression lines help to focus viewer on trends</a:t>
-            </a:r>
-          </a:p>
-          <a:p>
-            <a:pPr lvl="1"/>
-            <a:r>
-              <a:rPr dirty="0"/>
-              <a:t>Transformations to linear relationships can be informative</a:t>
-            </a:r>
-          </a:p>
-        </p:txBody>
-      </p:sp>
-    </p:spTree>
-  </p:cSld>
-  <p:clrMapOvr>
-    <a:masterClrMapping/>
-  </p:clrMapOvr>
-</p:sld>
-</file>
-
 <file path=ppt/slides/slide5.xml><?xml version="1.0" encoding="utf-8"?>
 <p:sld xmlns:a="http://schemas.openxmlformats.org/drawingml/2006/main" xmlns:r="http://schemas.openxmlformats.org/officeDocument/2006/relationships" xmlns:p="http://schemas.openxmlformats.org/presentationml/2006/main">
   <p:cSld>
@@ -11362,6 +11967,143 @@
 </file>
 
 <file path=ppt/slides/slide50.xml><?xml version="1.0" encoding="utf-8"?>
+<p:sld xmlns:a="http://schemas.openxmlformats.org/drawingml/2006/main" xmlns:r="http://schemas.openxmlformats.org/officeDocument/2006/relationships" xmlns:p="http://schemas.openxmlformats.org/presentationml/2006/main">
+  <p:cSld>
+    <p:spTree>
+      <p:nvGrpSpPr>
+        <p:cNvPr id="1" name=""/>
+        <p:cNvGrpSpPr/>
+        <p:nvPr/>
+      </p:nvGrpSpPr>
+      <p:grpSpPr>
+        <a:xfrm>
+          <a:off x="0" y="0"/>
+          <a:ext cx="0" cy="0"/>
+          <a:chOff x="0" y="0"/>
+          <a:chExt cx="0" cy="0"/>
+        </a:xfrm>
+      </p:grpSpPr>
+      <p:sp>
+        <p:nvSpPr>
+          <p:cNvPr id="2" name="Title 1"/>
+          <p:cNvSpPr>
+            <a:spLocks noGrp="1"/>
+          </p:cNvSpPr>
+          <p:nvPr>
+            <p:ph type="title"/>
+          </p:nvPr>
+        </p:nvSpPr>
+        <p:spPr/>
+        <p:txBody>
+          <a:bodyPr/>
+          <a:lstStyle/>
+          <a:p>
+            <a:pPr marL="0" lvl="0" indent="0">
+              <a:buNone/>
+            </a:pPr>
+            <a:r>
+              <a:t>Summary</a:t>
+            </a:r>
+          </a:p>
+        </p:txBody>
+      </p:sp>
+      <p:sp>
+        <p:nvSpPr>
+          <p:cNvPr id="3" name="Content Placeholder 2"/>
+          <p:cNvSpPr>
+            <a:spLocks noGrp="1"/>
+          </p:cNvSpPr>
+          <p:nvPr>
+            <p:ph idx="1"/>
+          </p:nvPr>
+        </p:nvSpPr>
+        <p:spPr>
+          <a:xfrm>
+            <a:off x="457200" y="945266"/>
+            <a:ext cx="8229600" cy="3939250"/>
+          </a:xfrm>
+        </p:spPr>
+        <p:txBody>
+          <a:bodyPr>
+            <a:normAutofit fontScale="92500" lnSpcReduction="10000"/>
+          </a:bodyPr>
+          <a:lstStyle/>
+          <a:p>
+            <a:pPr marL="0" lvl="0" indent="0">
+              <a:buNone/>
+            </a:pPr>
+            <a:r>
+              <a:rPr dirty="0"/>
+              <a:t>We have explored these key points</a:t>
+            </a:r>
+            <a:endParaRPr lang="en-US" dirty="0"/>
+          </a:p>
+          <a:p>
+            <a:r>
+              <a:rPr lang="en-US" dirty="0"/>
+              <a:t>Visualization is a powerful EDA method</a:t>
+            </a:r>
+          </a:p>
+          <a:p>
+            <a:pPr lvl="1"/>
+            <a:r>
+              <a:rPr lang="en-US" dirty="0"/>
+              <a:t>Understand relationships in data</a:t>
+            </a:r>
+          </a:p>
+          <a:p>
+            <a:pPr lvl="1"/>
+            <a:r>
+              <a:rPr lang="en-US" dirty="0"/>
+              <a:t>Communicate data science insights</a:t>
+            </a:r>
+          </a:p>
+          <a:p>
+            <a:pPr lvl="0"/>
+            <a:r>
+              <a:rPr dirty="0"/>
+              <a:t>Proper use of plot aesthetics enable projection of multiple dimensions of complex data onto the 2-dimensional plot surface.</a:t>
+            </a:r>
+          </a:p>
+          <a:p>
+            <a:pPr lvl="1"/>
+            <a:r>
+              <a:rPr dirty="0"/>
+              <a:t>All plot aesthetics have limitations which must be understood to use them effectively</a:t>
+            </a:r>
+          </a:p>
+          <a:p>
+            <a:pPr lvl="1"/>
+            <a:r>
+              <a:rPr dirty="0"/>
+              <a:t>The effectiveness of a plot aesthetic varies with the type and the application</a:t>
+            </a:r>
+          </a:p>
+          <a:p>
+            <a:pPr lvl="0"/>
+            <a:r>
+              <a:rPr dirty="0"/>
+              <a:t>Regression lines help to focus viewer on trends</a:t>
+            </a:r>
+          </a:p>
+          <a:p>
+            <a:pPr lvl="1"/>
+            <a:r>
+              <a:rPr dirty="0"/>
+              <a:t>Transformations to linear relationships can be informative</a:t>
+            </a:r>
+          </a:p>
+        </p:txBody>
+      </p:sp>
+    </p:spTree>
+  </p:cSld>
+  <p:clrMapOvr>
+    <a:masterClrMapping/>
+  </p:clrMapOvr>
+</p:sld>
+</file>
+
+<file path=ppt/slides/slide51.xml><?xml version="1.0" encoding="utf-8"?>
 <p:sld xmlns:a="http://schemas.openxmlformats.org/drawingml/2006/main" xmlns:r="http://schemas.openxmlformats.org/officeDocument/2006/relationships" xmlns:p="http://schemas.openxmlformats.org/presentationml/2006/main">
   <p:cSld>
     <p:spTree>
@@ -11550,9 +12292,10 @@
                         <a:buNone/>
                       </a:pPr>
                       <a:r>
-                        <a:rPr sz="1800"/>
-                        <a:t>Numeric</a:t>
+                        <a:rPr lang="en-US" sz="1800" dirty="0"/>
+                        <a:t>Any</a:t>
                       </a:r>
+                      <a:endParaRPr sz="1800" dirty="0"/>
                     </a:p>
                   </a:txBody>
                   <a:tcPr/>
@@ -11605,8 +12348,16 @@
                         <a:buNone/>
                       </a:pPr>
                       <a:r>
-                        <a:rPr sz="1800"/>
-                        <a:t>Numeric plus categorical</a:t>
+                        <a:rPr sz="1800" dirty="0"/>
+                        <a:t>Numeric</a:t>
+                      </a:r>
+                      <a:r>
+                        <a:rPr lang="en-US" sz="1800" dirty="0"/>
+                        <a:t>,</a:t>
+                      </a:r>
+                      <a:r>
+                        <a:rPr sz="1800" dirty="0"/>
+                        <a:t> categorical</a:t>
                       </a:r>
                     </a:p>
                   </a:txBody>
@@ -11660,9 +12411,14 @@
                         <a:buNone/>
                       </a:pPr>
                       <a:r>
-                        <a:rPr sz="1800"/>
+                        <a:rPr sz="1800" dirty="0"/>
                         <a:t>Numeric</a:t>
                       </a:r>
+                      <a:r>
+                        <a:rPr lang="en-US" sz="1800" dirty="0"/>
+                        <a:t>, counts</a:t>
+                      </a:r>
+                      <a:endParaRPr sz="1800" dirty="0"/>
                     </a:p>
                   </a:txBody>
                   <a:tcPr/>
@@ -11770,8 +12526,16 @@
                         <a:buNone/>
                       </a:pPr>
                       <a:r>
-                        <a:rPr sz="1800"/>
-                        <a:t>Numeric, ordered categorical</a:t>
+                        <a:rPr sz="1800" dirty="0"/>
+                        <a:t>Numeric, </a:t>
+                      </a:r>
+                      <a:r>
+                        <a:rPr lang="en-US" sz="1800" dirty="0"/>
+                        <a:t>counts, </a:t>
+                      </a:r>
+                      <a:r>
+                        <a:rPr sz="1800" dirty="0"/>
+                        <a:t>ordered categorical</a:t>
                       </a:r>
                     </a:p>
                   </a:txBody>
@@ -11825,8 +12589,16 @@
                         <a:buNone/>
                       </a:pPr>
                       <a:r>
-                        <a:rPr sz="1800"/>
-                        <a:t>Numeric, ordered categorical</a:t>
+                        <a:rPr sz="1800" dirty="0"/>
+                        <a:t>Numeric, </a:t>
+                      </a:r>
+                      <a:r>
+                        <a:rPr lang="en-US" sz="1800" dirty="0"/>
+                        <a:t>counts, </a:t>
+                      </a:r>
+                      <a:r>
+                        <a:rPr sz="1800" dirty="0"/>
+                        <a:t>ordered categorical</a:t>
                       </a:r>
                     </a:p>
                   </a:txBody>
@@ -12045,8 +12817,24 @@
                         <a:buNone/>
                       </a:pPr>
                       <a:r>
-                        <a:rPr sz="1800"/>
-                        <a:t>Numeric or categorical</a:t>
+                        <a:rPr sz="1800" dirty="0"/>
+                        <a:t>Numeric</a:t>
+                      </a:r>
+                      <a:r>
+                        <a:rPr lang="en-US" sz="1800" dirty="0"/>
+                        <a:t>, counts,</a:t>
+                      </a:r>
+                      <a:r>
+                        <a:rPr sz="1800" dirty="0"/>
+                        <a:t> </a:t>
+                      </a:r>
+                      <a:r>
+                        <a:rPr lang="en-US" sz="1800" dirty="0"/>
+                        <a:t>ordered </a:t>
+                      </a:r>
+                      <a:r>
+                        <a:rPr sz="1800" dirty="0"/>
+                        <a:t>categorical</a:t>
                       </a:r>
                     </a:p>
                   </a:txBody>
@@ -12120,7 +12908,7 @@
     </p:spTree>
     <p:extLst>
       <p:ext uri="{BB962C8B-B14F-4D97-AF65-F5344CB8AC3E}">
-        <p14:creationId xmlns:p14="http://schemas.microsoft.com/office/powerpoint/2010/main" val="3380756405"/>
+        <p14:creationId xmlns:p14="http://schemas.microsoft.com/office/powerpoint/2010/main" val="3922932886"/>
       </p:ext>
     </p:extLst>
   </p:cSld>
@@ -13070,6 +13858,301 @@
 </a:theme>
 </file>
 
+<file path=ppt/theme/theme2.xml><?xml version="1.0" encoding="utf-8"?>
+<a:theme xmlns:a="http://schemas.openxmlformats.org/drawingml/2006/main" name="Office Theme">
+  <a:themeElements>
+    <a:clrScheme name="Office">
+      <a:dk1>
+        <a:sysClr val="windowText" lastClr="000000"/>
+      </a:dk1>
+      <a:lt1>
+        <a:sysClr val="window" lastClr="FFFFFF"/>
+      </a:lt1>
+      <a:dk2>
+        <a:srgbClr val="44546A"/>
+      </a:dk2>
+      <a:lt2>
+        <a:srgbClr val="E7E6E6"/>
+      </a:lt2>
+      <a:accent1>
+        <a:srgbClr val="4472C4"/>
+      </a:accent1>
+      <a:accent2>
+        <a:srgbClr val="ED7D31"/>
+      </a:accent2>
+      <a:accent3>
+        <a:srgbClr val="A5A5A5"/>
+      </a:accent3>
+      <a:accent4>
+        <a:srgbClr val="FFC000"/>
+      </a:accent4>
+      <a:accent5>
+        <a:srgbClr val="5B9BD5"/>
+      </a:accent5>
+      <a:accent6>
+        <a:srgbClr val="70AD47"/>
+      </a:accent6>
+      <a:hlink>
+        <a:srgbClr val="0563C1"/>
+      </a:hlink>
+      <a:folHlink>
+        <a:srgbClr val="954F72"/>
+      </a:folHlink>
+    </a:clrScheme>
+    <a:fontScheme name="Office">
+      <a:majorFont>
+        <a:latin typeface="Calibri Light" panose="020F0302020204030204"/>
+        <a:ea typeface=""/>
+        <a:cs typeface=""/>
+        <a:font script="Jpan" typeface="游ゴシック Light"/>
+        <a:font script="Hang" typeface="맑은 고딕"/>
+        <a:font script="Hans" typeface="等线 Light"/>
+        <a:font script="Hant" typeface="新細明體"/>
+        <a:font script="Arab" typeface="Times New Roman"/>
+        <a:font script="Hebr" typeface="Times New Roman"/>
+        <a:font script="Thai" typeface="Angsana New"/>
+        <a:font script="Ethi" typeface="Nyala"/>
+        <a:font script="Beng" typeface="Vrinda"/>
+        <a:font script="Gujr" typeface="Shruti"/>
+        <a:font script="Khmr" typeface="MoolBoran"/>
+        <a:font script="Knda" typeface="Tunga"/>
+        <a:font script="Guru" typeface="Raavi"/>
+        <a:font script="Cans" typeface="Euphemia"/>
+        <a:font script="Cher" typeface="Plantagenet Cherokee"/>
+        <a:font script="Yiii" typeface="Microsoft Yi Baiti"/>
+        <a:font script="Tibt" typeface="Microsoft Himalaya"/>
+        <a:font script="Thaa" typeface="MV Boli"/>
+        <a:font script="Deva" typeface="Mangal"/>
+        <a:font script="Telu" typeface="Gautami"/>
+        <a:font script="Taml" typeface="Latha"/>
+        <a:font script="Syrc" typeface="Estrangelo Edessa"/>
+        <a:font script="Orya" typeface="Kalinga"/>
+        <a:font script="Mlym" typeface="Kartika"/>
+        <a:font script="Laoo" typeface="DokChampa"/>
+        <a:font script="Sinh" typeface="Iskoola Pota"/>
+        <a:font script="Mong" typeface="Mongolian Baiti"/>
+        <a:font script="Viet" typeface="Times New Roman"/>
+        <a:font script="Uigh" typeface="Microsoft Uighur"/>
+        <a:font script="Geor" typeface="Sylfaen"/>
+        <a:font script="Armn" typeface="Arial"/>
+        <a:font script="Bugi" typeface="Leelawadee UI"/>
+        <a:font script="Bopo" typeface="Microsoft JhengHei"/>
+        <a:font script="Java" typeface="Javanese Text"/>
+        <a:font script="Lisu" typeface="Segoe UI"/>
+        <a:font script="Mymr" typeface="Myanmar Text"/>
+        <a:font script="Nkoo" typeface="Ebrima"/>
+        <a:font script="Olck" typeface="Nirmala UI"/>
+        <a:font script="Osma" typeface="Ebrima"/>
+        <a:font script="Phag" typeface="Phagspa"/>
+        <a:font script="Syrn" typeface="Estrangelo Edessa"/>
+        <a:font script="Syrj" typeface="Estrangelo Edessa"/>
+        <a:font script="Syre" typeface="Estrangelo Edessa"/>
+        <a:font script="Sora" typeface="Nirmala UI"/>
+        <a:font script="Tale" typeface="Microsoft Tai Le"/>
+        <a:font script="Talu" typeface="Microsoft New Tai Lue"/>
+        <a:font script="Tfng" typeface="Ebrima"/>
+      </a:majorFont>
+      <a:minorFont>
+        <a:latin typeface="Calibri" panose="020F0502020204030204"/>
+        <a:ea typeface=""/>
+        <a:cs typeface=""/>
+        <a:font script="Jpan" typeface="游ゴシック"/>
+        <a:font script="Hang" typeface="맑은 고딕"/>
+        <a:font script="Hans" typeface="等线"/>
+        <a:font script="Hant" typeface="新細明體"/>
+        <a:font script="Arab" typeface="Arial"/>
+        <a:font script="Hebr" typeface="Arial"/>
+        <a:font script="Thai" typeface="Cordia New"/>
+        <a:font script="Ethi" typeface="Nyala"/>
+        <a:font script="Beng" typeface="Vrinda"/>
+        <a:font script="Gujr" typeface="Shruti"/>
+        <a:font script="Khmr" typeface="DaunPenh"/>
+        <a:font script="Knda" typeface="Tunga"/>
+        <a:font script="Guru" typeface="Raavi"/>
+        <a:font script="Cans" typeface="Euphemia"/>
+        <a:font script="Cher" typeface="Plantagenet Cherokee"/>
+        <a:font script="Yiii" typeface="Microsoft Yi Baiti"/>
+        <a:font script="Tibt" typeface="Microsoft Himalaya"/>
+        <a:font script="Thaa" typeface="MV Boli"/>
+        <a:font script="Deva" typeface="Mangal"/>
+        <a:font script="Telu" typeface="Gautami"/>
+        <a:font script="Taml" typeface="Latha"/>
+        <a:font script="Syrc" typeface="Estrangelo Edessa"/>
+        <a:font script="Orya" typeface="Kalinga"/>
+        <a:font script="Mlym" typeface="Kartika"/>
+        <a:font script="Laoo" typeface="DokChampa"/>
+        <a:font script="Sinh" typeface="Iskoola Pota"/>
+        <a:font script="Mong" typeface="Mongolian Baiti"/>
+        <a:font script="Viet" typeface="Arial"/>
+        <a:font script="Uigh" typeface="Microsoft Uighur"/>
+        <a:font script="Geor" typeface="Sylfaen"/>
+        <a:font script="Armn" typeface="Arial"/>
+        <a:font script="Bugi" typeface="Leelawadee UI"/>
+        <a:font script="Bopo" typeface="Microsoft JhengHei"/>
+        <a:font script="Java" typeface="Javanese Text"/>
+        <a:font script="Lisu" typeface="Segoe UI"/>
+        <a:font script="Mymr" typeface="Myanmar Text"/>
+        <a:font script="Nkoo" typeface="Ebrima"/>
+        <a:font script="Olck" typeface="Nirmala UI"/>
+        <a:font script="Osma" typeface="Ebrima"/>
+        <a:font script="Phag" typeface="Phagspa"/>
+        <a:font script="Syrn" typeface="Estrangelo Edessa"/>
+        <a:font script="Syrj" typeface="Estrangelo Edessa"/>
+        <a:font script="Syre" typeface="Estrangelo Edessa"/>
+        <a:font script="Sora" typeface="Nirmala UI"/>
+        <a:font script="Tale" typeface="Microsoft Tai Le"/>
+        <a:font script="Talu" typeface="Microsoft New Tai Lue"/>
+        <a:font script="Tfng" typeface="Ebrima"/>
+      </a:minorFont>
+    </a:fontScheme>
+    <a:fmtScheme name="Office">
+      <a:fillStyleLst>
+        <a:solidFill>
+          <a:schemeClr val="phClr"/>
+        </a:solidFill>
+        <a:gradFill rotWithShape="1">
+          <a:gsLst>
+            <a:gs pos="0">
+              <a:schemeClr val="phClr">
+                <a:lumMod val="110000"/>
+                <a:satMod val="105000"/>
+                <a:tint val="67000"/>
+              </a:schemeClr>
+            </a:gs>
+            <a:gs pos="50000">
+              <a:schemeClr val="phClr">
+                <a:lumMod val="105000"/>
+                <a:satMod val="103000"/>
+                <a:tint val="73000"/>
+              </a:schemeClr>
+            </a:gs>
+            <a:gs pos="100000">
+              <a:schemeClr val="phClr">
+                <a:lumMod val="105000"/>
+                <a:satMod val="109000"/>
+                <a:tint val="81000"/>
+              </a:schemeClr>
+            </a:gs>
+          </a:gsLst>
+          <a:lin ang="5400000" scaled="0"/>
+        </a:gradFill>
+        <a:gradFill rotWithShape="1">
+          <a:gsLst>
+            <a:gs pos="0">
+              <a:schemeClr val="phClr">
+                <a:satMod val="103000"/>
+                <a:lumMod val="102000"/>
+                <a:tint val="94000"/>
+              </a:schemeClr>
+            </a:gs>
+            <a:gs pos="50000">
+              <a:schemeClr val="phClr">
+                <a:satMod val="110000"/>
+                <a:lumMod val="100000"/>
+                <a:shade val="100000"/>
+              </a:schemeClr>
+            </a:gs>
+            <a:gs pos="100000">
+              <a:schemeClr val="phClr">
+                <a:lumMod val="99000"/>
+                <a:satMod val="120000"/>
+                <a:shade val="78000"/>
+              </a:schemeClr>
+            </a:gs>
+          </a:gsLst>
+          <a:lin ang="5400000" scaled="0"/>
+        </a:gradFill>
+      </a:fillStyleLst>
+      <a:lnStyleLst>
+        <a:ln w="6350" cap="flat" cmpd="sng" algn="ctr">
+          <a:solidFill>
+            <a:schemeClr val="phClr"/>
+          </a:solidFill>
+          <a:prstDash val="solid"/>
+          <a:miter lim="800000"/>
+        </a:ln>
+        <a:ln w="12700" cap="flat" cmpd="sng" algn="ctr">
+          <a:solidFill>
+            <a:schemeClr val="phClr"/>
+          </a:solidFill>
+          <a:prstDash val="solid"/>
+          <a:miter lim="800000"/>
+        </a:ln>
+        <a:ln w="19050" cap="flat" cmpd="sng" algn="ctr">
+          <a:solidFill>
+            <a:schemeClr val="phClr"/>
+          </a:solidFill>
+          <a:prstDash val="solid"/>
+          <a:miter lim="800000"/>
+        </a:ln>
+      </a:lnStyleLst>
+      <a:effectStyleLst>
+        <a:effectStyle>
+          <a:effectLst/>
+        </a:effectStyle>
+        <a:effectStyle>
+          <a:effectLst/>
+        </a:effectStyle>
+        <a:effectStyle>
+          <a:effectLst>
+            <a:outerShdw blurRad="57150" dist="19050" dir="5400000" algn="ctr" rotWithShape="0">
+              <a:srgbClr val="000000">
+                <a:alpha val="63000"/>
+              </a:srgbClr>
+            </a:outerShdw>
+          </a:effectLst>
+        </a:effectStyle>
+      </a:effectStyleLst>
+      <a:bgFillStyleLst>
+        <a:solidFill>
+          <a:schemeClr val="phClr"/>
+        </a:solidFill>
+        <a:solidFill>
+          <a:schemeClr val="phClr">
+            <a:tint val="95000"/>
+            <a:satMod val="170000"/>
+          </a:schemeClr>
+        </a:solidFill>
+        <a:gradFill rotWithShape="1">
+          <a:gsLst>
+            <a:gs pos="0">
+              <a:schemeClr val="phClr">
+                <a:tint val="93000"/>
+                <a:satMod val="150000"/>
+                <a:shade val="98000"/>
+                <a:lumMod val="102000"/>
+              </a:schemeClr>
+            </a:gs>
+            <a:gs pos="50000">
+              <a:schemeClr val="phClr">
+                <a:tint val="98000"/>
+                <a:satMod val="130000"/>
+                <a:shade val="90000"/>
+                <a:lumMod val="103000"/>
+              </a:schemeClr>
+            </a:gs>
+            <a:gs pos="100000">
+              <a:schemeClr val="phClr">
+                <a:shade val="63000"/>
+                <a:satMod val="120000"/>
+              </a:schemeClr>
+            </a:gs>
+          </a:gsLst>
+          <a:lin ang="5400000" scaled="0"/>
+        </a:gradFill>
+      </a:bgFillStyleLst>
+    </a:fmtScheme>
+  </a:themeElements>
+  <a:objectDefaults/>
+  <a:extraClrSchemeLst/>
+  <a:extLst>
+    <a:ext uri="{05A4C25C-085E-4340-85A3-A5531E510DB2}">
+      <thm15:themeFamily xmlns:thm15="http://schemas.microsoft.com/office/thememl/2012/main" name="Office Theme" id="{62F939B6-93AF-4DB8-9C6B-D6C7DFDC589F}" vid="{4A3C46E8-61CC-4603-A589-7422A47A8E4A}"/>
+    </a:ext>
+  </a:extLst>
+</a:theme>
+</file>
+
 <file path=ppt/webextensions/taskpanes.xml><?xml version="1.0" encoding="utf-8"?>
 <wetp:taskpanes xmlns:wetp="http://schemas.microsoft.com/office/webextensions/taskpanes/2010/11">
   <wetp:taskpane dockstate="right" visibility="0" width="875" row="0">

</xml_diff>

<commit_message>
Added TA introduction slide
</commit_message>
<xml_diff>
--- a/LectureSlides/01_PreceptionForScientificVisualization.pptx
+++ b/LectureSlides/01_PreceptionForScientificVisualization.pptx
@@ -15,7 +15,7 @@
     <p:sldId id="259" r:id="rId6"/>
     <p:sldId id="260" r:id="rId7"/>
     <p:sldId id="261" r:id="rId8"/>
-    <p:sldId id="262" r:id="rId9"/>
+    <p:sldId id="719" r:id="rId9"/>
     <p:sldId id="264" r:id="rId10"/>
     <p:sldId id="266" r:id="rId11"/>
     <p:sldId id="265" r:id="rId12"/>
@@ -6856,8 +6856,8 @@
           </a:p>
         </p:txBody>
       </p:sp>
-      <mc:AlternateContent xmlns:mc="http://schemas.openxmlformats.org/markup-compatibility/2006">
-        <mc:Choice xmlns:a14="http://schemas.microsoft.com/office/drawing/2010/main" Requires="a14">
+      <mc:AlternateContent xmlns:mc="http://schemas.openxmlformats.org/markup-compatibility/2006" xmlns:a14="http://schemas.microsoft.com/office/drawing/2010/main">
+        <mc:Choice Requires="a14">
           <p:sp>
             <p:nvSpPr>
               <p:cNvPr id="3" name="Content Placeholder 2"/>
@@ -6998,7 +6998,7 @@
             </p:txBody>
           </p:sp>
         </mc:Choice>
-        <mc:Fallback>
+        <mc:Fallback xmlns="">
           <p:sp>
             <p:nvSpPr>
               <p:cNvPr id="3" name="Content Placeholder 2"/>
@@ -9954,7 +9954,7 @@
         </p:spPr>
         <p:txBody>
           <a:bodyPr>
-            <a:normAutofit lnSpcReduction="10000"/>
+            <a:normAutofit fontScale="92500"/>
           </a:bodyPr>
           <a:lstStyle>
             <a:lvl1pPr marL="342900" indent="-342900" algn="l" defTabSz="342900" rtl="0" eaLnBrk="1" latinLnBrk="0" hangingPunct="1">
@@ -10099,7 +10099,7 @@
             </a:pPr>
             <a:r>
               <a:rPr lang="en-US" dirty="0"/>
-              <a:t>Spare use of color and marker shape projects 4 dimensions</a:t>
+              <a:t>Limited use of qualitative color and marker shape projects 4 dimensions</a:t>
             </a:r>
           </a:p>
           <a:p>
@@ -13231,7 +13231,7 @@
 </file>
 
 <file path=ppt/slides/slide8.xml><?xml version="1.0" encoding="utf-8"?>
-<p:sld xmlns:a="http://schemas.openxmlformats.org/drawingml/2006/main" xmlns:r="http://schemas.openxmlformats.org/officeDocument/2006/relationships" xmlns:p="http://schemas.openxmlformats.org/presentationml/2006/main" show="0">
+<p:sld xmlns:a="http://schemas.openxmlformats.org/drawingml/2006/main" xmlns:r="http://schemas.openxmlformats.org/officeDocument/2006/relationships" xmlns:p="http://schemas.openxmlformats.org/presentationml/2006/main">
   <p:cSld>
     <p:spTree>
       <p:nvGrpSpPr>
@@ -13249,7 +13249,13 @@
       </p:grpSpPr>
       <p:sp>
         <p:nvSpPr>
-          <p:cNvPr id="2" name="Title 1"/>
+          <p:cNvPr id="2" name="Title 1">
+            <a:extLst>
+              <a:ext uri="{FF2B5EF4-FFF2-40B4-BE49-F238E27FC236}">
+                <a16:creationId xmlns:a16="http://schemas.microsoft.com/office/drawing/2014/main" id="{3B3EA3CE-8DB0-40A5-B4A6-AFCE2156CC1F}"/>
+              </a:ext>
+            </a:extLst>
+          </p:cNvPr>
           <p:cNvSpPr>
             <a:spLocks noGrp="1"/>
           </p:cNvSpPr>
@@ -13257,69 +13263,199 @@
             <p:ph type="title"/>
           </p:nvPr>
         </p:nvSpPr>
-        <p:spPr/>
-        <p:txBody>
-          <a:bodyPr/>
-          <a:lstStyle/>
-          <a:p>
-            <a:pPr marL="0" lvl="0" indent="0">
-              <a:buNone/>
-            </a:pPr>
-            <a:r>
-              <a:t>Teaching Assistant: Moustafa Saleh</a:t>
-            </a:r>
-          </a:p>
-        </p:txBody>
-      </p:sp>
-      <p:sp>
-        <p:nvSpPr>
-          <p:cNvPr id="3" name="Content Placeholder 2"/>
-          <p:cNvSpPr>
-            <a:spLocks noGrp="1"/>
-          </p:cNvSpPr>
-          <p:nvPr>
-            <p:ph idx="1"/>
-          </p:nvPr>
-        </p:nvSpPr>
-        <p:spPr/>
+        <p:spPr>
+          <a:xfrm>
+            <a:off x="628650" y="273844"/>
+            <a:ext cx="7886700" cy="364930"/>
+          </a:xfrm>
+        </p:spPr>
         <p:txBody>
           <a:bodyPr>
-            <a:normAutofit fontScale="92500" lnSpcReduction="10000"/>
+            <a:normAutofit fontScale="90000"/>
           </a:bodyPr>
           <a:lstStyle/>
           <a:p>
-            <a:pPr lvl="0"/>
-            <a:r>
-              <a:t>A principal data scientist at Oracle Cloud</a:t>
-            </a:r>
-            <a:br/>
-            <a:endParaRPr/>
-          </a:p>
-          <a:p>
-            <a:pPr lvl="0"/>
-            <a:r>
-              <a:t>Received PhD in computer science from University of Texas at San Antonio</a:t>
-            </a:r>
-            <a:br/>
-            <a:endParaRPr/>
-          </a:p>
-          <a:p>
-            <a:pPr lvl="0"/>
-            <a:r>
-              <a:t>Worked previously at Microsoft’s Advanced Threats Protection team developing ML solutions for malware detection</a:t>
-            </a:r>
-            <a:br/>
-            <a:endParaRPr/>
-          </a:p>
-          <a:p>
-            <a:pPr lvl="0"/>
-            <a:r>
-              <a:t>Research mainly focused on applying machine learning solutions to cyber-security challenges</a:t>
+            <a:r>
+              <a:rPr lang="en-US" dirty="0">
+                <a:latin typeface="+mn-lt"/>
+              </a:rPr>
+              <a:t>About your TA: Eric </a:t>
+            </a:r>
+            <a:r>
+              <a:rPr lang="en-US" dirty="0" err="1">
+                <a:latin typeface="+mn-lt"/>
+              </a:rPr>
+              <a:t>Trucksess</a:t>
+            </a:r>
+            <a:endParaRPr lang="en-US" dirty="0">
+              <a:latin typeface="+mn-lt"/>
+            </a:endParaRPr>
+          </a:p>
+        </p:txBody>
+      </p:sp>
+      <p:sp>
+        <p:nvSpPr>
+          <p:cNvPr id="3" name="Content Placeholder 2">
+            <a:extLst>
+              <a:ext uri="{FF2B5EF4-FFF2-40B4-BE49-F238E27FC236}">
+                <a16:creationId xmlns:a16="http://schemas.microsoft.com/office/drawing/2014/main" id="{CA03134D-F068-4BC9-B038-F3D5CBDDE3F9}"/>
+              </a:ext>
+            </a:extLst>
+          </p:cNvPr>
+          <p:cNvSpPr>
+            <a:spLocks noGrp="1"/>
+          </p:cNvSpPr>
+          <p:nvPr>
+            <p:ph idx="1"/>
+          </p:nvPr>
+        </p:nvSpPr>
+        <p:spPr>
+          <a:xfrm>
+            <a:off x="504079" y="1108726"/>
+            <a:ext cx="7886700" cy="3404150"/>
+          </a:xfrm>
+        </p:spPr>
+        <p:txBody>
+          <a:bodyPr>
+            <a:noAutofit/>
+          </a:bodyPr>
+          <a:lstStyle/>
+          <a:p>
+            <a:pPr>
+              <a:spcBef>
+                <a:spcPts val="450"/>
+              </a:spcBef>
+            </a:pPr>
+            <a:r>
+              <a:rPr lang="en-US" b="0" dirty="0">
+                <a:cs typeface="Arial" panose="020B0604020202020204" pitchFamily="34" charset="0"/>
+              </a:rPr>
+              <a:t>Registered Patent Attorney with focus in the Chemical and Solid State Physics, arts (Pharma, Polymeric films/I.V. sets, Energy storage)</a:t>
+            </a:r>
+          </a:p>
+          <a:p>
+            <a:pPr>
+              <a:spcBef>
+                <a:spcPts val="450"/>
+              </a:spcBef>
+            </a:pPr>
+            <a:r>
+              <a:rPr lang="en-US" b="0" dirty="0">
+                <a:cs typeface="Arial" panose="020B0604020202020204" pitchFamily="34" charset="0"/>
+              </a:rPr>
+              <a:t>General Practice Trial Attorney, Tech and Talent Contract Negotiator</a:t>
+            </a:r>
+          </a:p>
+          <a:p>
+            <a:pPr>
+              <a:spcBef>
+                <a:spcPts val="450"/>
+              </a:spcBef>
+            </a:pPr>
+            <a:r>
+              <a:rPr lang="en-US" b="0" dirty="0">
+                <a:cs typeface="Arial" panose="020B0604020202020204" pitchFamily="34" charset="0"/>
+              </a:rPr>
+              <a:t>Greenpeace Activist/Fellow working within the Arctic Campaign</a:t>
+            </a:r>
+          </a:p>
+          <a:p>
+            <a:pPr>
+              <a:spcBef>
+                <a:spcPts val="450"/>
+              </a:spcBef>
+            </a:pPr>
+            <a:r>
+              <a:rPr lang="en-US" b="0" dirty="0">
+                <a:cs typeface="Arial" panose="020B0604020202020204" pitchFamily="34" charset="0"/>
+              </a:rPr>
+              <a:t>BS Chemistry, Physics, UVA - TA Chem 260, Advanced Organic Chem</a:t>
+            </a:r>
+          </a:p>
+          <a:p>
+            <a:pPr>
+              <a:spcBef>
+                <a:spcPts val="450"/>
+              </a:spcBef>
+            </a:pPr>
+            <a:r>
+              <a:rPr lang="en-US" b="0" dirty="0">
+                <a:cs typeface="Arial" panose="020B0604020202020204" pitchFamily="34" charset="0"/>
+              </a:rPr>
+              <a:t>MS </a:t>
+            </a:r>
+            <a:r>
+              <a:rPr lang="en-US" b="0" dirty="0" err="1">
+                <a:cs typeface="Arial" panose="020B0604020202020204" pitchFamily="34" charset="0"/>
+              </a:rPr>
+              <a:t>Wirtschaftsrecht</a:t>
+            </a:r>
+            <a:r>
+              <a:rPr lang="en-US" b="0" dirty="0">
+                <a:cs typeface="Arial" panose="020B0604020202020204" pitchFamily="34" charset="0"/>
+              </a:rPr>
+              <a:t> (Commercial Law), </a:t>
+            </a:r>
+            <a:r>
+              <a:rPr lang="en-US" b="0" dirty="0" err="1">
+                <a:cs typeface="Arial" panose="020B0604020202020204" pitchFamily="34" charset="0"/>
+              </a:rPr>
+              <a:t>Wirtschaftsuniversität</a:t>
+            </a:r>
+            <a:r>
+              <a:rPr lang="en-US" b="0" dirty="0">
+                <a:cs typeface="Arial" panose="020B0604020202020204" pitchFamily="34" charset="0"/>
+              </a:rPr>
+              <a:t>, Wien</a:t>
+            </a:r>
+          </a:p>
+          <a:p>
+            <a:pPr>
+              <a:spcBef>
+                <a:spcPts val="450"/>
+              </a:spcBef>
+            </a:pPr>
+            <a:r>
+              <a:rPr lang="en-US" b="0" dirty="0">
+                <a:cs typeface="Arial" panose="020B0604020202020204" pitchFamily="34" charset="0"/>
+              </a:rPr>
+              <a:t>JD, University of Buffalo</a:t>
+            </a:r>
+          </a:p>
+          <a:p>
+            <a:pPr>
+              <a:spcBef>
+                <a:spcPts val="450"/>
+              </a:spcBef>
+            </a:pPr>
+            <a:r>
+              <a:rPr lang="en-US" b="0" dirty="0">
+                <a:cs typeface="Arial" panose="020B0604020202020204" pitchFamily="34" charset="0"/>
+              </a:rPr>
+              <a:t>ALM Student in Data Science, HES</a:t>
+            </a:r>
+          </a:p>
+          <a:p>
+            <a:pPr>
+              <a:spcBef>
+                <a:spcPts val="450"/>
+              </a:spcBef>
+            </a:pPr>
+            <a:r>
+              <a:rPr lang="en-US" b="0" dirty="0">
+                <a:cs typeface="Arial" panose="020B0604020202020204" pitchFamily="34" charset="0"/>
+              </a:rPr>
+              <a:t>On a permanent push/pull bro-split</a:t>
             </a:r>
           </a:p>
         </p:txBody>
       </p:sp>
     </p:spTree>
+    <p:extLst>
+      <p:ext uri="{BB962C8B-B14F-4D97-AF65-F5344CB8AC3E}">
+        <p14:creationId xmlns:p14="http://schemas.microsoft.com/office/powerpoint/2010/main" val="2066707455"/>
+      </p:ext>
+    </p:extLst>
   </p:cSld>
   <p:clrMapOvr>
     <a:masterClrMapping/>

</xml_diff>

<commit_message>
Updated asthetics summary table
</commit_message>
<xml_diff>
--- a/LectureSlides/01_PreceptionForScientificVisualization.pptx
+++ b/LectureSlides/01_PreceptionForScientificVisualization.pptx
@@ -9741,6 +9741,21 @@
               <a:rPr dirty="0"/>
               <a:t>Human perception limits the number of shapes humans can perceive well</a:t>
             </a:r>
+            <a:endParaRPr lang="en-US" dirty="0"/>
+          </a:p>
+          <a:p>
+            <a:pPr lvl="0"/>
+            <a:r>
+              <a:rPr lang="en-US" dirty="0"/>
+              <a:t>You can find a list of Matplotlib marker shapes </a:t>
+            </a:r>
+            <a:r>
+              <a:rPr lang="en-US" dirty="0">
+                <a:hlinkClick r:id="rId2"/>
+              </a:rPr>
+              <a:t>here</a:t>
+            </a:r>
+            <a:endParaRPr dirty="0"/>
           </a:p>
         </p:txBody>
       </p:sp>

</xml_diff>

<commit_message>
Typo corrections on slides
</commit_message>
<xml_diff>
--- a/LectureSlides/01_PreceptionForScientificVisualization.pptx
+++ b/LectureSlides/01_PreceptionForScientificVisualization.pptx
@@ -16035,8 +16035,12 @@
           <a:p>
             <a:pPr lvl="0"/>
             <a:r>
+              <a:rPr lang="en-US" dirty="0"/>
+              <a:t>A</a:t>
+            </a:r>
+            <a:r>
               <a:rPr dirty="0"/>
-              <a:t>This aesthetic is only useful when two conditions are met:</a:t>
+              <a:t>esthetic is only useful when two conditions are met:</a:t>
             </a:r>
           </a:p>
           <a:p>
@@ -16086,6 +16090,245 @@
   <p:clrMapOvr>
     <a:masterClrMapping/>
   </p:clrMapOvr>
+  <p:timing>
+    <p:tnLst>
+      <p:par>
+        <p:cTn id="1" dur="indefinite" restart="never" nodeType="tmRoot">
+          <p:childTnLst>
+            <p:seq concurrent="1" nextAc="seek">
+              <p:cTn id="2" dur="indefinite" nodeType="mainSeq">
+                <p:childTnLst>
+                  <p:par>
+                    <p:cTn id="3" fill="hold">
+                      <p:stCondLst>
+                        <p:cond delay="indefinite"/>
+                      </p:stCondLst>
+                      <p:childTnLst>
+                        <p:par>
+                          <p:cTn id="4" fill="hold">
+                            <p:stCondLst>
+                              <p:cond delay="0"/>
+                            </p:stCondLst>
+                            <p:childTnLst>
+                              <p:par>
+                                <p:cTn id="5" presetID="1" presetClass="entr" presetSubtype="0" fill="hold" nodeType="clickEffect">
+                                  <p:stCondLst>
+                                    <p:cond delay="0"/>
+                                  </p:stCondLst>
+                                  <p:childTnLst>
+                                    <p:set>
+                                      <p:cBhvr>
+                                        <p:cTn id="6" dur="1" fill="hold">
+                                          <p:stCondLst>
+                                            <p:cond delay="0"/>
+                                          </p:stCondLst>
+                                        </p:cTn>
+                                        <p:tgtEl>
+                                          <p:spTgt spid="3">
+                                            <p:txEl>
+                                              <p:pRg st="1" end="1"/>
+                                            </p:txEl>
+                                          </p:spTgt>
+                                        </p:tgtEl>
+                                        <p:attrNameLst>
+                                          <p:attrName>style.visibility</p:attrName>
+                                        </p:attrNameLst>
+                                      </p:cBhvr>
+                                      <p:to>
+                                        <p:strVal val="visible"/>
+                                      </p:to>
+                                    </p:set>
+                                  </p:childTnLst>
+                                </p:cTn>
+                              </p:par>
+                              <p:par>
+                                <p:cTn id="7" presetID="1" presetClass="entr" presetSubtype="0" fill="hold" nodeType="withEffect">
+                                  <p:stCondLst>
+                                    <p:cond delay="0"/>
+                                  </p:stCondLst>
+                                  <p:childTnLst>
+                                    <p:set>
+                                      <p:cBhvr>
+                                        <p:cTn id="8" dur="1" fill="hold">
+                                          <p:stCondLst>
+                                            <p:cond delay="0"/>
+                                          </p:stCondLst>
+                                        </p:cTn>
+                                        <p:tgtEl>
+                                          <p:spTgt spid="3">
+                                            <p:txEl>
+                                              <p:pRg st="2" end="2"/>
+                                            </p:txEl>
+                                          </p:spTgt>
+                                        </p:tgtEl>
+                                        <p:attrNameLst>
+                                          <p:attrName>style.visibility</p:attrName>
+                                        </p:attrNameLst>
+                                      </p:cBhvr>
+                                      <p:to>
+                                        <p:strVal val="visible"/>
+                                      </p:to>
+                                    </p:set>
+                                  </p:childTnLst>
+                                </p:cTn>
+                              </p:par>
+                              <p:par>
+                                <p:cTn id="9" presetID="1" presetClass="entr" presetSubtype="0" fill="hold" nodeType="withEffect">
+                                  <p:stCondLst>
+                                    <p:cond delay="0"/>
+                                  </p:stCondLst>
+                                  <p:childTnLst>
+                                    <p:set>
+                                      <p:cBhvr>
+                                        <p:cTn id="10" dur="1" fill="hold">
+                                          <p:stCondLst>
+                                            <p:cond delay="0"/>
+                                          </p:stCondLst>
+                                        </p:cTn>
+                                        <p:tgtEl>
+                                          <p:spTgt spid="3">
+                                            <p:txEl>
+                                              <p:pRg st="3" end="3"/>
+                                            </p:txEl>
+                                          </p:spTgt>
+                                        </p:tgtEl>
+                                        <p:attrNameLst>
+                                          <p:attrName>style.visibility</p:attrName>
+                                        </p:attrNameLst>
+                                      </p:cBhvr>
+                                      <p:to>
+                                        <p:strVal val="visible"/>
+                                      </p:to>
+                                    </p:set>
+                                  </p:childTnLst>
+                                </p:cTn>
+                              </p:par>
+                            </p:childTnLst>
+                          </p:cTn>
+                        </p:par>
+                      </p:childTnLst>
+                    </p:cTn>
+                  </p:par>
+                  <p:par>
+                    <p:cTn id="11" fill="hold">
+                      <p:stCondLst>
+                        <p:cond delay="indefinite"/>
+                      </p:stCondLst>
+                      <p:childTnLst>
+                        <p:par>
+                          <p:cTn id="12" fill="hold">
+                            <p:stCondLst>
+                              <p:cond delay="0"/>
+                            </p:stCondLst>
+                            <p:childTnLst>
+                              <p:par>
+                                <p:cTn id="13" presetID="1" presetClass="entr" presetSubtype="0" fill="hold" nodeType="clickEffect">
+                                  <p:stCondLst>
+                                    <p:cond delay="0"/>
+                                  </p:stCondLst>
+                                  <p:childTnLst>
+                                    <p:set>
+                                      <p:cBhvr>
+                                        <p:cTn id="14" dur="1" fill="hold">
+                                          <p:stCondLst>
+                                            <p:cond delay="0"/>
+                                          </p:stCondLst>
+                                        </p:cTn>
+                                        <p:tgtEl>
+                                          <p:spTgt spid="3">
+                                            <p:txEl>
+                                              <p:pRg st="4" end="4"/>
+                                            </p:txEl>
+                                          </p:spTgt>
+                                        </p:tgtEl>
+                                        <p:attrNameLst>
+                                          <p:attrName>style.visibility</p:attrName>
+                                        </p:attrNameLst>
+                                      </p:cBhvr>
+                                      <p:to>
+                                        <p:strVal val="visible"/>
+                                      </p:to>
+                                    </p:set>
+                                  </p:childTnLst>
+                                </p:cTn>
+                              </p:par>
+                            </p:childTnLst>
+                          </p:cTn>
+                        </p:par>
+                      </p:childTnLst>
+                    </p:cTn>
+                  </p:par>
+                  <p:par>
+                    <p:cTn id="15" fill="hold">
+                      <p:stCondLst>
+                        <p:cond delay="indefinite"/>
+                      </p:stCondLst>
+                      <p:childTnLst>
+                        <p:par>
+                          <p:cTn id="16" fill="hold">
+                            <p:stCondLst>
+                              <p:cond delay="0"/>
+                            </p:stCondLst>
+                            <p:childTnLst>
+                              <p:par>
+                                <p:cTn id="17" presetID="1" presetClass="entr" presetSubtype="0" fill="hold" nodeType="clickEffect">
+                                  <p:stCondLst>
+                                    <p:cond delay="0"/>
+                                  </p:stCondLst>
+                                  <p:childTnLst>
+                                    <p:set>
+                                      <p:cBhvr>
+                                        <p:cTn id="18" dur="1" fill="hold">
+                                          <p:stCondLst>
+                                            <p:cond delay="0"/>
+                                          </p:stCondLst>
+                                        </p:cTn>
+                                        <p:tgtEl>
+                                          <p:spTgt spid="3">
+                                            <p:txEl>
+                                              <p:pRg st="5" end="5"/>
+                                            </p:txEl>
+                                          </p:spTgt>
+                                        </p:tgtEl>
+                                        <p:attrNameLst>
+                                          <p:attrName>style.visibility</p:attrName>
+                                        </p:attrNameLst>
+                                      </p:cBhvr>
+                                      <p:to>
+                                        <p:strVal val="visible"/>
+                                      </p:to>
+                                    </p:set>
+                                  </p:childTnLst>
+                                </p:cTn>
+                              </p:par>
+                            </p:childTnLst>
+                          </p:cTn>
+                        </p:par>
+                      </p:childTnLst>
+                    </p:cTn>
+                  </p:par>
+                </p:childTnLst>
+              </p:cTn>
+              <p:prevCondLst>
+                <p:cond evt="onPrev" delay="0">
+                  <p:tgtEl>
+                    <p:sldTgt/>
+                  </p:tgtEl>
+                </p:cond>
+              </p:prevCondLst>
+              <p:nextCondLst>
+                <p:cond evt="onNext" delay="0">
+                  <p:tgtEl>
+                    <p:sldTgt/>
+                  </p:tgtEl>
+                </p:cond>
+              </p:nextCondLst>
+            </p:seq>
+          </p:childTnLst>
+        </p:cTn>
+      </p:par>
+    </p:tnLst>
+  </p:timing>
 </p:sld>
 </file>
 

</xml_diff>